<commit_message>
ajout fichier ordrePresentation, corrections fautes PPT
</commit_message>
<xml_diff>
--- a/Documentation/Revue 1/Presentation_Revue_1.pptx
+++ b/Documentation/Revue 1/Presentation_Revue_1.pptx
@@ -114,6 +114,11 @@
       </a:defRPr>
     </a:lvl9pPr>
   </p:defaultTextStyle>
+  <p:extLst>
+    <p:ext uri="{EFAFB233-063F-42B5-8137-9DF3F51BA10A}">
+      <p15:sldGuideLst xmlns:p15="http://schemas.microsoft.com/office/powerpoint/2012/main"/>
+    </p:ext>
+  </p:extLst>
 </p:presentation>
 </file>
 
@@ -167,7 +172,7 @@
           <a:noFill/>
           <a:extLst>
             <a:ext uri="{909E8E84-426E-40dd-AFC4-6F175D3DCCD1}">
-              <a14:hiddenFill xmlns:a14="http://schemas.microsoft.com/office/drawing/2010/main" xmlns="">
+              <a14:hiddenFill xmlns="" xmlns:a14="http://schemas.microsoft.com/office/drawing/2010/main">
                 <a:solidFill>
                   <a:srgbClr val="FFFFFF"/>
                 </a:solidFill>
@@ -227,7 +232,7 @@
             </a:ln>
             <a:extLst>
               <a:ext uri="{91240B29-F687-4f45-9708-019B960494DF}">
-                <a14:hiddenLine xmlns:a14="http://schemas.microsoft.com/office/drawing/2010/main" xmlns="" w="9525">
+                <a14:hiddenLine xmlns="" xmlns:a14="http://schemas.microsoft.com/office/drawing/2010/main" w="9525">
                   <a:solidFill>
                     <a:srgbClr val="000000"/>
                   </a:solidFill>
@@ -317,7 +322,7 @@
             </a:ln>
             <a:extLst>
               <a:ext uri="{91240B29-F687-4f45-9708-019B960494DF}">
-                <a14:hiddenLine xmlns:a14="http://schemas.microsoft.com/office/drawing/2010/main" xmlns="" w="9525">
+                <a14:hiddenLine xmlns="" xmlns:a14="http://schemas.microsoft.com/office/drawing/2010/main" w="9525">
                   <a:solidFill>
                     <a:srgbClr val="000000"/>
                   </a:solidFill>
@@ -407,7 +412,7 @@
             </a:ln>
             <a:extLst>
               <a:ext uri="{91240B29-F687-4f45-9708-019B960494DF}">
-                <a14:hiddenLine xmlns:a14="http://schemas.microsoft.com/office/drawing/2010/main" xmlns="" w="9525">
+                <a14:hiddenLine xmlns="" xmlns:a14="http://schemas.microsoft.com/office/drawing/2010/main" w="9525">
                   <a:solidFill>
                     <a:srgbClr val="000000"/>
                   </a:solidFill>
@@ -441,7 +446,7 @@
             </a:ln>
             <a:extLst>
               <a:ext uri="{91240B29-F687-4f45-9708-019B960494DF}">
-                <a14:hiddenLine xmlns:a14="http://schemas.microsoft.com/office/drawing/2010/main" xmlns="" w="9525">
+                <a14:hiddenLine xmlns="" xmlns:a14="http://schemas.microsoft.com/office/drawing/2010/main" w="9525">
                   <a:solidFill>
                     <a:srgbClr val="000000"/>
                   </a:solidFill>
@@ -531,7 +536,7 @@
             </a:ln>
             <a:extLst>
               <a:ext uri="{91240B29-F687-4f45-9708-019B960494DF}">
-                <a14:hiddenLine xmlns:a14="http://schemas.microsoft.com/office/drawing/2010/main" xmlns="" w="9525">
+                <a14:hiddenLine xmlns="" xmlns:a14="http://schemas.microsoft.com/office/drawing/2010/main" w="9525">
                   <a:solidFill>
                     <a:srgbClr val="000000"/>
                   </a:solidFill>
@@ -593,7 +598,7 @@
             </a:ln>
             <a:extLst>
               <a:ext uri="{91240B29-F687-4f45-9708-019B960494DF}">
-                <a14:hiddenLine xmlns:a14="http://schemas.microsoft.com/office/drawing/2010/main" xmlns="" w="9525">
+                <a14:hiddenLine xmlns="" xmlns:a14="http://schemas.microsoft.com/office/drawing/2010/main" w="9525">
                   <a:solidFill>
                     <a:srgbClr val="000000"/>
                   </a:solidFill>
@@ -655,7 +660,7 @@
             </a:ln>
             <a:extLst>
               <a:ext uri="{91240B29-F687-4f45-9708-019B960494DF}">
-                <a14:hiddenLine xmlns:a14="http://schemas.microsoft.com/office/drawing/2010/main" xmlns="" w="9525">
+                <a14:hiddenLine xmlns="" xmlns:a14="http://schemas.microsoft.com/office/drawing/2010/main" w="9525">
                   <a:solidFill>
                     <a:srgbClr val="000000"/>
                   </a:solidFill>
@@ -745,7 +750,7 @@
             </a:ln>
             <a:extLst>
               <a:ext uri="{91240B29-F687-4f45-9708-019B960494DF}">
-                <a14:hiddenLine xmlns:a14="http://schemas.microsoft.com/office/drawing/2010/main" xmlns="" w="9525">
+                <a14:hiddenLine xmlns="" xmlns:a14="http://schemas.microsoft.com/office/drawing/2010/main" w="9525">
                   <a:solidFill>
                     <a:srgbClr val="000000"/>
                   </a:solidFill>
@@ -807,7 +812,7 @@
             </a:ln>
             <a:extLst>
               <a:ext uri="{91240B29-F687-4f45-9708-019B960494DF}">
-                <a14:hiddenLine xmlns:a14="http://schemas.microsoft.com/office/drawing/2010/main" xmlns="" w="9525">
+                <a14:hiddenLine xmlns="" xmlns:a14="http://schemas.microsoft.com/office/drawing/2010/main" w="9525">
                   <a:solidFill>
                     <a:srgbClr val="000000"/>
                   </a:solidFill>
@@ -869,7 +874,7 @@
             </a:ln>
             <a:extLst>
               <a:ext uri="{91240B29-F687-4f45-9708-019B960494DF}">
-                <a14:hiddenLine xmlns:a14="http://schemas.microsoft.com/office/drawing/2010/main" xmlns="" w="9525">
+                <a14:hiddenLine xmlns="" xmlns:a14="http://schemas.microsoft.com/office/drawing/2010/main" w="9525">
                   <a:solidFill>
                     <a:srgbClr val="000000"/>
                   </a:solidFill>
@@ -959,7 +964,7 @@
             </a:ln>
             <a:extLst>
               <a:ext uri="{91240B29-F687-4f45-9708-019B960494DF}">
-                <a14:hiddenLine xmlns:a14="http://schemas.microsoft.com/office/drawing/2010/main" xmlns="" w="9525">
+                <a14:hiddenLine xmlns="" xmlns:a14="http://schemas.microsoft.com/office/drawing/2010/main" w="9525">
                   <a:solidFill>
                     <a:srgbClr val="000000"/>
                   </a:solidFill>
@@ -1049,7 +1054,7 @@
             </a:ln>
             <a:extLst>
               <a:ext uri="{91240B29-F687-4f45-9708-019B960494DF}">
-                <a14:hiddenLine xmlns:a14="http://schemas.microsoft.com/office/drawing/2010/main" xmlns="" w="9525">
+                <a14:hiddenLine xmlns="" xmlns:a14="http://schemas.microsoft.com/office/drawing/2010/main" w="9525">
                   <a:solidFill>
                     <a:srgbClr val="000000"/>
                   </a:solidFill>
@@ -1111,7 +1116,7 @@
             </a:ln>
             <a:extLst>
               <a:ext uri="{91240B29-F687-4f45-9708-019B960494DF}">
-                <a14:hiddenLine xmlns:a14="http://schemas.microsoft.com/office/drawing/2010/main" xmlns="" w="9525">
+                <a14:hiddenLine xmlns="" xmlns:a14="http://schemas.microsoft.com/office/drawing/2010/main" w="9525">
                   <a:solidFill>
                     <a:srgbClr val="000000"/>
                   </a:solidFill>
@@ -1221,7 +1226,7 @@
             </a:ln>
             <a:extLst>
               <a:ext uri="{91240B29-F687-4f45-9708-019B960494DF}">
-                <a14:hiddenLine xmlns:a14="http://schemas.microsoft.com/office/drawing/2010/main" xmlns="" w="9525">
+                <a14:hiddenLine xmlns="" xmlns:a14="http://schemas.microsoft.com/office/drawing/2010/main" w="9525">
                   <a:solidFill>
                     <a:srgbClr val="000000"/>
                   </a:solidFill>
@@ -1283,7 +1288,7 @@
             </a:ln>
             <a:extLst>
               <a:ext uri="{91240B29-F687-4f45-9708-019B960494DF}">
-                <a14:hiddenLine xmlns:a14="http://schemas.microsoft.com/office/drawing/2010/main" xmlns="" w="9525">
+                <a14:hiddenLine xmlns="" xmlns:a14="http://schemas.microsoft.com/office/drawing/2010/main" w="9525">
                   <a:solidFill>
                     <a:srgbClr val="000000"/>
                   </a:solidFill>
@@ -1373,7 +1378,7 @@
             </a:ln>
             <a:extLst>
               <a:ext uri="{91240B29-F687-4f45-9708-019B960494DF}">
-                <a14:hiddenLine xmlns:a14="http://schemas.microsoft.com/office/drawing/2010/main" xmlns="" w="9525">
+                <a14:hiddenLine xmlns="" xmlns:a14="http://schemas.microsoft.com/office/drawing/2010/main" w="9525">
                   <a:solidFill>
                     <a:srgbClr val="000000"/>
                   </a:solidFill>
@@ -1463,7 +1468,7 @@
             </a:ln>
             <a:extLst>
               <a:ext uri="{91240B29-F687-4f45-9708-019B960494DF}">
-                <a14:hiddenLine xmlns:a14="http://schemas.microsoft.com/office/drawing/2010/main" xmlns="" w="9525">
+                <a14:hiddenLine xmlns="" xmlns:a14="http://schemas.microsoft.com/office/drawing/2010/main" w="9525">
                   <a:solidFill>
                     <a:srgbClr val="000000"/>
                   </a:solidFill>
@@ -1525,7 +1530,7 @@
             </a:ln>
             <a:extLst>
               <a:ext uri="{91240B29-F687-4f45-9708-019B960494DF}">
-                <a14:hiddenLine xmlns:a14="http://schemas.microsoft.com/office/drawing/2010/main" xmlns="" w="9525">
+                <a14:hiddenLine xmlns="" xmlns:a14="http://schemas.microsoft.com/office/drawing/2010/main" w="9525">
                   <a:solidFill>
                     <a:srgbClr val="000000"/>
                   </a:solidFill>
@@ -1615,7 +1620,7 @@
             </a:ln>
             <a:extLst>
               <a:ext uri="{91240B29-F687-4f45-9708-019B960494DF}">
-                <a14:hiddenLine xmlns:a14="http://schemas.microsoft.com/office/drawing/2010/main" xmlns="" w="9525">
+                <a14:hiddenLine xmlns="" xmlns:a14="http://schemas.microsoft.com/office/drawing/2010/main" w="9525">
                   <a:solidFill>
                     <a:srgbClr val="000000"/>
                   </a:solidFill>
@@ -1705,7 +1710,7 @@
             </a:ln>
             <a:extLst>
               <a:ext uri="{91240B29-F687-4f45-9708-019B960494DF}">
-                <a14:hiddenLine xmlns:a14="http://schemas.microsoft.com/office/drawing/2010/main" xmlns="" w="9525">
+                <a14:hiddenLine xmlns="" xmlns:a14="http://schemas.microsoft.com/office/drawing/2010/main" w="9525">
                   <a:solidFill>
                     <a:srgbClr val="000000"/>
                   </a:solidFill>
@@ -1761,7 +1766,7 @@
             </a:ln>
             <a:extLst>
               <a:ext uri="{91240B29-F687-4f45-9708-019B960494DF}">
-                <a14:hiddenLine xmlns:a14="http://schemas.microsoft.com/office/drawing/2010/main" xmlns="" w="9525">
+                <a14:hiddenLine xmlns="" xmlns:a14="http://schemas.microsoft.com/office/drawing/2010/main" w="9525">
                   <a:solidFill>
                     <a:srgbClr val="000000"/>
                   </a:solidFill>
@@ -1851,7 +1856,7 @@
             </a:ln>
             <a:extLst>
               <a:ext uri="{91240B29-F687-4f45-9708-019B960494DF}">
-                <a14:hiddenLine xmlns:a14="http://schemas.microsoft.com/office/drawing/2010/main" xmlns="" w="9525">
+                <a14:hiddenLine xmlns="" xmlns:a14="http://schemas.microsoft.com/office/drawing/2010/main" w="9525">
                   <a:solidFill>
                     <a:srgbClr val="000000"/>
                   </a:solidFill>
@@ -1907,7 +1912,7 @@
             </a:ln>
             <a:extLst>
               <a:ext uri="{91240B29-F687-4f45-9708-019B960494DF}">
-                <a14:hiddenLine xmlns:a14="http://schemas.microsoft.com/office/drawing/2010/main" xmlns="" w="9525">
+                <a14:hiddenLine xmlns="" xmlns:a14="http://schemas.microsoft.com/office/drawing/2010/main" w="9525">
                   <a:solidFill>
                     <a:srgbClr val="000000"/>
                   </a:solidFill>
@@ -1997,7 +2002,7 @@
             </a:ln>
             <a:extLst>
               <a:ext uri="{91240B29-F687-4f45-9708-019B960494DF}">
-                <a14:hiddenLine xmlns:a14="http://schemas.microsoft.com/office/drawing/2010/main" xmlns="" w="9525">
+                <a14:hiddenLine xmlns="" xmlns:a14="http://schemas.microsoft.com/office/drawing/2010/main" w="9525">
                   <a:solidFill>
                     <a:srgbClr val="000000"/>
                   </a:solidFill>
@@ -2065,7 +2070,7 @@
             </a:ln>
             <a:extLst>
               <a:ext uri="{91240B29-F687-4f45-9708-019B960494DF}">
-                <a14:hiddenLine xmlns:a14="http://schemas.microsoft.com/office/drawing/2010/main" xmlns="" w="9525">
+                <a14:hiddenLine xmlns="" xmlns:a14="http://schemas.microsoft.com/office/drawing/2010/main" w="9525">
                   <a:solidFill>
                     <a:srgbClr val="000000"/>
                   </a:solidFill>
@@ -2155,7 +2160,7 @@
             </a:ln>
             <a:extLst>
               <a:ext uri="{91240B29-F687-4f45-9708-019B960494DF}">
-                <a14:hiddenLine xmlns:a14="http://schemas.microsoft.com/office/drawing/2010/main" xmlns="" w="9525">
+                <a14:hiddenLine xmlns="" xmlns:a14="http://schemas.microsoft.com/office/drawing/2010/main" w="9525">
                   <a:solidFill>
                     <a:srgbClr val="000000"/>
                   </a:solidFill>
@@ -2223,7 +2228,7 @@
             </a:ln>
             <a:extLst>
               <a:ext uri="{91240B29-F687-4f45-9708-019B960494DF}">
-                <a14:hiddenLine xmlns:a14="http://schemas.microsoft.com/office/drawing/2010/main" xmlns="" w="9525">
+                <a14:hiddenLine xmlns="" xmlns:a14="http://schemas.microsoft.com/office/drawing/2010/main" w="9525">
                   <a:solidFill>
                     <a:srgbClr val="000000"/>
                   </a:solidFill>
@@ -2313,7 +2318,7 @@
             </a:ln>
             <a:extLst>
               <a:ext uri="{91240B29-F687-4f45-9708-019B960494DF}">
-                <a14:hiddenLine xmlns:a14="http://schemas.microsoft.com/office/drawing/2010/main" xmlns="" w="9525">
+                <a14:hiddenLine xmlns="" xmlns:a14="http://schemas.microsoft.com/office/drawing/2010/main" w="9525">
                   <a:solidFill>
                     <a:srgbClr val="000000"/>
                   </a:solidFill>
@@ -2347,7 +2352,7 @@
             </a:ln>
             <a:extLst>
               <a:ext uri="{91240B29-F687-4f45-9708-019B960494DF}">
-                <a14:hiddenLine xmlns:a14="http://schemas.microsoft.com/office/drawing/2010/main" xmlns="" w="9525">
+                <a14:hiddenLine xmlns="" xmlns:a14="http://schemas.microsoft.com/office/drawing/2010/main" w="9525">
                   <a:solidFill>
                     <a:srgbClr val="000000"/>
                   </a:solidFill>
@@ -2437,7 +2442,7 @@
             </a:ln>
             <a:extLst>
               <a:ext uri="{91240B29-F687-4f45-9708-019B960494DF}">
-                <a14:hiddenLine xmlns:a14="http://schemas.microsoft.com/office/drawing/2010/main" xmlns="" w="9525">
+                <a14:hiddenLine xmlns="" xmlns:a14="http://schemas.microsoft.com/office/drawing/2010/main" w="9525">
                   <a:solidFill>
                     <a:srgbClr val="000000"/>
                   </a:solidFill>
@@ -2499,7 +2504,7 @@
             </a:ln>
             <a:extLst>
               <a:ext uri="{91240B29-F687-4f45-9708-019B960494DF}">
-                <a14:hiddenLine xmlns:a14="http://schemas.microsoft.com/office/drawing/2010/main" xmlns="" w="9525">
+                <a14:hiddenLine xmlns="" xmlns:a14="http://schemas.microsoft.com/office/drawing/2010/main" w="9525">
                   <a:solidFill>
                     <a:srgbClr val="000000"/>
                   </a:solidFill>
@@ -2561,7 +2566,7 @@
             </a:ln>
             <a:extLst>
               <a:ext uri="{91240B29-F687-4f45-9708-019B960494DF}">
-                <a14:hiddenLine xmlns:a14="http://schemas.microsoft.com/office/drawing/2010/main" xmlns="" w="9525">
+                <a14:hiddenLine xmlns="" xmlns:a14="http://schemas.microsoft.com/office/drawing/2010/main" w="9525">
                   <a:solidFill>
                     <a:srgbClr val="000000"/>
                   </a:solidFill>
@@ -2651,7 +2656,7 @@
             </a:ln>
             <a:extLst>
               <a:ext uri="{91240B29-F687-4f45-9708-019B960494DF}">
-                <a14:hiddenLine xmlns:a14="http://schemas.microsoft.com/office/drawing/2010/main" xmlns="" w="9525">
+                <a14:hiddenLine xmlns="" xmlns:a14="http://schemas.microsoft.com/office/drawing/2010/main" w="9525">
                   <a:solidFill>
                     <a:srgbClr val="000000"/>
                   </a:solidFill>
@@ -2719,7 +2724,7 @@
             </a:ln>
             <a:extLst>
               <a:ext uri="{91240B29-F687-4f45-9708-019B960494DF}">
-                <a14:hiddenLine xmlns:a14="http://schemas.microsoft.com/office/drawing/2010/main" xmlns="" w="9525">
+                <a14:hiddenLine xmlns="" xmlns:a14="http://schemas.microsoft.com/office/drawing/2010/main" w="9525">
                   <a:solidFill>
                     <a:srgbClr val="000000"/>
                   </a:solidFill>
@@ -2781,7 +2786,7 @@
             </a:ln>
             <a:extLst>
               <a:ext uri="{91240B29-F687-4f45-9708-019B960494DF}">
-                <a14:hiddenLine xmlns:a14="http://schemas.microsoft.com/office/drawing/2010/main" xmlns="" w="9525">
+                <a14:hiddenLine xmlns="" xmlns:a14="http://schemas.microsoft.com/office/drawing/2010/main" w="9525">
                   <a:solidFill>
                     <a:srgbClr val="000000"/>
                   </a:solidFill>
@@ -2871,7 +2876,7 @@
             </a:ln>
             <a:extLst>
               <a:ext uri="{91240B29-F687-4f45-9708-019B960494DF}">
-                <a14:hiddenLine xmlns:a14="http://schemas.microsoft.com/office/drawing/2010/main" xmlns="" w="9525">
+                <a14:hiddenLine xmlns="" xmlns:a14="http://schemas.microsoft.com/office/drawing/2010/main" w="9525">
                   <a:solidFill>
                     <a:srgbClr val="000000"/>
                   </a:solidFill>
@@ -2933,7 +2938,7 @@
             </a:ln>
             <a:extLst>
               <a:ext uri="{91240B29-F687-4f45-9708-019B960494DF}">
-                <a14:hiddenLine xmlns:a14="http://schemas.microsoft.com/office/drawing/2010/main" xmlns="" w="9525">
+                <a14:hiddenLine xmlns="" xmlns:a14="http://schemas.microsoft.com/office/drawing/2010/main" w="9525">
                   <a:solidFill>
                     <a:srgbClr val="000000"/>
                   </a:solidFill>
@@ -3023,7 +3028,7 @@
             </a:ln>
             <a:extLst>
               <a:ext uri="{91240B29-F687-4f45-9708-019B960494DF}">
-                <a14:hiddenLine xmlns:a14="http://schemas.microsoft.com/office/drawing/2010/main" xmlns="" w="9525">
+                <a14:hiddenLine xmlns="" xmlns:a14="http://schemas.microsoft.com/office/drawing/2010/main" w="9525">
                   <a:solidFill>
                     <a:srgbClr val="000000"/>
                   </a:solidFill>
@@ -3085,7 +3090,7 @@
             </a:ln>
             <a:extLst>
               <a:ext uri="{91240B29-F687-4f45-9708-019B960494DF}">
-                <a14:hiddenLine xmlns:a14="http://schemas.microsoft.com/office/drawing/2010/main" xmlns="" w="9525">
+                <a14:hiddenLine xmlns="" xmlns:a14="http://schemas.microsoft.com/office/drawing/2010/main" w="9525">
                   <a:solidFill>
                     <a:srgbClr val="000000"/>
                   </a:solidFill>
@@ -3175,7 +3180,7 @@
             </a:ln>
             <a:extLst>
               <a:ext uri="{91240B29-F687-4f45-9708-019B960494DF}">
-                <a14:hiddenLine xmlns:a14="http://schemas.microsoft.com/office/drawing/2010/main" xmlns="" w="9525">
+                <a14:hiddenLine xmlns="" xmlns:a14="http://schemas.microsoft.com/office/drawing/2010/main" w="9525">
                   <a:solidFill>
                     <a:srgbClr val="000000"/>
                   </a:solidFill>
@@ -3209,7 +3214,7 @@
             </a:ln>
             <a:extLst>
               <a:ext uri="{91240B29-F687-4f45-9708-019B960494DF}">
-                <a14:hiddenLine xmlns:a14="http://schemas.microsoft.com/office/drawing/2010/main" xmlns="" w="9525">
+                <a14:hiddenLine xmlns="" xmlns:a14="http://schemas.microsoft.com/office/drawing/2010/main" w="9525">
                   <a:solidFill>
                     <a:srgbClr val="000000"/>
                   </a:solidFill>
@@ -3274,7 +3279,7 @@
             </a:ln>
             <a:extLst>
               <a:ext uri="{91240B29-F687-4f45-9708-019B960494DF}">
-                <a14:hiddenLine xmlns:a14="http://schemas.microsoft.com/office/drawing/2010/main" xmlns="" w="9525">
+                <a14:hiddenLine xmlns="" xmlns:a14="http://schemas.microsoft.com/office/drawing/2010/main" w="9525">
                   <a:solidFill>
                     <a:srgbClr val="000000"/>
                   </a:solidFill>
@@ -3364,7 +3369,7 @@
             </a:ln>
             <a:extLst>
               <a:ext uri="{91240B29-F687-4f45-9708-019B960494DF}">
-                <a14:hiddenLine xmlns:a14="http://schemas.microsoft.com/office/drawing/2010/main" xmlns="" w="9525">
+                <a14:hiddenLine xmlns="" xmlns:a14="http://schemas.microsoft.com/office/drawing/2010/main" w="9525">
                   <a:solidFill>
                     <a:srgbClr val="000000"/>
                   </a:solidFill>
@@ -3426,7 +3431,7 @@
             </a:ln>
             <a:extLst>
               <a:ext uri="{91240B29-F687-4f45-9708-019B960494DF}">
-                <a14:hiddenLine xmlns:a14="http://schemas.microsoft.com/office/drawing/2010/main" xmlns="" w="9525">
+                <a14:hiddenLine xmlns="" xmlns:a14="http://schemas.microsoft.com/office/drawing/2010/main" w="9525">
                   <a:solidFill>
                     <a:srgbClr val="000000"/>
                   </a:solidFill>
@@ -3516,7 +3521,7 @@
             </a:ln>
             <a:extLst>
               <a:ext uri="{91240B29-F687-4f45-9708-019B960494DF}">
-                <a14:hiddenLine xmlns:a14="http://schemas.microsoft.com/office/drawing/2010/main" xmlns="" w="9525">
+                <a14:hiddenLine xmlns="" xmlns:a14="http://schemas.microsoft.com/office/drawing/2010/main" w="9525">
                   <a:solidFill>
                     <a:srgbClr val="000000"/>
                   </a:solidFill>
@@ -3606,7 +3611,7 @@
             </a:ln>
             <a:extLst>
               <a:ext uri="{91240B29-F687-4f45-9708-019B960494DF}">
-                <a14:hiddenLine xmlns:a14="http://schemas.microsoft.com/office/drawing/2010/main" xmlns="" w="9525">
+                <a14:hiddenLine xmlns="" xmlns:a14="http://schemas.microsoft.com/office/drawing/2010/main" w="9525">
                   <a:solidFill>
                     <a:srgbClr val="000000"/>
                   </a:solidFill>
@@ -3671,7 +3676,7 @@
             </a:ln>
             <a:extLst>
               <a:ext uri="{91240B29-F687-4f45-9708-019B960494DF}">
-                <a14:hiddenLine xmlns:a14="http://schemas.microsoft.com/office/drawing/2010/main" xmlns="" w="9525">
+                <a14:hiddenLine xmlns="" xmlns:a14="http://schemas.microsoft.com/office/drawing/2010/main" w="9525">
                   <a:solidFill>
                     <a:srgbClr val="000000"/>
                   </a:solidFill>
@@ -3733,7 +3738,7 @@
             </a:ln>
             <a:extLst>
               <a:ext uri="{91240B29-F687-4f45-9708-019B960494DF}">
-                <a14:hiddenLine xmlns:a14="http://schemas.microsoft.com/office/drawing/2010/main" xmlns="" w="9525">
+                <a14:hiddenLine xmlns="" xmlns:a14="http://schemas.microsoft.com/office/drawing/2010/main" w="9525">
                   <a:solidFill>
                     <a:srgbClr val="000000"/>
                   </a:solidFill>
@@ -3823,7 +3828,7 @@
             </a:ln>
             <a:extLst>
               <a:ext uri="{91240B29-F687-4f45-9708-019B960494DF}">
-                <a14:hiddenLine xmlns:a14="http://schemas.microsoft.com/office/drawing/2010/main" xmlns="" w="9525">
+                <a14:hiddenLine xmlns="" xmlns:a14="http://schemas.microsoft.com/office/drawing/2010/main" w="9525">
                   <a:solidFill>
                     <a:srgbClr val="000000"/>
                   </a:solidFill>
@@ -3913,7 +3918,7 @@
             </a:ln>
             <a:extLst>
               <a:ext uri="{91240B29-F687-4f45-9708-019B960494DF}">
-                <a14:hiddenLine xmlns:a14="http://schemas.microsoft.com/office/drawing/2010/main" xmlns="" w="9525">
+                <a14:hiddenLine xmlns="" xmlns:a14="http://schemas.microsoft.com/office/drawing/2010/main" w="9525">
                   <a:solidFill>
                     <a:srgbClr val="000000"/>
                   </a:solidFill>
@@ -3975,7 +3980,7 @@
             </a:ln>
             <a:extLst>
               <a:ext uri="{91240B29-F687-4f45-9708-019B960494DF}">
-                <a14:hiddenLine xmlns:a14="http://schemas.microsoft.com/office/drawing/2010/main" xmlns="" w="9525">
+                <a14:hiddenLine xmlns="" xmlns:a14="http://schemas.microsoft.com/office/drawing/2010/main" w="9525">
                   <a:solidFill>
                     <a:srgbClr val="000000"/>
                   </a:solidFill>
@@ -4095,7 +4100,7 @@
             </a:ln>
             <a:extLst>
               <a:ext uri="{91240B29-F687-4f45-9708-019B960494DF}">
-                <a14:hiddenLine xmlns:a14="http://schemas.microsoft.com/office/drawing/2010/main" xmlns="" w="9525">
+                <a14:hiddenLine xmlns="" xmlns:a14="http://schemas.microsoft.com/office/drawing/2010/main" w="9525">
                   <a:solidFill>
                     <a:srgbClr val="000000"/>
                   </a:solidFill>
@@ -4163,7 +4168,7 @@
             </a:ln>
             <a:extLst>
               <a:ext uri="{91240B29-F687-4f45-9708-019B960494DF}">
-                <a14:hiddenLine xmlns:a14="http://schemas.microsoft.com/office/drawing/2010/main" xmlns="" w="9525">
+                <a14:hiddenLine xmlns="" xmlns:a14="http://schemas.microsoft.com/office/drawing/2010/main" w="9525">
                   <a:solidFill>
                     <a:srgbClr val="000000"/>
                   </a:solidFill>
@@ -4253,7 +4258,7 @@
             </a:ln>
             <a:extLst>
               <a:ext uri="{91240B29-F687-4f45-9708-019B960494DF}">
-                <a14:hiddenLine xmlns:a14="http://schemas.microsoft.com/office/drawing/2010/main" xmlns="" w="9525">
+                <a14:hiddenLine xmlns="" xmlns:a14="http://schemas.microsoft.com/office/drawing/2010/main" w="9525">
                   <a:solidFill>
                     <a:srgbClr val="000000"/>
                   </a:solidFill>
@@ -4445,7 +4450,7 @@
           <a:p>
             <a:fld id="{7DD5646B-C8CF-491B-96CF-450177873F53}" type="slidenum">
               <a:rPr lang="fr-CA" smtClean="0"/>
-              <a:t>‹#›</a:t>
+              <a:t>‹N°›</a:t>
             </a:fld>
             <a:endParaRPr lang="fr-CA"/>
           </a:p>
@@ -4702,7 +4707,7 @@
           <a:p>
             <a:fld id="{7DD5646B-C8CF-491B-96CF-450177873F53}" type="slidenum">
               <a:rPr lang="fr-CA" smtClean="0"/>
-              <a:t>‹#›</a:t>
+              <a:t>‹N°›</a:t>
             </a:fld>
             <a:endParaRPr lang="fr-CA"/>
           </a:p>
@@ -4898,7 +4903,7 @@
           <a:p>
             <a:fld id="{7DD5646B-C8CF-491B-96CF-450177873F53}" type="slidenum">
               <a:rPr lang="fr-CA" smtClean="0"/>
-              <a:t>‹#›</a:t>
+              <a:t>‹N°›</a:t>
             </a:fld>
             <a:endParaRPr lang="fr-CA"/>
           </a:p>
@@ -5161,7 +5166,7 @@
           <a:p>
             <a:fld id="{7DD5646B-C8CF-491B-96CF-450177873F53}" type="slidenum">
               <a:rPr lang="fr-CA" smtClean="0"/>
-              <a:t>‹#›</a:t>
+              <a:t>‹N°›</a:t>
             </a:fld>
             <a:endParaRPr lang="fr-CA"/>
           </a:p>
@@ -5595,7 +5600,7 @@
           <a:p>
             <a:fld id="{7DD5646B-C8CF-491B-96CF-450177873F53}" type="slidenum">
               <a:rPr lang="fr-CA" smtClean="0"/>
-              <a:t>‹#›</a:t>
+              <a:t>‹N°›</a:t>
             </a:fld>
             <a:endParaRPr lang="fr-CA"/>
           </a:p>
@@ -6141,7 +6146,7 @@
           <a:p>
             <a:fld id="{7DD5646B-C8CF-491B-96CF-450177873F53}" type="slidenum">
               <a:rPr lang="fr-CA" smtClean="0"/>
-              <a:t>‹#›</a:t>
+              <a:t>‹N°›</a:t>
             </a:fld>
             <a:endParaRPr lang="fr-CA"/>
           </a:p>
@@ -6861,7 +6866,7 @@
           <a:p>
             <a:fld id="{7DD5646B-C8CF-491B-96CF-450177873F53}" type="slidenum">
               <a:rPr lang="fr-CA" smtClean="0"/>
-              <a:t>‹#›</a:t>
+              <a:t>‹N°›</a:t>
             </a:fld>
             <a:endParaRPr lang="fr-CA"/>
           </a:p>
@@ -7031,7 +7036,7 @@
           <a:p>
             <a:fld id="{7DD5646B-C8CF-491B-96CF-450177873F53}" type="slidenum">
               <a:rPr lang="fr-CA" smtClean="0"/>
-              <a:t>‹#›</a:t>
+              <a:t>‹N°›</a:t>
             </a:fld>
             <a:endParaRPr lang="fr-CA"/>
           </a:p>
@@ -7211,7 +7216,7 @@
           <a:p>
             <a:fld id="{7DD5646B-C8CF-491B-96CF-450177873F53}" type="slidenum">
               <a:rPr lang="fr-CA" smtClean="0"/>
-              <a:t>‹#›</a:t>
+              <a:t>‹N°›</a:t>
             </a:fld>
             <a:endParaRPr lang="fr-CA"/>
           </a:p>
@@ -7381,7 +7386,7 @@
           <a:p>
             <a:fld id="{7DD5646B-C8CF-491B-96CF-450177873F53}" type="slidenum">
               <a:rPr lang="fr-CA" smtClean="0"/>
-              <a:t>‹#›</a:t>
+              <a:t>‹N°›</a:t>
             </a:fld>
             <a:endParaRPr lang="fr-CA"/>
           </a:p>
@@ -7631,7 +7636,7 @@
           <a:p>
             <a:fld id="{7DD5646B-C8CF-491B-96CF-450177873F53}" type="slidenum">
               <a:rPr lang="fr-CA" smtClean="0"/>
-              <a:t>‹#›</a:t>
+              <a:t>‹N°›</a:t>
             </a:fld>
             <a:endParaRPr lang="fr-CA"/>
           </a:p>
@@ -7863,7 +7868,7 @@
           <a:p>
             <a:fld id="{7DD5646B-C8CF-491B-96CF-450177873F53}" type="slidenum">
               <a:rPr lang="fr-CA" smtClean="0"/>
-              <a:t>‹#›</a:t>
+              <a:t>‹N°›</a:t>
             </a:fld>
             <a:endParaRPr lang="fr-CA"/>
           </a:p>
@@ -8244,7 +8249,7 @@
           <a:p>
             <a:fld id="{7DD5646B-C8CF-491B-96CF-450177873F53}" type="slidenum">
               <a:rPr lang="fr-CA" smtClean="0"/>
-              <a:t>‹#›</a:t>
+              <a:t>‹N°›</a:t>
             </a:fld>
             <a:endParaRPr lang="fr-CA"/>
           </a:p>
@@ -8362,7 +8367,7 @@
           <a:p>
             <a:fld id="{7DD5646B-C8CF-491B-96CF-450177873F53}" type="slidenum">
               <a:rPr lang="fr-CA" smtClean="0"/>
-              <a:t>‹#›</a:t>
+              <a:t>‹N°›</a:t>
             </a:fld>
             <a:endParaRPr lang="fr-CA"/>
           </a:p>
@@ -8457,7 +8462,7 @@
           <a:p>
             <a:fld id="{7DD5646B-C8CF-491B-96CF-450177873F53}" type="slidenum">
               <a:rPr lang="fr-CA" smtClean="0"/>
-              <a:t>‹#›</a:t>
+              <a:t>‹N°›</a:t>
             </a:fld>
             <a:endParaRPr lang="fr-CA"/>
           </a:p>
@@ -8706,7 +8711,7 @@
           <a:p>
             <a:fld id="{7DD5646B-C8CF-491B-96CF-450177873F53}" type="slidenum">
               <a:rPr lang="fr-CA" smtClean="0"/>
-              <a:t>‹#›</a:t>
+              <a:t>‹N°›</a:t>
             </a:fld>
             <a:endParaRPr lang="fr-CA"/>
           </a:p>
@@ -8986,7 +8991,7 @@
           <a:p>
             <a:fld id="{7DD5646B-C8CF-491B-96CF-450177873F53}" type="slidenum">
               <a:rPr lang="fr-CA" smtClean="0"/>
-              <a:t>‹#›</a:t>
+              <a:t>‹N°›</a:t>
             </a:fld>
             <a:endParaRPr lang="fr-CA"/>
           </a:p>
@@ -9060,7 +9065,7 @@
           <a:noFill/>
           <a:extLst>
             <a:ext uri="{909E8E84-426E-40dd-AFC4-6F175D3DCCD1}">
-              <a14:hiddenFill xmlns:a14="http://schemas.microsoft.com/office/drawing/2010/main" xmlns="">
+              <a14:hiddenFill xmlns="" xmlns:a14="http://schemas.microsoft.com/office/drawing/2010/main">
                 <a:solidFill>
                   <a:srgbClr val="FFFFFF"/>
                 </a:solidFill>
@@ -9134,7 +9139,7 @@
               </a:ln>
               <a:extLst>
                 <a:ext uri="{91240B29-F687-4f45-9708-019B960494DF}">
-                  <a14:hiddenLine xmlns:a14="http://schemas.microsoft.com/office/drawing/2010/main" xmlns="" w="9525">
+                  <a14:hiddenLine xmlns="" xmlns:a14="http://schemas.microsoft.com/office/drawing/2010/main" w="9525">
                     <a:solidFill>
                       <a:srgbClr val="000000"/>
                     </a:solidFill>
@@ -9224,7 +9229,7 @@
               </a:ln>
               <a:extLst>
                 <a:ext uri="{91240B29-F687-4f45-9708-019B960494DF}">
-                  <a14:hiddenLine xmlns:a14="http://schemas.microsoft.com/office/drawing/2010/main" xmlns="" w="9525">
+                  <a14:hiddenLine xmlns="" xmlns:a14="http://schemas.microsoft.com/office/drawing/2010/main" w="9525">
                     <a:solidFill>
                       <a:srgbClr val="000000"/>
                     </a:solidFill>
@@ -9314,7 +9319,7 @@
               </a:ln>
               <a:extLst>
                 <a:ext uri="{91240B29-F687-4f45-9708-019B960494DF}">
-                  <a14:hiddenLine xmlns:a14="http://schemas.microsoft.com/office/drawing/2010/main" xmlns="" w="9525">
+                  <a14:hiddenLine xmlns="" xmlns:a14="http://schemas.microsoft.com/office/drawing/2010/main" w="9525">
                     <a:solidFill>
                       <a:srgbClr val="000000"/>
                     </a:solidFill>
@@ -9376,7 +9381,7 @@
               </a:ln>
               <a:extLst>
                 <a:ext uri="{91240B29-F687-4f45-9708-019B960494DF}">
-                  <a14:hiddenLine xmlns:a14="http://schemas.microsoft.com/office/drawing/2010/main" xmlns="" w="9525">
+                  <a14:hiddenLine xmlns="" xmlns:a14="http://schemas.microsoft.com/office/drawing/2010/main" w="9525">
                     <a:solidFill>
                       <a:srgbClr val="000000"/>
                     </a:solidFill>
@@ -9466,7 +9471,7 @@
               </a:ln>
               <a:extLst>
                 <a:ext uri="{91240B29-F687-4f45-9708-019B960494DF}">
-                  <a14:hiddenLine xmlns:a14="http://schemas.microsoft.com/office/drawing/2010/main" xmlns="" w="9525">
+                  <a14:hiddenLine xmlns="" xmlns:a14="http://schemas.microsoft.com/office/drawing/2010/main" w="9525">
                     <a:solidFill>
                       <a:srgbClr val="000000"/>
                     </a:solidFill>
@@ -9528,7 +9533,7 @@
               </a:ln>
               <a:extLst>
                 <a:ext uri="{91240B29-F687-4f45-9708-019B960494DF}">
-                  <a14:hiddenLine xmlns:a14="http://schemas.microsoft.com/office/drawing/2010/main" xmlns="" w="9525">
+                  <a14:hiddenLine xmlns="" xmlns:a14="http://schemas.microsoft.com/office/drawing/2010/main" w="9525">
                     <a:solidFill>
                       <a:srgbClr val="000000"/>
                     </a:solidFill>
@@ -9590,7 +9595,7 @@
               </a:ln>
               <a:extLst>
                 <a:ext uri="{91240B29-F687-4f45-9708-019B960494DF}">
-                  <a14:hiddenLine xmlns:a14="http://schemas.microsoft.com/office/drawing/2010/main" xmlns="" w="9525">
+                  <a14:hiddenLine xmlns="" xmlns:a14="http://schemas.microsoft.com/office/drawing/2010/main" w="9525">
                     <a:solidFill>
                       <a:srgbClr val="000000"/>
                     </a:solidFill>
@@ -9680,7 +9685,7 @@
               </a:ln>
               <a:extLst>
                 <a:ext uri="{91240B29-F687-4f45-9708-019B960494DF}">
-                  <a14:hiddenLine xmlns:a14="http://schemas.microsoft.com/office/drawing/2010/main" xmlns="" w="9525">
+                  <a14:hiddenLine xmlns="" xmlns:a14="http://schemas.microsoft.com/office/drawing/2010/main" w="9525">
                     <a:solidFill>
                       <a:srgbClr val="000000"/>
                     </a:solidFill>
@@ -9770,7 +9775,7 @@
               </a:ln>
               <a:extLst>
                 <a:ext uri="{91240B29-F687-4f45-9708-019B960494DF}">
-                  <a14:hiddenLine xmlns:a14="http://schemas.microsoft.com/office/drawing/2010/main" xmlns="" w="9525">
+                  <a14:hiddenLine xmlns="" xmlns:a14="http://schemas.microsoft.com/office/drawing/2010/main" w="9525">
                     <a:solidFill>
                       <a:srgbClr val="000000"/>
                     </a:solidFill>
@@ -9832,7 +9837,7 @@
               </a:ln>
               <a:extLst>
                 <a:ext uri="{91240B29-F687-4f45-9708-019B960494DF}">
-                  <a14:hiddenLine xmlns:a14="http://schemas.microsoft.com/office/drawing/2010/main" xmlns="" w="9525">
+                  <a14:hiddenLine xmlns="" xmlns:a14="http://schemas.microsoft.com/office/drawing/2010/main" w="9525">
                     <a:solidFill>
                       <a:srgbClr val="000000"/>
                     </a:solidFill>
@@ -9942,7 +9947,7 @@
               </a:ln>
               <a:extLst>
                 <a:ext uri="{91240B29-F687-4f45-9708-019B960494DF}">
-                  <a14:hiddenLine xmlns:a14="http://schemas.microsoft.com/office/drawing/2010/main" xmlns="" w="9525">
+                  <a14:hiddenLine xmlns="" xmlns:a14="http://schemas.microsoft.com/office/drawing/2010/main" w="9525">
                     <a:solidFill>
                       <a:srgbClr val="000000"/>
                     </a:solidFill>
@@ -10026,7 +10031,7 @@
               </a:ln>
               <a:extLst>
                 <a:ext uri="{91240B29-F687-4f45-9708-019B960494DF}">
-                  <a14:hiddenLine xmlns:a14="http://schemas.microsoft.com/office/drawing/2010/main" xmlns="" w="9525">
+                  <a14:hiddenLine xmlns="" xmlns:a14="http://schemas.microsoft.com/office/drawing/2010/main" w="9525">
                     <a:solidFill>
                       <a:srgbClr val="000000"/>
                     </a:solidFill>
@@ -10088,7 +10093,7 @@
               </a:ln>
               <a:extLst>
                 <a:ext uri="{91240B29-F687-4f45-9708-019B960494DF}">
-                  <a14:hiddenLine xmlns:a14="http://schemas.microsoft.com/office/drawing/2010/main" xmlns="" w="9525">
+                  <a14:hiddenLine xmlns="" xmlns:a14="http://schemas.microsoft.com/office/drawing/2010/main" w="9525">
                     <a:solidFill>
                       <a:srgbClr val="000000"/>
                     </a:solidFill>
@@ -10150,7 +10155,7 @@
               </a:ln>
               <a:extLst>
                 <a:ext uri="{91240B29-F687-4f45-9708-019B960494DF}">
-                  <a14:hiddenLine xmlns:a14="http://schemas.microsoft.com/office/drawing/2010/main" xmlns="" w="9525">
+                  <a14:hiddenLine xmlns="" xmlns:a14="http://schemas.microsoft.com/office/drawing/2010/main" w="9525">
                     <a:solidFill>
                       <a:srgbClr val="000000"/>
                     </a:solidFill>
@@ -10240,7 +10245,7 @@
               </a:ln>
               <a:extLst>
                 <a:ext uri="{91240B29-F687-4f45-9708-019B960494DF}">
-                  <a14:hiddenLine xmlns:a14="http://schemas.microsoft.com/office/drawing/2010/main" xmlns="" w="9525">
+                  <a14:hiddenLine xmlns="" xmlns:a14="http://schemas.microsoft.com/office/drawing/2010/main" w="9525">
                     <a:solidFill>
                       <a:srgbClr val="000000"/>
                     </a:solidFill>
@@ -10274,7 +10279,7 @@
               </a:ln>
               <a:extLst>
                 <a:ext uri="{91240B29-F687-4f45-9708-019B960494DF}">
-                  <a14:hiddenLine xmlns:a14="http://schemas.microsoft.com/office/drawing/2010/main" xmlns="" w="9525">
+                  <a14:hiddenLine xmlns="" xmlns:a14="http://schemas.microsoft.com/office/drawing/2010/main" w="9525">
                     <a:solidFill>
                       <a:srgbClr val="000000"/>
                     </a:solidFill>
@@ -10339,7 +10344,7 @@
               </a:ln>
               <a:extLst>
                 <a:ext uri="{91240B29-F687-4f45-9708-019B960494DF}">
-                  <a14:hiddenLine xmlns:a14="http://schemas.microsoft.com/office/drawing/2010/main" xmlns="" w="9525">
+                  <a14:hiddenLine xmlns="" xmlns:a14="http://schemas.microsoft.com/office/drawing/2010/main" w="9525">
                     <a:solidFill>
                       <a:srgbClr val="000000"/>
                     </a:solidFill>
@@ -10429,7 +10434,7 @@
               </a:ln>
               <a:extLst>
                 <a:ext uri="{91240B29-F687-4f45-9708-019B960494DF}">
-                  <a14:hiddenLine xmlns:a14="http://schemas.microsoft.com/office/drawing/2010/main" xmlns="" w="9525">
+                  <a14:hiddenLine xmlns="" xmlns:a14="http://schemas.microsoft.com/office/drawing/2010/main" w="9525">
                     <a:solidFill>
                       <a:srgbClr val="000000"/>
                     </a:solidFill>
@@ -10491,7 +10496,7 @@
               </a:ln>
               <a:extLst>
                 <a:ext uri="{91240B29-F687-4f45-9708-019B960494DF}">
-                  <a14:hiddenLine xmlns:a14="http://schemas.microsoft.com/office/drawing/2010/main" xmlns="" w="9525">
+                  <a14:hiddenLine xmlns="" xmlns:a14="http://schemas.microsoft.com/office/drawing/2010/main" w="9525">
                     <a:solidFill>
                       <a:srgbClr val="000000"/>
                     </a:solidFill>
@@ -10581,7 +10586,7 @@
               </a:ln>
               <a:extLst>
                 <a:ext uri="{91240B29-F687-4f45-9708-019B960494DF}">
-                  <a14:hiddenLine xmlns:a14="http://schemas.microsoft.com/office/drawing/2010/main" xmlns="" w="9525">
+                  <a14:hiddenLine xmlns="" xmlns:a14="http://schemas.microsoft.com/office/drawing/2010/main" w="9525">
                     <a:solidFill>
                       <a:srgbClr val="000000"/>
                     </a:solidFill>
@@ -10646,7 +10651,7 @@
               </a:ln>
               <a:extLst>
                 <a:ext uri="{91240B29-F687-4f45-9708-019B960494DF}">
-                  <a14:hiddenLine xmlns:a14="http://schemas.microsoft.com/office/drawing/2010/main" xmlns="" w="9525">
+                  <a14:hiddenLine xmlns="" xmlns:a14="http://schemas.microsoft.com/office/drawing/2010/main" w="9525">
                     <a:solidFill>
                       <a:srgbClr val="000000"/>
                     </a:solidFill>
@@ -10708,7 +10713,7 @@
               </a:ln>
               <a:extLst>
                 <a:ext uri="{91240B29-F687-4f45-9708-019B960494DF}">
-                  <a14:hiddenLine xmlns:a14="http://schemas.microsoft.com/office/drawing/2010/main" xmlns="" w="9525">
+                  <a14:hiddenLine xmlns="" xmlns:a14="http://schemas.microsoft.com/office/drawing/2010/main" w="9525">
                     <a:solidFill>
                       <a:srgbClr val="000000"/>
                     </a:solidFill>
@@ -10798,7 +10803,7 @@
               </a:ln>
               <a:extLst>
                 <a:ext uri="{91240B29-F687-4f45-9708-019B960494DF}">
-                  <a14:hiddenLine xmlns:a14="http://schemas.microsoft.com/office/drawing/2010/main" xmlns="" w="9525">
+                  <a14:hiddenLine xmlns="" xmlns:a14="http://schemas.microsoft.com/office/drawing/2010/main" w="9525">
                     <a:solidFill>
                       <a:srgbClr val="000000"/>
                     </a:solidFill>
@@ -10888,7 +10893,7 @@
               </a:ln>
               <a:extLst>
                 <a:ext uri="{91240B29-F687-4f45-9708-019B960494DF}">
-                  <a14:hiddenLine xmlns:a14="http://schemas.microsoft.com/office/drawing/2010/main" xmlns="" w="9525">
+                  <a14:hiddenLine xmlns="" xmlns:a14="http://schemas.microsoft.com/office/drawing/2010/main" w="9525">
                     <a:solidFill>
                       <a:srgbClr val="000000"/>
                     </a:solidFill>
@@ -10953,7 +10958,7 @@
               </a:ln>
               <a:extLst>
                 <a:ext uri="{91240B29-F687-4f45-9708-019B960494DF}">
-                  <a14:hiddenLine xmlns:a14="http://schemas.microsoft.com/office/drawing/2010/main" xmlns="" w="9525">
+                  <a14:hiddenLine xmlns="" xmlns:a14="http://schemas.microsoft.com/office/drawing/2010/main" w="9525">
                     <a:solidFill>
                       <a:srgbClr val="000000"/>
                     </a:solidFill>
@@ -11073,7 +11078,7 @@
               </a:ln>
               <a:extLst>
                 <a:ext uri="{91240B29-F687-4f45-9708-019B960494DF}">
-                  <a14:hiddenLine xmlns:a14="http://schemas.microsoft.com/office/drawing/2010/main" xmlns="" w="9525">
+                  <a14:hiddenLine xmlns="" xmlns:a14="http://schemas.microsoft.com/office/drawing/2010/main" w="9525">
                     <a:solidFill>
                       <a:srgbClr val="000000"/>
                     </a:solidFill>
@@ -11171,7 +11176,7 @@
               </a:ln>
               <a:extLst>
                 <a:ext uri="{91240B29-F687-4f45-9708-019B960494DF}">
-                  <a14:hiddenLine xmlns:a14="http://schemas.microsoft.com/office/drawing/2010/main" xmlns="" w="9525">
+                  <a14:hiddenLine xmlns="" xmlns:a14="http://schemas.microsoft.com/office/drawing/2010/main" w="9525">
                     <a:solidFill>
                       <a:srgbClr val="000000"/>
                     </a:solidFill>
@@ -11286,7 +11291,7 @@
               </a:ln>
               <a:extLst>
                 <a:ext uri="{91240B29-F687-4f45-9708-019B960494DF}">
-                  <a14:hiddenLine xmlns:a14="http://schemas.microsoft.com/office/drawing/2010/main" xmlns="" w="9525">
+                  <a14:hiddenLine xmlns="" xmlns:a14="http://schemas.microsoft.com/office/drawing/2010/main" w="9525">
                     <a:solidFill>
                       <a:srgbClr val="000000"/>
                     </a:solidFill>
@@ -11376,7 +11381,7 @@
               </a:ln>
               <a:extLst>
                 <a:ext uri="{91240B29-F687-4f45-9708-019B960494DF}">
-                  <a14:hiddenLine xmlns:a14="http://schemas.microsoft.com/office/drawing/2010/main" xmlns="" w="9525">
+                  <a14:hiddenLine xmlns="" xmlns:a14="http://schemas.microsoft.com/office/drawing/2010/main" w="9525">
                     <a:solidFill>
                       <a:srgbClr val="000000"/>
                     </a:solidFill>
@@ -11441,7 +11446,7 @@
               </a:ln>
               <a:extLst>
                 <a:ext uri="{91240B29-F687-4f45-9708-019B960494DF}">
-                  <a14:hiddenLine xmlns:a14="http://schemas.microsoft.com/office/drawing/2010/main" xmlns="" w="9525">
+                  <a14:hiddenLine xmlns="" xmlns:a14="http://schemas.microsoft.com/office/drawing/2010/main" w="9525">
                     <a:solidFill>
                       <a:srgbClr val="000000"/>
                     </a:solidFill>
@@ -11531,7 +11536,7 @@
               </a:ln>
               <a:extLst>
                 <a:ext uri="{91240B29-F687-4f45-9708-019B960494DF}">
-                  <a14:hiddenLine xmlns:a14="http://schemas.microsoft.com/office/drawing/2010/main" xmlns="" w="9525">
+                  <a14:hiddenLine xmlns="" xmlns:a14="http://schemas.microsoft.com/office/drawing/2010/main" w="9525">
                     <a:solidFill>
                       <a:srgbClr val="000000"/>
                     </a:solidFill>
@@ -11599,7 +11604,7 @@
               </a:ln>
               <a:extLst>
                 <a:ext uri="{91240B29-F687-4f45-9708-019B960494DF}">
-                  <a14:hiddenLine xmlns:a14="http://schemas.microsoft.com/office/drawing/2010/main" xmlns="" w="9525">
+                  <a14:hiddenLine xmlns="" xmlns:a14="http://schemas.microsoft.com/office/drawing/2010/main" w="9525">
                     <a:solidFill>
                       <a:srgbClr val="000000"/>
                     </a:solidFill>
@@ -11689,7 +11694,7 @@
               </a:ln>
               <a:extLst>
                 <a:ext uri="{91240B29-F687-4f45-9708-019B960494DF}">
-                  <a14:hiddenLine xmlns:a14="http://schemas.microsoft.com/office/drawing/2010/main" xmlns="" w="9525">
+                  <a14:hiddenLine xmlns="" xmlns:a14="http://schemas.microsoft.com/office/drawing/2010/main" w="9525">
                     <a:solidFill>
                       <a:srgbClr val="000000"/>
                     </a:solidFill>
@@ -11757,7 +11762,7 @@
               </a:ln>
               <a:extLst>
                 <a:ext uri="{91240B29-F687-4f45-9708-019B960494DF}">
-                  <a14:hiddenLine xmlns:a14="http://schemas.microsoft.com/office/drawing/2010/main" xmlns="" w="9525">
+                  <a14:hiddenLine xmlns="" xmlns:a14="http://schemas.microsoft.com/office/drawing/2010/main" w="9525">
                     <a:solidFill>
                       <a:srgbClr val="000000"/>
                     </a:solidFill>
@@ -11847,7 +11852,7 @@
               </a:ln>
               <a:extLst>
                 <a:ext uri="{91240B29-F687-4f45-9708-019B960494DF}">
-                  <a14:hiddenLine xmlns:a14="http://schemas.microsoft.com/office/drawing/2010/main" xmlns="" w="9525">
+                  <a14:hiddenLine xmlns="" xmlns:a14="http://schemas.microsoft.com/office/drawing/2010/main" w="9525">
                     <a:solidFill>
                       <a:srgbClr val="000000"/>
                     </a:solidFill>
@@ -11881,7 +11886,7 @@
               </a:ln>
               <a:extLst>
                 <a:ext uri="{91240B29-F687-4f45-9708-019B960494DF}">
-                  <a14:hiddenLine xmlns:a14="http://schemas.microsoft.com/office/drawing/2010/main" xmlns="" w="9525">
+                  <a14:hiddenLine xmlns="" xmlns:a14="http://schemas.microsoft.com/office/drawing/2010/main" w="9525">
                     <a:solidFill>
                       <a:srgbClr val="000000"/>
                     </a:solidFill>
@@ -12099,7 +12104,7 @@
           <a:p>
             <a:fld id="{7DD5646B-C8CF-491B-96CF-450177873F53}" type="slidenum">
               <a:rPr lang="fr-CA" smtClean="0"/>
-              <a:t>‹#›</a:t>
+              <a:t>‹N°›</a:t>
             </a:fld>
             <a:endParaRPr lang="fr-CA"/>
           </a:p>
@@ -12872,7 +12877,7 @@
           <a:noFill/>
           <a:extLst>
             <a:ext uri="{909E8E84-426E-40dd-AFC4-6F175D3DCCD1}">
-              <a14:hiddenFill xmlns="" xmlns:a16="http://schemas.microsoft.com/office/drawing/2014/main" xmlns:p14="http://schemas.microsoft.com/office/powerpoint/2010/main" xmlns:a14="http://schemas.microsoft.com/office/drawing/2010/main">
+              <a14:hiddenFill xmlns:a14="http://schemas.microsoft.com/office/drawing/2010/main" xmlns:p14="http://schemas.microsoft.com/office/powerpoint/2010/main" xmlns:a16="http://schemas.microsoft.com/office/drawing/2014/main" xmlns="">
                 <a:solidFill>
                   <a:srgbClr val="FFFFFF"/>
                 </a:solidFill>
@@ -12993,7 +12998,7 @@
               </a:ln>
               <a:extLst>
                 <a:ext uri="{91240B29-F687-4f45-9708-019B960494DF}">
-                  <a14:hiddenLine xmlns="" xmlns:a16="http://schemas.microsoft.com/office/drawing/2014/main" xmlns:p14="http://schemas.microsoft.com/office/powerpoint/2010/main" xmlns:a14="http://schemas.microsoft.com/office/drawing/2010/main" w="9525">
+                  <a14:hiddenLine xmlns:a14="http://schemas.microsoft.com/office/drawing/2010/main" xmlns:p14="http://schemas.microsoft.com/office/powerpoint/2010/main" xmlns:a16="http://schemas.microsoft.com/office/drawing/2014/main" xmlns="" w="9525">
                     <a:solidFill>
                       <a:srgbClr val="000000"/>
                     </a:solidFill>
@@ -13098,7 +13103,7 @@
               </a:ln>
               <a:extLst>
                 <a:ext uri="{91240B29-F687-4f45-9708-019B960494DF}">
-                  <a14:hiddenLine xmlns="" xmlns:a16="http://schemas.microsoft.com/office/drawing/2014/main" xmlns:p14="http://schemas.microsoft.com/office/powerpoint/2010/main" xmlns:a14="http://schemas.microsoft.com/office/drawing/2010/main" w="9525">
+                  <a14:hiddenLine xmlns:a14="http://schemas.microsoft.com/office/drawing/2010/main" xmlns:p14="http://schemas.microsoft.com/office/powerpoint/2010/main" xmlns:a16="http://schemas.microsoft.com/office/drawing/2014/main" xmlns="" w="9525">
                     <a:solidFill>
                       <a:srgbClr val="000000"/>
                     </a:solidFill>
@@ -13203,7 +13208,7 @@
               </a:ln>
               <a:extLst>
                 <a:ext uri="{91240B29-F687-4f45-9708-019B960494DF}">
-                  <a14:hiddenLine xmlns="" xmlns:a16="http://schemas.microsoft.com/office/drawing/2014/main" xmlns:p14="http://schemas.microsoft.com/office/powerpoint/2010/main" xmlns:a14="http://schemas.microsoft.com/office/drawing/2010/main" w="9525">
+                  <a14:hiddenLine xmlns:a14="http://schemas.microsoft.com/office/drawing/2010/main" xmlns:p14="http://schemas.microsoft.com/office/powerpoint/2010/main" xmlns:a16="http://schemas.microsoft.com/office/drawing/2014/main" xmlns="" w="9525">
                     <a:solidFill>
                       <a:srgbClr val="000000"/>
                     </a:solidFill>
@@ -13280,7 +13285,7 @@
               </a:ln>
               <a:extLst>
                 <a:ext uri="{91240B29-F687-4f45-9708-019B960494DF}">
-                  <a14:hiddenLine xmlns="" xmlns:a16="http://schemas.microsoft.com/office/drawing/2014/main" xmlns:p14="http://schemas.microsoft.com/office/powerpoint/2010/main" xmlns:a14="http://schemas.microsoft.com/office/drawing/2010/main" w="9525">
+                  <a14:hiddenLine xmlns:a14="http://schemas.microsoft.com/office/drawing/2010/main" xmlns:p14="http://schemas.microsoft.com/office/powerpoint/2010/main" xmlns:a16="http://schemas.microsoft.com/office/drawing/2014/main" xmlns="" w="9525">
                     <a:solidFill>
                       <a:srgbClr val="000000"/>
                     </a:solidFill>
@@ -13385,7 +13390,7 @@
               </a:ln>
               <a:extLst>
                 <a:ext uri="{91240B29-F687-4f45-9708-019B960494DF}">
-                  <a14:hiddenLine xmlns="" xmlns:a16="http://schemas.microsoft.com/office/drawing/2014/main" xmlns:p14="http://schemas.microsoft.com/office/powerpoint/2010/main" xmlns:a14="http://schemas.microsoft.com/office/drawing/2010/main" w="9525">
+                  <a14:hiddenLine xmlns:a14="http://schemas.microsoft.com/office/drawing/2010/main" xmlns:p14="http://schemas.microsoft.com/office/powerpoint/2010/main" xmlns:a16="http://schemas.microsoft.com/office/drawing/2014/main" xmlns="" w="9525">
                     <a:solidFill>
                       <a:srgbClr val="000000"/>
                     </a:solidFill>
@@ -13462,7 +13467,7 @@
               </a:ln>
               <a:extLst>
                 <a:ext uri="{91240B29-F687-4f45-9708-019B960494DF}">
-                  <a14:hiddenLine xmlns="" xmlns:a16="http://schemas.microsoft.com/office/drawing/2014/main" xmlns:p14="http://schemas.microsoft.com/office/powerpoint/2010/main" xmlns:a14="http://schemas.microsoft.com/office/drawing/2010/main" w="9525">
+                  <a14:hiddenLine xmlns:a14="http://schemas.microsoft.com/office/drawing/2010/main" xmlns:p14="http://schemas.microsoft.com/office/powerpoint/2010/main" xmlns:a16="http://schemas.microsoft.com/office/drawing/2014/main" xmlns="" w="9525">
                     <a:solidFill>
                       <a:srgbClr val="000000"/>
                     </a:solidFill>
@@ -13539,7 +13544,7 @@
               </a:ln>
               <a:extLst>
                 <a:ext uri="{91240B29-F687-4f45-9708-019B960494DF}">
-                  <a14:hiddenLine xmlns="" xmlns:a16="http://schemas.microsoft.com/office/drawing/2014/main" xmlns:p14="http://schemas.microsoft.com/office/powerpoint/2010/main" xmlns:a14="http://schemas.microsoft.com/office/drawing/2010/main" w="9525">
+                  <a14:hiddenLine xmlns:a14="http://schemas.microsoft.com/office/drawing/2010/main" xmlns:p14="http://schemas.microsoft.com/office/powerpoint/2010/main" xmlns:a16="http://schemas.microsoft.com/office/drawing/2014/main" xmlns="" w="9525">
                     <a:solidFill>
                       <a:srgbClr val="000000"/>
                     </a:solidFill>
@@ -13644,7 +13649,7 @@
               </a:ln>
               <a:extLst>
                 <a:ext uri="{91240B29-F687-4f45-9708-019B960494DF}">
-                  <a14:hiddenLine xmlns="" xmlns:a16="http://schemas.microsoft.com/office/drawing/2014/main" xmlns:p14="http://schemas.microsoft.com/office/powerpoint/2010/main" xmlns:a14="http://schemas.microsoft.com/office/drawing/2010/main" w="9525">
+                  <a14:hiddenLine xmlns:a14="http://schemas.microsoft.com/office/drawing/2010/main" xmlns:p14="http://schemas.microsoft.com/office/powerpoint/2010/main" xmlns:a16="http://schemas.microsoft.com/office/drawing/2014/main" xmlns="" w="9525">
                     <a:solidFill>
                       <a:srgbClr val="000000"/>
                     </a:solidFill>
@@ -13749,7 +13754,7 @@
               </a:ln>
               <a:extLst>
                 <a:ext uri="{91240B29-F687-4f45-9708-019B960494DF}">
-                  <a14:hiddenLine xmlns="" xmlns:a16="http://schemas.microsoft.com/office/drawing/2014/main" xmlns:p14="http://schemas.microsoft.com/office/powerpoint/2010/main" xmlns:a14="http://schemas.microsoft.com/office/drawing/2010/main" w="9525">
+                  <a14:hiddenLine xmlns:a14="http://schemas.microsoft.com/office/drawing/2010/main" xmlns:p14="http://schemas.microsoft.com/office/powerpoint/2010/main" xmlns:a16="http://schemas.microsoft.com/office/drawing/2014/main" xmlns="" w="9525">
                     <a:solidFill>
                       <a:srgbClr val="000000"/>
                     </a:solidFill>
@@ -13826,7 +13831,7 @@
               </a:ln>
               <a:extLst>
                 <a:ext uri="{91240B29-F687-4f45-9708-019B960494DF}">
-                  <a14:hiddenLine xmlns="" xmlns:a16="http://schemas.microsoft.com/office/drawing/2014/main" xmlns:p14="http://schemas.microsoft.com/office/powerpoint/2010/main" xmlns:a14="http://schemas.microsoft.com/office/drawing/2010/main" w="9525">
+                  <a14:hiddenLine xmlns:a14="http://schemas.microsoft.com/office/drawing/2010/main" xmlns:p14="http://schemas.microsoft.com/office/powerpoint/2010/main" xmlns:a16="http://schemas.microsoft.com/office/drawing/2014/main" xmlns="" w="9525">
                     <a:solidFill>
                       <a:srgbClr val="000000"/>
                     </a:solidFill>
@@ -13951,7 +13956,7 @@
               </a:ln>
               <a:extLst>
                 <a:ext uri="{91240B29-F687-4f45-9708-019B960494DF}">
-                  <a14:hiddenLine xmlns="" xmlns:a16="http://schemas.microsoft.com/office/drawing/2014/main" xmlns:p14="http://schemas.microsoft.com/office/powerpoint/2010/main" xmlns:a14="http://schemas.microsoft.com/office/drawing/2010/main" w="9525">
+                  <a14:hiddenLine xmlns:a14="http://schemas.microsoft.com/office/drawing/2010/main" xmlns:p14="http://schemas.microsoft.com/office/powerpoint/2010/main" xmlns:a16="http://schemas.microsoft.com/office/drawing/2014/main" xmlns="" w="9525">
                     <a:solidFill>
                       <a:srgbClr val="000000"/>
                     </a:solidFill>
@@ -14065,7 +14070,7 @@
               </a:ln>
               <a:extLst>
                 <a:ext uri="{91240B29-F687-4f45-9708-019B960494DF}">
-                  <a14:hiddenLine xmlns="" xmlns:a16="http://schemas.microsoft.com/office/drawing/2014/main" xmlns:p14="http://schemas.microsoft.com/office/powerpoint/2010/main" xmlns:a14="http://schemas.microsoft.com/office/drawing/2010/main" w="9525">
+                  <a14:hiddenLine xmlns:a14="http://schemas.microsoft.com/office/drawing/2010/main" xmlns:p14="http://schemas.microsoft.com/office/powerpoint/2010/main" xmlns:a16="http://schemas.microsoft.com/office/drawing/2014/main" xmlns="" w="9525">
                     <a:solidFill>
                       <a:srgbClr val="000000"/>
                     </a:solidFill>
@@ -14142,7 +14147,7 @@
               </a:ln>
               <a:extLst>
                 <a:ext uri="{91240B29-F687-4f45-9708-019B960494DF}">
-                  <a14:hiddenLine xmlns="" xmlns:a16="http://schemas.microsoft.com/office/drawing/2014/main" xmlns:p14="http://schemas.microsoft.com/office/powerpoint/2010/main" xmlns:a14="http://schemas.microsoft.com/office/drawing/2010/main" w="9525">
+                  <a14:hiddenLine xmlns:a14="http://schemas.microsoft.com/office/drawing/2010/main" xmlns:p14="http://schemas.microsoft.com/office/powerpoint/2010/main" xmlns:a16="http://schemas.microsoft.com/office/drawing/2014/main" xmlns="" w="9525">
                     <a:solidFill>
                       <a:srgbClr val="000000"/>
                     </a:solidFill>
@@ -14219,7 +14224,7 @@
               </a:ln>
               <a:extLst>
                 <a:ext uri="{91240B29-F687-4f45-9708-019B960494DF}">
-                  <a14:hiddenLine xmlns="" xmlns:a16="http://schemas.microsoft.com/office/drawing/2014/main" xmlns:p14="http://schemas.microsoft.com/office/powerpoint/2010/main" xmlns:a14="http://schemas.microsoft.com/office/drawing/2010/main" w="9525">
+                  <a14:hiddenLine xmlns:a14="http://schemas.microsoft.com/office/drawing/2010/main" xmlns:p14="http://schemas.microsoft.com/office/powerpoint/2010/main" xmlns:a16="http://schemas.microsoft.com/office/drawing/2014/main" xmlns="" w="9525">
                     <a:solidFill>
                       <a:srgbClr val="000000"/>
                     </a:solidFill>
@@ -14324,7 +14329,7 @@
               </a:ln>
               <a:extLst>
                 <a:ext uri="{91240B29-F687-4f45-9708-019B960494DF}">
-                  <a14:hiddenLine xmlns="" xmlns:a16="http://schemas.microsoft.com/office/drawing/2014/main" xmlns:p14="http://schemas.microsoft.com/office/powerpoint/2010/main" xmlns:a14="http://schemas.microsoft.com/office/drawing/2010/main" w="9525">
+                  <a14:hiddenLine xmlns:a14="http://schemas.microsoft.com/office/drawing/2010/main" xmlns:p14="http://schemas.microsoft.com/office/powerpoint/2010/main" xmlns:a16="http://schemas.microsoft.com/office/drawing/2014/main" xmlns="" w="9525">
                     <a:solidFill>
                       <a:srgbClr val="000000"/>
                     </a:solidFill>
@@ -14373,7 +14378,7 @@
               </a:ln>
               <a:extLst>
                 <a:ext uri="{91240B29-F687-4f45-9708-019B960494DF}">
-                  <a14:hiddenLine xmlns="" xmlns:a16="http://schemas.microsoft.com/office/drawing/2014/main" xmlns:p14="http://schemas.microsoft.com/office/powerpoint/2010/main" xmlns:a14="http://schemas.microsoft.com/office/drawing/2010/main" w="9525">
+                  <a14:hiddenLine xmlns:a14="http://schemas.microsoft.com/office/drawing/2010/main" xmlns:p14="http://schemas.microsoft.com/office/powerpoint/2010/main" xmlns:a16="http://schemas.microsoft.com/office/drawing/2014/main" xmlns="" w="9525">
                     <a:solidFill>
                       <a:srgbClr val="000000"/>
                     </a:solidFill>
@@ -14453,7 +14458,7 @@
               </a:ln>
               <a:extLst>
                 <a:ext uri="{91240B29-F687-4f45-9708-019B960494DF}">
-                  <a14:hiddenLine xmlns="" xmlns:a16="http://schemas.microsoft.com/office/drawing/2014/main" xmlns:p14="http://schemas.microsoft.com/office/powerpoint/2010/main" xmlns:a14="http://schemas.microsoft.com/office/drawing/2010/main" w="9525">
+                  <a14:hiddenLine xmlns:a14="http://schemas.microsoft.com/office/drawing/2010/main" xmlns:p14="http://schemas.microsoft.com/office/powerpoint/2010/main" xmlns:a16="http://schemas.microsoft.com/office/drawing/2014/main" xmlns="" w="9525">
                     <a:solidFill>
                       <a:srgbClr val="000000"/>
                     </a:solidFill>
@@ -14558,7 +14563,7 @@
               </a:ln>
               <a:extLst>
                 <a:ext uri="{91240B29-F687-4f45-9708-019B960494DF}">
-                  <a14:hiddenLine xmlns="" xmlns:a16="http://schemas.microsoft.com/office/drawing/2014/main" xmlns:p14="http://schemas.microsoft.com/office/powerpoint/2010/main" xmlns:a14="http://schemas.microsoft.com/office/drawing/2010/main" w="9525">
+                  <a14:hiddenLine xmlns:a14="http://schemas.microsoft.com/office/drawing/2010/main" xmlns:p14="http://schemas.microsoft.com/office/powerpoint/2010/main" xmlns:a16="http://schemas.microsoft.com/office/drawing/2014/main" xmlns="" w="9525">
                     <a:solidFill>
                       <a:srgbClr val="000000"/>
                     </a:solidFill>
@@ -14635,7 +14640,7 @@
               </a:ln>
               <a:extLst>
                 <a:ext uri="{91240B29-F687-4f45-9708-019B960494DF}">
-                  <a14:hiddenLine xmlns="" xmlns:a16="http://schemas.microsoft.com/office/drawing/2014/main" xmlns:p14="http://schemas.microsoft.com/office/powerpoint/2010/main" xmlns:a14="http://schemas.microsoft.com/office/drawing/2010/main" w="9525">
+                  <a14:hiddenLine xmlns:a14="http://schemas.microsoft.com/office/drawing/2010/main" xmlns:p14="http://schemas.microsoft.com/office/powerpoint/2010/main" xmlns:a16="http://schemas.microsoft.com/office/drawing/2014/main" xmlns="" w="9525">
                     <a:solidFill>
                       <a:srgbClr val="000000"/>
                     </a:solidFill>
@@ -14740,7 +14745,7 @@
               </a:ln>
               <a:extLst>
                 <a:ext uri="{91240B29-F687-4f45-9708-019B960494DF}">
-                  <a14:hiddenLine xmlns="" xmlns:a16="http://schemas.microsoft.com/office/drawing/2014/main" xmlns:p14="http://schemas.microsoft.com/office/powerpoint/2010/main" xmlns:a14="http://schemas.microsoft.com/office/drawing/2010/main" w="9525">
+                  <a14:hiddenLine xmlns:a14="http://schemas.microsoft.com/office/drawing/2010/main" xmlns:p14="http://schemas.microsoft.com/office/powerpoint/2010/main" xmlns:a16="http://schemas.microsoft.com/office/drawing/2014/main" xmlns="" w="9525">
                     <a:solidFill>
                       <a:srgbClr val="000000"/>
                     </a:solidFill>
@@ -14820,7 +14825,7 @@
               </a:ln>
               <a:extLst>
                 <a:ext uri="{91240B29-F687-4f45-9708-019B960494DF}">
-                  <a14:hiddenLine xmlns="" xmlns:a16="http://schemas.microsoft.com/office/drawing/2014/main" xmlns:p14="http://schemas.microsoft.com/office/powerpoint/2010/main" xmlns:a14="http://schemas.microsoft.com/office/drawing/2010/main" w="9525">
+                  <a14:hiddenLine xmlns:a14="http://schemas.microsoft.com/office/drawing/2010/main" xmlns:p14="http://schemas.microsoft.com/office/powerpoint/2010/main" xmlns:a16="http://schemas.microsoft.com/office/drawing/2014/main" xmlns="" w="9525">
                     <a:solidFill>
                       <a:srgbClr val="000000"/>
                     </a:solidFill>
@@ -14897,7 +14902,7 @@
               </a:ln>
               <a:extLst>
                 <a:ext uri="{91240B29-F687-4f45-9708-019B960494DF}">
-                  <a14:hiddenLine xmlns="" xmlns:a16="http://schemas.microsoft.com/office/drawing/2014/main" xmlns:p14="http://schemas.microsoft.com/office/powerpoint/2010/main" xmlns:a14="http://schemas.microsoft.com/office/drawing/2010/main" w="9525">
+                  <a14:hiddenLine xmlns:a14="http://schemas.microsoft.com/office/drawing/2010/main" xmlns:p14="http://schemas.microsoft.com/office/powerpoint/2010/main" xmlns:a16="http://schemas.microsoft.com/office/drawing/2014/main" xmlns="" w="9525">
                     <a:solidFill>
                       <a:srgbClr val="000000"/>
                     </a:solidFill>
@@ -15002,7 +15007,7 @@
               </a:ln>
               <a:extLst>
                 <a:ext uri="{91240B29-F687-4f45-9708-019B960494DF}">
-                  <a14:hiddenLine xmlns="" xmlns:a16="http://schemas.microsoft.com/office/drawing/2014/main" xmlns:p14="http://schemas.microsoft.com/office/powerpoint/2010/main" xmlns:a14="http://schemas.microsoft.com/office/drawing/2010/main" w="9525">
+                  <a14:hiddenLine xmlns:a14="http://schemas.microsoft.com/office/drawing/2010/main" xmlns:p14="http://schemas.microsoft.com/office/powerpoint/2010/main" xmlns:a16="http://schemas.microsoft.com/office/drawing/2014/main" xmlns="" w="9525">
                     <a:solidFill>
                       <a:srgbClr val="000000"/>
                     </a:solidFill>
@@ -15107,7 +15112,7 @@
               </a:ln>
               <a:extLst>
                 <a:ext uri="{91240B29-F687-4f45-9708-019B960494DF}">
-                  <a14:hiddenLine xmlns="" xmlns:a16="http://schemas.microsoft.com/office/drawing/2014/main" xmlns:p14="http://schemas.microsoft.com/office/powerpoint/2010/main" xmlns:a14="http://schemas.microsoft.com/office/drawing/2010/main" w="9525">
+                  <a14:hiddenLine xmlns:a14="http://schemas.microsoft.com/office/drawing/2010/main" xmlns:p14="http://schemas.microsoft.com/office/powerpoint/2010/main" xmlns:a16="http://schemas.microsoft.com/office/drawing/2014/main" xmlns="" w="9525">
                     <a:solidFill>
                       <a:srgbClr val="000000"/>
                     </a:solidFill>
@@ -15187,7 +15192,7 @@
               </a:ln>
               <a:extLst>
                 <a:ext uri="{91240B29-F687-4f45-9708-019B960494DF}">
-                  <a14:hiddenLine xmlns="" xmlns:a16="http://schemas.microsoft.com/office/drawing/2014/main" xmlns:p14="http://schemas.microsoft.com/office/powerpoint/2010/main" xmlns:a14="http://schemas.microsoft.com/office/drawing/2010/main" w="9525">
+                  <a14:hiddenLine xmlns:a14="http://schemas.microsoft.com/office/drawing/2010/main" xmlns:p14="http://schemas.microsoft.com/office/powerpoint/2010/main" xmlns:a16="http://schemas.microsoft.com/office/drawing/2014/main" xmlns="" w="9525">
                     <a:solidFill>
                       <a:srgbClr val="000000"/>
                     </a:solidFill>
@@ -15322,7 +15327,7 @@
               </a:ln>
               <a:extLst>
                 <a:ext uri="{91240B29-F687-4f45-9708-019B960494DF}">
-                  <a14:hiddenLine xmlns="" xmlns:a16="http://schemas.microsoft.com/office/drawing/2014/main" xmlns:p14="http://schemas.microsoft.com/office/powerpoint/2010/main" xmlns:a14="http://schemas.microsoft.com/office/drawing/2010/main" w="9525">
+                  <a14:hiddenLine xmlns:a14="http://schemas.microsoft.com/office/drawing/2010/main" xmlns:p14="http://schemas.microsoft.com/office/powerpoint/2010/main" xmlns:a16="http://schemas.microsoft.com/office/drawing/2014/main" xmlns="" w="9525">
                     <a:solidFill>
                       <a:srgbClr val="000000"/>
                     </a:solidFill>
@@ -15450,7 +15455,7 @@
               </a:ln>
               <a:extLst>
                 <a:ext uri="{91240B29-F687-4f45-9708-019B960494DF}">
-                  <a14:hiddenLine xmlns="" xmlns:a16="http://schemas.microsoft.com/office/drawing/2014/main" xmlns:p14="http://schemas.microsoft.com/office/powerpoint/2010/main" xmlns:a14="http://schemas.microsoft.com/office/drawing/2010/main" w="9525">
+                  <a14:hiddenLine xmlns:a14="http://schemas.microsoft.com/office/drawing/2010/main" xmlns:p14="http://schemas.microsoft.com/office/powerpoint/2010/main" xmlns:a16="http://schemas.microsoft.com/office/drawing/2014/main" xmlns="" w="9525">
                     <a:solidFill>
                       <a:srgbClr val="000000"/>
                     </a:solidFill>
@@ -15580,7 +15585,7 @@
               </a:ln>
               <a:extLst>
                 <a:ext uri="{91240B29-F687-4f45-9708-019B960494DF}">
-                  <a14:hiddenLine xmlns="" xmlns:a16="http://schemas.microsoft.com/office/drawing/2014/main" xmlns:p14="http://schemas.microsoft.com/office/powerpoint/2010/main" xmlns:a14="http://schemas.microsoft.com/office/drawing/2010/main" w="9525">
+                  <a14:hiddenLine xmlns:a14="http://schemas.microsoft.com/office/drawing/2010/main" xmlns:p14="http://schemas.microsoft.com/office/powerpoint/2010/main" xmlns:a16="http://schemas.microsoft.com/office/drawing/2014/main" xmlns="" w="9525">
                     <a:solidFill>
                       <a:srgbClr val="000000"/>
                     </a:solidFill>
@@ -15685,7 +15690,7 @@
               </a:ln>
               <a:extLst>
                 <a:ext uri="{91240B29-F687-4f45-9708-019B960494DF}">
-                  <a14:hiddenLine xmlns="" xmlns:a16="http://schemas.microsoft.com/office/drawing/2014/main" xmlns:p14="http://schemas.microsoft.com/office/powerpoint/2010/main" xmlns:a14="http://schemas.microsoft.com/office/drawing/2010/main" w="9525">
+                  <a14:hiddenLine xmlns:a14="http://schemas.microsoft.com/office/drawing/2010/main" xmlns:p14="http://schemas.microsoft.com/office/powerpoint/2010/main" xmlns:a16="http://schemas.microsoft.com/office/drawing/2014/main" xmlns="" w="9525">
                     <a:solidFill>
                       <a:srgbClr val="000000"/>
                     </a:solidFill>
@@ -15765,7 +15770,7 @@
               </a:ln>
               <a:extLst>
                 <a:ext uri="{91240B29-F687-4f45-9708-019B960494DF}">
-                  <a14:hiddenLine xmlns="" xmlns:a16="http://schemas.microsoft.com/office/drawing/2014/main" xmlns:p14="http://schemas.microsoft.com/office/powerpoint/2010/main" xmlns:a14="http://schemas.microsoft.com/office/drawing/2010/main" w="9525">
+                  <a14:hiddenLine xmlns:a14="http://schemas.microsoft.com/office/drawing/2010/main" xmlns:p14="http://schemas.microsoft.com/office/powerpoint/2010/main" xmlns:a16="http://schemas.microsoft.com/office/drawing/2014/main" xmlns="" w="9525">
                     <a:solidFill>
                       <a:srgbClr val="000000"/>
                     </a:solidFill>
@@ -15870,7 +15875,7 @@
               </a:ln>
               <a:extLst>
                 <a:ext uri="{91240B29-F687-4f45-9708-019B960494DF}">
-                  <a14:hiddenLine xmlns="" xmlns:a16="http://schemas.microsoft.com/office/drawing/2014/main" xmlns:p14="http://schemas.microsoft.com/office/powerpoint/2010/main" xmlns:a14="http://schemas.microsoft.com/office/drawing/2010/main" w="9525">
+                  <a14:hiddenLine xmlns:a14="http://schemas.microsoft.com/office/drawing/2010/main" xmlns:p14="http://schemas.microsoft.com/office/powerpoint/2010/main" xmlns:a16="http://schemas.microsoft.com/office/drawing/2014/main" xmlns="" w="9525">
                     <a:solidFill>
                       <a:srgbClr val="000000"/>
                     </a:solidFill>
@@ -15953,7 +15958,7 @@
               </a:ln>
               <a:extLst>
                 <a:ext uri="{91240B29-F687-4f45-9708-019B960494DF}">
-                  <a14:hiddenLine xmlns="" xmlns:a16="http://schemas.microsoft.com/office/drawing/2014/main" xmlns:p14="http://schemas.microsoft.com/office/powerpoint/2010/main" xmlns:a14="http://schemas.microsoft.com/office/drawing/2010/main" w="9525">
+                  <a14:hiddenLine xmlns:a14="http://schemas.microsoft.com/office/drawing/2010/main" xmlns:p14="http://schemas.microsoft.com/office/powerpoint/2010/main" xmlns:a16="http://schemas.microsoft.com/office/drawing/2014/main" xmlns="" w="9525">
                     <a:solidFill>
                       <a:srgbClr val="000000"/>
                     </a:solidFill>
@@ -16058,7 +16063,7 @@
               </a:ln>
               <a:extLst>
                 <a:ext uri="{91240B29-F687-4f45-9708-019B960494DF}">
-                  <a14:hiddenLine xmlns="" xmlns:a16="http://schemas.microsoft.com/office/drawing/2014/main" xmlns:p14="http://schemas.microsoft.com/office/powerpoint/2010/main" xmlns:a14="http://schemas.microsoft.com/office/drawing/2010/main" w="9525">
+                  <a14:hiddenLine xmlns:a14="http://schemas.microsoft.com/office/drawing/2010/main" xmlns:p14="http://schemas.microsoft.com/office/powerpoint/2010/main" xmlns:a16="http://schemas.microsoft.com/office/drawing/2014/main" xmlns="" w="9525">
                     <a:solidFill>
                       <a:srgbClr val="000000"/>
                     </a:solidFill>
@@ -16141,7 +16146,7 @@
               </a:ln>
               <a:extLst>
                 <a:ext uri="{91240B29-F687-4f45-9708-019B960494DF}">
-                  <a14:hiddenLine xmlns="" xmlns:a16="http://schemas.microsoft.com/office/drawing/2014/main" xmlns:p14="http://schemas.microsoft.com/office/powerpoint/2010/main" xmlns:a14="http://schemas.microsoft.com/office/drawing/2010/main" w="9525">
+                  <a14:hiddenLine xmlns:a14="http://schemas.microsoft.com/office/drawing/2010/main" xmlns:p14="http://schemas.microsoft.com/office/powerpoint/2010/main" xmlns:a16="http://schemas.microsoft.com/office/drawing/2014/main" xmlns="" w="9525">
                     <a:solidFill>
                       <a:srgbClr val="000000"/>
                     </a:solidFill>
@@ -16246,7 +16251,7 @@
               </a:ln>
               <a:extLst>
                 <a:ext uri="{91240B29-F687-4f45-9708-019B960494DF}">
-                  <a14:hiddenLine xmlns="" xmlns:a16="http://schemas.microsoft.com/office/drawing/2014/main" xmlns:p14="http://schemas.microsoft.com/office/powerpoint/2010/main" xmlns:a14="http://schemas.microsoft.com/office/drawing/2010/main" w="9525">
+                  <a14:hiddenLine xmlns:a14="http://schemas.microsoft.com/office/drawing/2010/main" xmlns:p14="http://schemas.microsoft.com/office/powerpoint/2010/main" xmlns:a16="http://schemas.microsoft.com/office/drawing/2014/main" xmlns="" w="9525">
                     <a:solidFill>
                       <a:srgbClr val="000000"/>
                     </a:solidFill>
@@ -16295,7 +16300,7 @@
               </a:ln>
               <a:extLst>
                 <a:ext uri="{91240B29-F687-4f45-9708-019B960494DF}">
-                  <a14:hiddenLine xmlns="" xmlns:a16="http://schemas.microsoft.com/office/drawing/2014/main" xmlns:p14="http://schemas.microsoft.com/office/powerpoint/2010/main" xmlns:a14="http://schemas.microsoft.com/office/drawing/2010/main" w="9525">
+                  <a14:hiddenLine xmlns:a14="http://schemas.microsoft.com/office/drawing/2010/main" xmlns:p14="http://schemas.microsoft.com/office/powerpoint/2010/main" xmlns:a16="http://schemas.microsoft.com/office/drawing/2014/main" xmlns="" w="9525">
                     <a:solidFill>
                       <a:srgbClr val="000000"/>
                     </a:solidFill>
@@ -16441,7 +16446,7 @@
             </a:ln>
             <a:extLst>
               <a:ext uri="{91240B29-F687-4f45-9708-019B960494DF}">
-                <a14:hiddenLine xmlns="" xmlns:a16="http://schemas.microsoft.com/office/drawing/2014/main" xmlns:p14="http://schemas.microsoft.com/office/powerpoint/2010/main" xmlns:a14="http://schemas.microsoft.com/office/drawing/2010/main" w="9525">
+                <a14:hiddenLine xmlns:a14="http://schemas.microsoft.com/office/drawing/2010/main" xmlns:p14="http://schemas.microsoft.com/office/powerpoint/2010/main" xmlns:a16="http://schemas.microsoft.com/office/drawing/2014/main" xmlns="" w="9525">
                   <a:solidFill>
                     <a:srgbClr val="000000"/>
                   </a:solidFill>
@@ -16550,7 +16555,7 @@
             </a:ln>
             <a:extLst>
               <a:ext uri="{91240B29-F687-4f45-9708-019B960494DF}">
-                <a14:hiddenLine xmlns="" xmlns:a16="http://schemas.microsoft.com/office/drawing/2014/main" xmlns:p14="http://schemas.microsoft.com/office/powerpoint/2010/main" xmlns:a14="http://schemas.microsoft.com/office/drawing/2010/main" w="9525">
+                <a14:hiddenLine xmlns:a14="http://schemas.microsoft.com/office/drawing/2010/main" xmlns:p14="http://schemas.microsoft.com/office/powerpoint/2010/main" xmlns:a16="http://schemas.microsoft.com/office/drawing/2014/main" xmlns="" w="9525">
                   <a:solidFill>
                     <a:srgbClr val="000000"/>
                   </a:solidFill>
@@ -16659,7 +16664,7 @@
             </a:ln>
             <a:extLst>
               <a:ext uri="{91240B29-F687-4f45-9708-019B960494DF}">
-                <a14:hiddenLine xmlns="" xmlns:a16="http://schemas.microsoft.com/office/drawing/2014/main" xmlns:p14="http://schemas.microsoft.com/office/powerpoint/2010/main" xmlns:a14="http://schemas.microsoft.com/office/drawing/2010/main" w="9525">
+                <a14:hiddenLine xmlns:a14="http://schemas.microsoft.com/office/drawing/2010/main" xmlns:p14="http://schemas.microsoft.com/office/powerpoint/2010/main" xmlns:a16="http://schemas.microsoft.com/office/drawing/2014/main" xmlns="" w="9525">
                   <a:solidFill>
                     <a:srgbClr val="000000"/>
                   </a:solidFill>
@@ -16712,7 +16717,7 @@
             </a:ln>
             <a:extLst>
               <a:ext uri="{91240B29-F687-4f45-9708-019B960494DF}">
-                <a14:hiddenLine xmlns="" xmlns:a16="http://schemas.microsoft.com/office/drawing/2014/main" xmlns:p14="http://schemas.microsoft.com/office/powerpoint/2010/main" xmlns:a14="http://schemas.microsoft.com/office/drawing/2010/main" w="9525">
+                <a14:hiddenLine xmlns:a14="http://schemas.microsoft.com/office/drawing/2010/main" xmlns:p14="http://schemas.microsoft.com/office/powerpoint/2010/main" xmlns:a16="http://schemas.microsoft.com/office/drawing/2014/main" xmlns="" w="9525">
                   <a:solidFill>
                     <a:srgbClr val="000000"/>
                   </a:solidFill>
@@ -16821,7 +16826,7 @@
             </a:ln>
             <a:extLst>
               <a:ext uri="{91240B29-F687-4f45-9708-019B960494DF}">
-                <a14:hiddenLine xmlns="" xmlns:a16="http://schemas.microsoft.com/office/drawing/2014/main" xmlns:p14="http://schemas.microsoft.com/office/powerpoint/2010/main" xmlns:a14="http://schemas.microsoft.com/office/drawing/2010/main" w="9525">
+                <a14:hiddenLine xmlns:a14="http://schemas.microsoft.com/office/drawing/2010/main" xmlns:p14="http://schemas.microsoft.com/office/powerpoint/2010/main" xmlns:a16="http://schemas.microsoft.com/office/drawing/2014/main" xmlns="" w="9525">
                   <a:solidFill>
                     <a:srgbClr val="000000"/>
                   </a:solidFill>
@@ -16902,7 +16907,7 @@
             </a:ln>
             <a:extLst>
               <a:ext uri="{91240B29-F687-4f45-9708-019B960494DF}">
-                <a14:hiddenLine xmlns="" xmlns:a16="http://schemas.microsoft.com/office/drawing/2014/main" xmlns:p14="http://schemas.microsoft.com/office/powerpoint/2010/main" xmlns:a14="http://schemas.microsoft.com/office/drawing/2010/main" w="9525">
+                <a14:hiddenLine xmlns:a14="http://schemas.microsoft.com/office/drawing/2010/main" xmlns:p14="http://schemas.microsoft.com/office/powerpoint/2010/main" xmlns:a16="http://schemas.microsoft.com/office/drawing/2014/main" xmlns="" w="9525">
                   <a:solidFill>
                     <a:srgbClr val="000000"/>
                   </a:solidFill>
@@ -16983,7 +16988,7 @@
             </a:ln>
             <a:extLst>
               <a:ext uri="{91240B29-F687-4f45-9708-019B960494DF}">
-                <a14:hiddenLine xmlns="" xmlns:a16="http://schemas.microsoft.com/office/drawing/2014/main" xmlns:p14="http://schemas.microsoft.com/office/powerpoint/2010/main" xmlns:a14="http://schemas.microsoft.com/office/drawing/2010/main" w="9525">
+                <a14:hiddenLine xmlns:a14="http://schemas.microsoft.com/office/drawing/2010/main" xmlns:p14="http://schemas.microsoft.com/office/powerpoint/2010/main" xmlns:a16="http://schemas.microsoft.com/office/drawing/2014/main" xmlns="" w="9525">
                   <a:solidFill>
                     <a:srgbClr val="000000"/>
                   </a:solidFill>
@@ -17092,7 +17097,7 @@
             </a:ln>
             <a:extLst>
               <a:ext uri="{91240B29-F687-4f45-9708-019B960494DF}">
-                <a14:hiddenLine xmlns="" xmlns:a16="http://schemas.microsoft.com/office/drawing/2014/main" xmlns:p14="http://schemas.microsoft.com/office/powerpoint/2010/main" xmlns:a14="http://schemas.microsoft.com/office/drawing/2010/main" w="9525">
+                <a14:hiddenLine xmlns:a14="http://schemas.microsoft.com/office/drawing/2010/main" xmlns:p14="http://schemas.microsoft.com/office/powerpoint/2010/main" xmlns:a16="http://schemas.microsoft.com/office/drawing/2014/main" xmlns="" w="9525">
                   <a:solidFill>
                     <a:srgbClr val="000000"/>
                   </a:solidFill>
@@ -17173,7 +17178,7 @@
             </a:ln>
             <a:extLst>
               <a:ext uri="{91240B29-F687-4f45-9708-019B960494DF}">
-                <a14:hiddenLine xmlns="" xmlns:a16="http://schemas.microsoft.com/office/drawing/2014/main" xmlns:p14="http://schemas.microsoft.com/office/powerpoint/2010/main" xmlns:a14="http://schemas.microsoft.com/office/drawing/2010/main" w="9525">
+                <a14:hiddenLine xmlns:a14="http://schemas.microsoft.com/office/drawing/2010/main" xmlns:p14="http://schemas.microsoft.com/office/powerpoint/2010/main" xmlns:a16="http://schemas.microsoft.com/office/drawing/2014/main" xmlns="" w="9525">
                   <a:solidFill>
                     <a:srgbClr val="000000"/>
                   </a:solidFill>
@@ -17254,7 +17259,7 @@
             </a:ln>
             <a:extLst>
               <a:ext uri="{91240B29-F687-4f45-9708-019B960494DF}">
-                <a14:hiddenLine xmlns="" xmlns:a16="http://schemas.microsoft.com/office/drawing/2014/main" xmlns:p14="http://schemas.microsoft.com/office/powerpoint/2010/main" xmlns:a14="http://schemas.microsoft.com/office/drawing/2010/main" w="9525">
+                <a14:hiddenLine xmlns:a14="http://schemas.microsoft.com/office/drawing/2010/main" xmlns:p14="http://schemas.microsoft.com/office/powerpoint/2010/main" xmlns:a16="http://schemas.microsoft.com/office/drawing/2014/main" xmlns="" w="9525">
                   <a:solidFill>
                     <a:srgbClr val="000000"/>
                   </a:solidFill>
@@ -17363,7 +17368,7 @@
             </a:ln>
             <a:extLst>
               <a:ext uri="{91240B29-F687-4f45-9708-019B960494DF}">
-                <a14:hiddenLine xmlns="" xmlns:a16="http://schemas.microsoft.com/office/drawing/2014/main" xmlns:p14="http://schemas.microsoft.com/office/powerpoint/2010/main" xmlns:a14="http://schemas.microsoft.com/office/drawing/2010/main" w="9525">
+                <a14:hiddenLine xmlns:a14="http://schemas.microsoft.com/office/drawing/2010/main" xmlns:p14="http://schemas.microsoft.com/office/powerpoint/2010/main" xmlns:a16="http://schemas.microsoft.com/office/drawing/2014/main" xmlns="" w="9525">
                   <a:solidFill>
                     <a:srgbClr val="000000"/>
                   </a:solidFill>
@@ -17472,7 +17477,7 @@
             </a:ln>
             <a:extLst>
               <a:ext uri="{91240B29-F687-4f45-9708-019B960494DF}">
-                <a14:hiddenLine xmlns="" xmlns:a16="http://schemas.microsoft.com/office/drawing/2014/main" xmlns:p14="http://schemas.microsoft.com/office/powerpoint/2010/main" xmlns:a14="http://schemas.microsoft.com/office/drawing/2010/main" w="9525">
+                <a14:hiddenLine xmlns:a14="http://schemas.microsoft.com/office/drawing/2010/main" xmlns:p14="http://schemas.microsoft.com/office/powerpoint/2010/main" xmlns:a16="http://schemas.microsoft.com/office/drawing/2014/main" xmlns="" w="9525">
                   <a:solidFill>
                     <a:srgbClr val="000000"/>
                   </a:solidFill>
@@ -17553,7 +17558,7 @@
             </a:ln>
             <a:extLst>
               <a:ext uri="{91240B29-F687-4f45-9708-019B960494DF}">
-                <a14:hiddenLine xmlns="" xmlns:a16="http://schemas.microsoft.com/office/drawing/2014/main" xmlns:p14="http://schemas.microsoft.com/office/powerpoint/2010/main" xmlns:a14="http://schemas.microsoft.com/office/drawing/2010/main" w="9525">
+                <a14:hiddenLine xmlns:a14="http://schemas.microsoft.com/office/drawing/2010/main" xmlns:p14="http://schemas.microsoft.com/office/powerpoint/2010/main" xmlns:a16="http://schemas.microsoft.com/office/drawing/2014/main" xmlns="" w="9525">
                   <a:solidFill>
                     <a:srgbClr val="000000"/>
                   </a:solidFill>
@@ -17682,7 +17687,7 @@
             </a:ln>
             <a:extLst>
               <a:ext uri="{91240B29-F687-4f45-9708-019B960494DF}">
-                <a14:hiddenLine xmlns="" xmlns:a16="http://schemas.microsoft.com/office/drawing/2014/main" xmlns:p14="http://schemas.microsoft.com/office/powerpoint/2010/main" xmlns:a14="http://schemas.microsoft.com/office/drawing/2010/main" w="9525">
+                <a14:hiddenLine xmlns:a14="http://schemas.microsoft.com/office/drawing/2010/main" xmlns:p14="http://schemas.microsoft.com/office/powerpoint/2010/main" xmlns:a16="http://schemas.microsoft.com/office/drawing/2014/main" xmlns="" w="9525">
                   <a:solidFill>
                     <a:srgbClr val="000000"/>
                   </a:solidFill>
@@ -17763,7 +17768,7 @@
             </a:ln>
             <a:extLst>
               <a:ext uri="{91240B29-F687-4f45-9708-019B960494DF}">
-                <a14:hiddenLine xmlns="" xmlns:a16="http://schemas.microsoft.com/office/drawing/2014/main" xmlns:p14="http://schemas.microsoft.com/office/powerpoint/2010/main" xmlns:a14="http://schemas.microsoft.com/office/drawing/2010/main" w="9525">
+                <a14:hiddenLine xmlns:a14="http://schemas.microsoft.com/office/drawing/2010/main" xmlns:p14="http://schemas.microsoft.com/office/powerpoint/2010/main" xmlns:a16="http://schemas.microsoft.com/office/drawing/2014/main" xmlns="" w="9525">
                   <a:solidFill>
                     <a:srgbClr val="000000"/>
                   </a:solidFill>
@@ -17872,7 +17877,7 @@
             </a:ln>
             <a:extLst>
               <a:ext uri="{91240B29-F687-4f45-9708-019B960494DF}">
-                <a14:hiddenLine xmlns="" xmlns:a16="http://schemas.microsoft.com/office/drawing/2014/main" xmlns:p14="http://schemas.microsoft.com/office/powerpoint/2010/main" xmlns:a14="http://schemas.microsoft.com/office/drawing/2010/main" w="9525">
+                <a14:hiddenLine xmlns:a14="http://schemas.microsoft.com/office/drawing/2010/main" xmlns:p14="http://schemas.microsoft.com/office/powerpoint/2010/main" xmlns:a16="http://schemas.microsoft.com/office/drawing/2014/main" xmlns="" w="9525">
                   <a:solidFill>
                     <a:srgbClr val="000000"/>
                   </a:solidFill>
@@ -17981,7 +17986,7 @@
             </a:ln>
             <a:extLst>
               <a:ext uri="{91240B29-F687-4f45-9708-019B960494DF}">
-                <a14:hiddenLine xmlns="" xmlns:a16="http://schemas.microsoft.com/office/drawing/2014/main" xmlns:p14="http://schemas.microsoft.com/office/powerpoint/2010/main" xmlns:a14="http://schemas.microsoft.com/office/drawing/2010/main" w="9525">
+                <a14:hiddenLine xmlns:a14="http://schemas.microsoft.com/office/drawing/2010/main" xmlns:p14="http://schemas.microsoft.com/office/powerpoint/2010/main" xmlns:a16="http://schemas.microsoft.com/office/drawing/2014/main" xmlns="" w="9525">
                   <a:solidFill>
                     <a:srgbClr val="000000"/>
                   </a:solidFill>
@@ -18090,7 +18095,7 @@
             </a:ln>
             <a:extLst>
               <a:ext uri="{91240B29-F687-4f45-9708-019B960494DF}">
-                <a14:hiddenLine xmlns="" xmlns:a16="http://schemas.microsoft.com/office/drawing/2014/main" xmlns:p14="http://schemas.microsoft.com/office/powerpoint/2010/main" xmlns:a14="http://schemas.microsoft.com/office/drawing/2010/main" w="9525">
+                <a14:hiddenLine xmlns:a14="http://schemas.microsoft.com/office/drawing/2010/main" xmlns:p14="http://schemas.microsoft.com/office/powerpoint/2010/main" xmlns:a16="http://schemas.microsoft.com/office/drawing/2014/main" xmlns="" w="9525">
                   <a:solidFill>
                     <a:srgbClr val="000000"/>
                   </a:solidFill>
@@ -18165,7 +18170,7 @@
             </a:ln>
             <a:extLst>
               <a:ext uri="{91240B29-F687-4f45-9708-019B960494DF}">
-                <a14:hiddenLine xmlns="" xmlns:a16="http://schemas.microsoft.com/office/drawing/2014/main" xmlns:p14="http://schemas.microsoft.com/office/powerpoint/2010/main" xmlns:a14="http://schemas.microsoft.com/office/drawing/2010/main" w="9525">
+                <a14:hiddenLine xmlns:a14="http://schemas.microsoft.com/office/drawing/2010/main" xmlns:p14="http://schemas.microsoft.com/office/powerpoint/2010/main" xmlns:a16="http://schemas.microsoft.com/office/drawing/2014/main" xmlns="" w="9525">
                   <a:solidFill>
                     <a:srgbClr val="000000"/>
                   </a:solidFill>
@@ -18274,7 +18279,7 @@
             </a:ln>
             <a:extLst>
               <a:ext uri="{91240B29-F687-4f45-9708-019B960494DF}">
-                <a14:hiddenLine xmlns="" xmlns:a16="http://schemas.microsoft.com/office/drawing/2014/main" xmlns:p14="http://schemas.microsoft.com/office/powerpoint/2010/main" xmlns:a14="http://schemas.microsoft.com/office/drawing/2010/main" w="9525">
+                <a14:hiddenLine xmlns:a14="http://schemas.microsoft.com/office/drawing/2010/main" xmlns:p14="http://schemas.microsoft.com/office/powerpoint/2010/main" xmlns:a16="http://schemas.microsoft.com/office/drawing/2014/main" xmlns="" w="9525">
                   <a:solidFill>
                     <a:srgbClr val="000000"/>
                   </a:solidFill>
@@ -18349,7 +18354,7 @@
             </a:ln>
             <a:extLst>
               <a:ext uri="{91240B29-F687-4f45-9708-019B960494DF}">
-                <a14:hiddenLine xmlns="" xmlns:a16="http://schemas.microsoft.com/office/drawing/2014/main" xmlns:p14="http://schemas.microsoft.com/office/powerpoint/2010/main" xmlns:a14="http://schemas.microsoft.com/office/drawing/2010/main" w="9525">
+                <a14:hiddenLine xmlns:a14="http://schemas.microsoft.com/office/drawing/2010/main" xmlns:p14="http://schemas.microsoft.com/office/powerpoint/2010/main" xmlns:a16="http://schemas.microsoft.com/office/drawing/2014/main" xmlns="" w="9525">
                   <a:solidFill>
                     <a:srgbClr val="000000"/>
                   </a:solidFill>
@@ -18458,7 +18463,7 @@
             </a:ln>
             <a:extLst>
               <a:ext uri="{91240B29-F687-4f45-9708-019B960494DF}">
-                <a14:hiddenLine xmlns="" xmlns:a16="http://schemas.microsoft.com/office/drawing/2014/main" xmlns:p14="http://schemas.microsoft.com/office/powerpoint/2010/main" xmlns:a14="http://schemas.microsoft.com/office/drawing/2010/main" w="9525">
+                <a14:hiddenLine xmlns:a14="http://schemas.microsoft.com/office/drawing/2010/main" xmlns:p14="http://schemas.microsoft.com/office/powerpoint/2010/main" xmlns:a16="http://schemas.microsoft.com/office/drawing/2014/main" xmlns="" w="9525">
                   <a:solidFill>
                     <a:srgbClr val="000000"/>
                   </a:solidFill>
@@ -18545,7 +18550,7 @@
             </a:ln>
             <a:extLst>
               <a:ext uri="{91240B29-F687-4f45-9708-019B960494DF}">
-                <a14:hiddenLine xmlns="" xmlns:a16="http://schemas.microsoft.com/office/drawing/2014/main" xmlns:p14="http://schemas.microsoft.com/office/powerpoint/2010/main" xmlns:a14="http://schemas.microsoft.com/office/drawing/2010/main" w="9525">
+                <a14:hiddenLine xmlns:a14="http://schemas.microsoft.com/office/drawing/2010/main" xmlns:p14="http://schemas.microsoft.com/office/powerpoint/2010/main" xmlns:a16="http://schemas.microsoft.com/office/drawing/2014/main" xmlns="" w="9525">
                   <a:solidFill>
                     <a:srgbClr val="000000"/>
                   </a:solidFill>
@@ -18626,7 +18631,7 @@
             </a:ln>
             <a:extLst>
               <a:ext uri="{91240B29-F687-4f45-9708-019B960494DF}">
-                <a14:hiddenLine xmlns="" xmlns:a16="http://schemas.microsoft.com/office/drawing/2014/main" xmlns:p14="http://schemas.microsoft.com/office/powerpoint/2010/main" xmlns:a14="http://schemas.microsoft.com/office/drawing/2010/main" w="9525">
+                <a14:hiddenLine xmlns:a14="http://schemas.microsoft.com/office/drawing/2010/main" xmlns:p14="http://schemas.microsoft.com/office/powerpoint/2010/main" xmlns:a16="http://schemas.microsoft.com/office/drawing/2014/main" xmlns="" w="9525">
                   <a:solidFill>
                     <a:srgbClr val="000000"/>
                   </a:solidFill>
@@ -18735,7 +18740,7 @@
             </a:ln>
             <a:extLst>
               <a:ext uri="{91240B29-F687-4f45-9708-019B960494DF}">
-                <a14:hiddenLine xmlns="" xmlns:a16="http://schemas.microsoft.com/office/drawing/2014/main" xmlns:p14="http://schemas.microsoft.com/office/powerpoint/2010/main" xmlns:a14="http://schemas.microsoft.com/office/drawing/2010/main" w="9525">
+                <a14:hiddenLine xmlns:a14="http://schemas.microsoft.com/office/drawing/2010/main" xmlns:p14="http://schemas.microsoft.com/office/powerpoint/2010/main" xmlns:a16="http://schemas.microsoft.com/office/drawing/2014/main" xmlns="" w="9525">
                   <a:solidFill>
                     <a:srgbClr val="000000"/>
                   </a:solidFill>
@@ -18822,7 +18827,7 @@
             </a:ln>
             <a:extLst>
               <a:ext uri="{91240B29-F687-4f45-9708-019B960494DF}">
-                <a14:hiddenLine xmlns="" xmlns:a16="http://schemas.microsoft.com/office/drawing/2014/main" xmlns:p14="http://schemas.microsoft.com/office/powerpoint/2010/main" xmlns:a14="http://schemas.microsoft.com/office/drawing/2010/main" w="9525">
+                <a14:hiddenLine xmlns:a14="http://schemas.microsoft.com/office/drawing/2010/main" xmlns:p14="http://schemas.microsoft.com/office/powerpoint/2010/main" xmlns:a16="http://schemas.microsoft.com/office/drawing/2014/main" xmlns="" w="9525">
                   <a:solidFill>
                     <a:srgbClr val="000000"/>
                   </a:solidFill>
@@ -18903,7 +18908,7 @@
             </a:ln>
             <a:extLst>
               <a:ext uri="{91240B29-F687-4f45-9708-019B960494DF}">
-                <a14:hiddenLine xmlns="" xmlns:a16="http://schemas.microsoft.com/office/drawing/2014/main" xmlns:p14="http://schemas.microsoft.com/office/powerpoint/2010/main" xmlns:a14="http://schemas.microsoft.com/office/drawing/2010/main" w="9525">
+                <a14:hiddenLine xmlns:a14="http://schemas.microsoft.com/office/drawing/2010/main" xmlns:p14="http://schemas.microsoft.com/office/powerpoint/2010/main" xmlns:a16="http://schemas.microsoft.com/office/drawing/2014/main" xmlns="" w="9525">
                   <a:solidFill>
                     <a:srgbClr val="000000"/>
                   </a:solidFill>
@@ -19012,7 +19017,7 @@
             </a:ln>
             <a:extLst>
               <a:ext uri="{91240B29-F687-4f45-9708-019B960494DF}">
-                <a14:hiddenLine xmlns="" xmlns:a16="http://schemas.microsoft.com/office/drawing/2014/main" xmlns:p14="http://schemas.microsoft.com/office/powerpoint/2010/main" xmlns:a14="http://schemas.microsoft.com/office/drawing/2010/main" w="9525">
+                <a14:hiddenLine xmlns:a14="http://schemas.microsoft.com/office/drawing/2010/main" xmlns:p14="http://schemas.microsoft.com/office/powerpoint/2010/main" xmlns:a16="http://schemas.microsoft.com/office/drawing/2014/main" xmlns="" w="9525">
                   <a:solidFill>
                     <a:srgbClr val="000000"/>
                   </a:solidFill>
@@ -19093,7 +19098,7 @@
             </a:ln>
             <a:extLst>
               <a:ext uri="{91240B29-F687-4f45-9708-019B960494DF}">
-                <a14:hiddenLine xmlns="" xmlns:a16="http://schemas.microsoft.com/office/drawing/2014/main" xmlns:p14="http://schemas.microsoft.com/office/powerpoint/2010/main" xmlns:a14="http://schemas.microsoft.com/office/drawing/2010/main" w="9525">
+                <a14:hiddenLine xmlns:a14="http://schemas.microsoft.com/office/drawing/2010/main" xmlns:p14="http://schemas.microsoft.com/office/powerpoint/2010/main" xmlns:a16="http://schemas.microsoft.com/office/drawing/2014/main" xmlns="" w="9525">
                   <a:solidFill>
                     <a:srgbClr val="000000"/>
                   </a:solidFill>
@@ -19202,7 +19207,7 @@
             </a:ln>
             <a:extLst>
               <a:ext uri="{91240B29-F687-4f45-9708-019B960494DF}">
-                <a14:hiddenLine xmlns="" xmlns:a16="http://schemas.microsoft.com/office/drawing/2014/main" xmlns:p14="http://schemas.microsoft.com/office/powerpoint/2010/main" xmlns:a14="http://schemas.microsoft.com/office/drawing/2010/main" w="9525">
+                <a14:hiddenLine xmlns:a14="http://schemas.microsoft.com/office/drawing/2010/main" xmlns:p14="http://schemas.microsoft.com/office/powerpoint/2010/main" xmlns:a16="http://schemas.microsoft.com/office/drawing/2014/main" xmlns="" w="9525">
                   <a:solidFill>
                     <a:srgbClr val="000000"/>
                   </a:solidFill>
@@ -19283,7 +19288,7 @@
             </a:ln>
             <a:extLst>
               <a:ext uri="{91240B29-F687-4f45-9708-019B960494DF}">
-                <a14:hiddenLine xmlns="" xmlns:a16="http://schemas.microsoft.com/office/drawing/2014/main" xmlns:p14="http://schemas.microsoft.com/office/powerpoint/2010/main" xmlns:a14="http://schemas.microsoft.com/office/drawing/2010/main" w="9525">
+                <a14:hiddenLine xmlns:a14="http://schemas.microsoft.com/office/drawing/2010/main" xmlns:p14="http://schemas.microsoft.com/office/powerpoint/2010/main" xmlns:a16="http://schemas.microsoft.com/office/drawing/2014/main" xmlns="" w="9525">
                   <a:solidFill>
                     <a:srgbClr val="000000"/>
                   </a:solidFill>
@@ -19392,7 +19397,7 @@
             </a:ln>
             <a:extLst>
               <a:ext uri="{91240B29-F687-4f45-9708-019B960494DF}">
-                <a14:hiddenLine xmlns="" xmlns:a16="http://schemas.microsoft.com/office/drawing/2014/main" xmlns:p14="http://schemas.microsoft.com/office/powerpoint/2010/main" xmlns:a14="http://schemas.microsoft.com/office/drawing/2010/main" w="9525">
+                <a14:hiddenLine xmlns:a14="http://schemas.microsoft.com/office/drawing/2010/main" xmlns:p14="http://schemas.microsoft.com/office/powerpoint/2010/main" xmlns:a16="http://schemas.microsoft.com/office/drawing/2014/main" xmlns="" w="9525">
                   <a:solidFill>
                     <a:srgbClr val="000000"/>
                   </a:solidFill>
@@ -19479,7 +19484,7 @@
             </a:ln>
             <a:extLst>
               <a:ext uri="{91240B29-F687-4f45-9708-019B960494DF}">
-                <a14:hiddenLine xmlns="" xmlns:a16="http://schemas.microsoft.com/office/drawing/2014/main" xmlns:p14="http://schemas.microsoft.com/office/powerpoint/2010/main" xmlns:a14="http://schemas.microsoft.com/office/drawing/2010/main" w="9525">
+                <a14:hiddenLine xmlns:a14="http://schemas.microsoft.com/office/drawing/2010/main" xmlns:p14="http://schemas.microsoft.com/office/powerpoint/2010/main" xmlns:a16="http://schemas.microsoft.com/office/drawing/2014/main" xmlns="" w="9525">
                   <a:solidFill>
                     <a:srgbClr val="000000"/>
                   </a:solidFill>
@@ -19588,7 +19593,7 @@
             </a:ln>
             <a:extLst>
               <a:ext uri="{91240B29-F687-4f45-9708-019B960494DF}">
-                <a14:hiddenLine xmlns="" xmlns:a16="http://schemas.microsoft.com/office/drawing/2014/main" xmlns:p14="http://schemas.microsoft.com/office/powerpoint/2010/main" xmlns:a14="http://schemas.microsoft.com/office/drawing/2010/main" w="9525">
+                <a14:hiddenLine xmlns:a14="http://schemas.microsoft.com/office/drawing/2010/main" xmlns:p14="http://schemas.microsoft.com/office/powerpoint/2010/main" xmlns:a16="http://schemas.microsoft.com/office/drawing/2014/main" xmlns="" w="9525">
                   <a:solidFill>
                     <a:srgbClr val="000000"/>
                   </a:solidFill>
@@ -19796,26 +19801,43 @@
             <p:ph idx="1"/>
           </p:nvPr>
         </p:nvSpPr>
-        <p:spPr/>
+        <p:spPr>
+          <a:xfrm>
+            <a:off x="1143000" y="2258631"/>
+            <a:ext cx="9905999" cy="3541714"/>
+          </a:xfrm>
+        </p:spPr>
         <p:txBody>
           <a:bodyPr/>
           <a:lstStyle/>
           <a:p>
             <a:r>
               <a:rPr lang="fr-CA" dirty="0"/>
-              <a:t>Être en mesure d’Identification, d’Autorisation et d’Authentification des usagés;</a:t>
+              <a:t>Être en mesure d’identifier, d’authentifier et d’</a:t>
+            </a:r>
+            <a:r>
+              <a:rPr lang="fr-CA" dirty="0" err="1"/>
+              <a:t>autoris</a:t>
+            </a:r>
+            <a:r>
+              <a:rPr lang="en-US" dirty="0"/>
+              <a:t>er</a:t>
+            </a:r>
+            <a:r>
+              <a:rPr lang="fr-CA" dirty="0"/>
+              <a:t> des usagés;</a:t>
             </a:r>
           </a:p>
           <a:p>
             <a:r>
               <a:rPr lang="fr-CA" dirty="0"/>
-              <a:t>Chaque usagé peux consulter ces évènements;</a:t>
+              <a:t>Chaque usagé peut consulter ces évènements;</a:t>
             </a:r>
           </a:p>
           <a:p>
             <a:r>
               <a:rPr lang="fr-CA" dirty="0"/>
-              <a:t>Chaque usagé peux confirmer sa présence aux évènements;</a:t>
+              <a:t>Chaque usagé peut confirmer sa présence aux évènements;</a:t>
             </a:r>
           </a:p>
           <a:p>
@@ -20206,7 +20228,7 @@
             </a:ln>
             <a:extLst>
               <a:ext uri="{91240B29-F687-4f45-9708-019B960494DF}">
-                <a14:hiddenLine xmlns="" xmlns:a16="http://schemas.microsoft.com/office/drawing/2014/main" xmlns:p14="http://schemas.microsoft.com/office/powerpoint/2010/main" xmlns:a14="http://schemas.microsoft.com/office/drawing/2010/main" w="9525">
+                <a14:hiddenLine xmlns:a14="http://schemas.microsoft.com/office/drawing/2010/main" xmlns:p14="http://schemas.microsoft.com/office/powerpoint/2010/main" xmlns:a16="http://schemas.microsoft.com/office/drawing/2014/main" xmlns="" w="9525">
                   <a:solidFill>
                     <a:srgbClr val="000000"/>
                   </a:solidFill>
@@ -20311,7 +20333,7 @@
             </a:ln>
             <a:extLst>
               <a:ext uri="{91240B29-F687-4f45-9708-019B960494DF}">
-                <a14:hiddenLine xmlns="" xmlns:a16="http://schemas.microsoft.com/office/drawing/2014/main" xmlns:p14="http://schemas.microsoft.com/office/powerpoint/2010/main" xmlns:a14="http://schemas.microsoft.com/office/drawing/2010/main" w="9525">
+                <a14:hiddenLine xmlns:a14="http://schemas.microsoft.com/office/drawing/2010/main" xmlns:p14="http://schemas.microsoft.com/office/powerpoint/2010/main" xmlns:a16="http://schemas.microsoft.com/office/drawing/2014/main" xmlns="" w="9525">
                   <a:solidFill>
                     <a:srgbClr val="000000"/>
                   </a:solidFill>
@@ -20416,7 +20438,7 @@
             </a:ln>
             <a:extLst>
               <a:ext uri="{91240B29-F687-4f45-9708-019B960494DF}">
-                <a14:hiddenLine xmlns="" xmlns:a16="http://schemas.microsoft.com/office/drawing/2014/main" xmlns:p14="http://schemas.microsoft.com/office/powerpoint/2010/main" xmlns:a14="http://schemas.microsoft.com/office/drawing/2010/main" w="9525">
+                <a14:hiddenLine xmlns:a14="http://schemas.microsoft.com/office/drawing/2010/main" xmlns:p14="http://schemas.microsoft.com/office/powerpoint/2010/main" xmlns:a16="http://schemas.microsoft.com/office/drawing/2014/main" xmlns="" w="9525">
                   <a:solidFill>
                     <a:srgbClr val="000000"/>
                   </a:solidFill>
@@ -20493,7 +20515,7 @@
             </a:ln>
             <a:extLst>
               <a:ext uri="{91240B29-F687-4f45-9708-019B960494DF}">
-                <a14:hiddenLine xmlns="" xmlns:a16="http://schemas.microsoft.com/office/drawing/2014/main" xmlns:p14="http://schemas.microsoft.com/office/powerpoint/2010/main" xmlns:a14="http://schemas.microsoft.com/office/drawing/2010/main" w="9525">
+                <a14:hiddenLine xmlns:a14="http://schemas.microsoft.com/office/drawing/2010/main" xmlns:p14="http://schemas.microsoft.com/office/powerpoint/2010/main" xmlns:a16="http://schemas.microsoft.com/office/drawing/2014/main" xmlns="" w="9525">
                   <a:solidFill>
                     <a:srgbClr val="000000"/>
                   </a:solidFill>
@@ -20598,7 +20620,7 @@
             </a:ln>
             <a:extLst>
               <a:ext uri="{91240B29-F687-4f45-9708-019B960494DF}">
-                <a14:hiddenLine xmlns="" xmlns:a16="http://schemas.microsoft.com/office/drawing/2014/main" xmlns:p14="http://schemas.microsoft.com/office/powerpoint/2010/main" xmlns:a14="http://schemas.microsoft.com/office/drawing/2010/main" w="9525">
+                <a14:hiddenLine xmlns:a14="http://schemas.microsoft.com/office/drawing/2010/main" xmlns:p14="http://schemas.microsoft.com/office/powerpoint/2010/main" xmlns:a16="http://schemas.microsoft.com/office/drawing/2014/main" xmlns="" w="9525">
                   <a:solidFill>
                     <a:srgbClr val="000000"/>
                   </a:solidFill>
@@ -20675,7 +20697,7 @@
             </a:ln>
             <a:extLst>
               <a:ext uri="{91240B29-F687-4f45-9708-019B960494DF}">
-                <a14:hiddenLine xmlns="" xmlns:a16="http://schemas.microsoft.com/office/drawing/2014/main" xmlns:p14="http://schemas.microsoft.com/office/powerpoint/2010/main" xmlns:a14="http://schemas.microsoft.com/office/drawing/2010/main" w="9525">
+                <a14:hiddenLine xmlns:a14="http://schemas.microsoft.com/office/drawing/2010/main" xmlns:p14="http://schemas.microsoft.com/office/powerpoint/2010/main" xmlns:a16="http://schemas.microsoft.com/office/drawing/2014/main" xmlns="" w="9525">
                   <a:solidFill>
                     <a:srgbClr val="000000"/>
                   </a:solidFill>
@@ -20752,7 +20774,7 @@
             </a:ln>
             <a:extLst>
               <a:ext uri="{91240B29-F687-4f45-9708-019B960494DF}">
-                <a14:hiddenLine xmlns="" xmlns:a16="http://schemas.microsoft.com/office/drawing/2014/main" xmlns:p14="http://schemas.microsoft.com/office/powerpoint/2010/main" xmlns:a14="http://schemas.microsoft.com/office/drawing/2010/main" w="9525">
+                <a14:hiddenLine xmlns:a14="http://schemas.microsoft.com/office/drawing/2010/main" xmlns:p14="http://schemas.microsoft.com/office/powerpoint/2010/main" xmlns:a16="http://schemas.microsoft.com/office/drawing/2014/main" xmlns="" w="9525">
                   <a:solidFill>
                     <a:srgbClr val="000000"/>
                   </a:solidFill>
@@ -20857,7 +20879,7 @@
             </a:ln>
             <a:extLst>
               <a:ext uri="{91240B29-F687-4f45-9708-019B960494DF}">
-                <a14:hiddenLine xmlns="" xmlns:a16="http://schemas.microsoft.com/office/drawing/2014/main" xmlns:p14="http://schemas.microsoft.com/office/powerpoint/2010/main" xmlns:a14="http://schemas.microsoft.com/office/drawing/2010/main" w="9525">
+                <a14:hiddenLine xmlns:a14="http://schemas.microsoft.com/office/drawing/2010/main" xmlns:p14="http://schemas.microsoft.com/office/powerpoint/2010/main" xmlns:a16="http://schemas.microsoft.com/office/drawing/2014/main" xmlns="" w="9525">
                   <a:solidFill>
                     <a:srgbClr val="000000"/>
                   </a:solidFill>
@@ -20962,7 +20984,7 @@
             </a:ln>
             <a:extLst>
               <a:ext uri="{91240B29-F687-4f45-9708-019B960494DF}">
-                <a14:hiddenLine xmlns="" xmlns:a16="http://schemas.microsoft.com/office/drawing/2014/main" xmlns:p14="http://schemas.microsoft.com/office/powerpoint/2010/main" xmlns:a14="http://schemas.microsoft.com/office/drawing/2010/main" w="9525">
+                <a14:hiddenLine xmlns:a14="http://schemas.microsoft.com/office/drawing/2010/main" xmlns:p14="http://schemas.microsoft.com/office/powerpoint/2010/main" xmlns:a16="http://schemas.microsoft.com/office/drawing/2014/main" xmlns="" w="9525">
                   <a:solidFill>
                     <a:srgbClr val="000000"/>
                   </a:solidFill>
@@ -21039,7 +21061,7 @@
             </a:ln>
             <a:extLst>
               <a:ext uri="{91240B29-F687-4f45-9708-019B960494DF}">
-                <a14:hiddenLine xmlns="" xmlns:a16="http://schemas.microsoft.com/office/drawing/2014/main" xmlns:p14="http://schemas.microsoft.com/office/powerpoint/2010/main" xmlns:a14="http://schemas.microsoft.com/office/drawing/2010/main" w="9525">
+                <a14:hiddenLine xmlns:a14="http://schemas.microsoft.com/office/drawing/2010/main" xmlns:p14="http://schemas.microsoft.com/office/powerpoint/2010/main" xmlns:a16="http://schemas.microsoft.com/office/drawing/2014/main" xmlns="" w="9525">
                   <a:solidFill>
                     <a:srgbClr val="000000"/>
                   </a:solidFill>
@@ -21164,7 +21186,7 @@
             </a:ln>
             <a:extLst>
               <a:ext uri="{91240B29-F687-4f45-9708-019B960494DF}">
-                <a14:hiddenLine xmlns="" xmlns:a16="http://schemas.microsoft.com/office/drawing/2014/main" xmlns:p14="http://schemas.microsoft.com/office/powerpoint/2010/main" xmlns:a14="http://schemas.microsoft.com/office/drawing/2010/main" w="9525">
+                <a14:hiddenLine xmlns:a14="http://schemas.microsoft.com/office/drawing/2010/main" xmlns:p14="http://schemas.microsoft.com/office/powerpoint/2010/main" xmlns:a16="http://schemas.microsoft.com/office/drawing/2014/main" xmlns="" w="9525">
                   <a:solidFill>
                     <a:srgbClr val="000000"/>
                   </a:solidFill>
@@ -21278,7 +21300,7 @@
             </a:ln>
             <a:extLst>
               <a:ext uri="{91240B29-F687-4f45-9708-019B960494DF}">
-                <a14:hiddenLine xmlns="" xmlns:a16="http://schemas.microsoft.com/office/drawing/2014/main" xmlns:p14="http://schemas.microsoft.com/office/powerpoint/2010/main" xmlns:a14="http://schemas.microsoft.com/office/drawing/2010/main" w="9525">
+                <a14:hiddenLine xmlns:a14="http://schemas.microsoft.com/office/drawing/2010/main" xmlns:p14="http://schemas.microsoft.com/office/powerpoint/2010/main" xmlns:a16="http://schemas.microsoft.com/office/drawing/2014/main" xmlns="" w="9525">
                   <a:solidFill>
                     <a:srgbClr val="000000"/>
                   </a:solidFill>
@@ -21355,7 +21377,7 @@
             </a:ln>
             <a:extLst>
               <a:ext uri="{91240B29-F687-4f45-9708-019B960494DF}">
-                <a14:hiddenLine xmlns="" xmlns:a16="http://schemas.microsoft.com/office/drawing/2014/main" xmlns:p14="http://schemas.microsoft.com/office/powerpoint/2010/main" xmlns:a14="http://schemas.microsoft.com/office/drawing/2010/main" w="9525">
+                <a14:hiddenLine xmlns:a14="http://schemas.microsoft.com/office/drawing/2010/main" xmlns:p14="http://schemas.microsoft.com/office/powerpoint/2010/main" xmlns:a16="http://schemas.microsoft.com/office/drawing/2014/main" xmlns="" w="9525">
                   <a:solidFill>
                     <a:srgbClr val="000000"/>
                   </a:solidFill>
@@ -21432,7 +21454,7 @@
             </a:ln>
             <a:extLst>
               <a:ext uri="{91240B29-F687-4f45-9708-019B960494DF}">
-                <a14:hiddenLine xmlns="" xmlns:a16="http://schemas.microsoft.com/office/drawing/2014/main" xmlns:p14="http://schemas.microsoft.com/office/powerpoint/2010/main" xmlns:a14="http://schemas.microsoft.com/office/drawing/2010/main" w="9525">
+                <a14:hiddenLine xmlns:a14="http://schemas.microsoft.com/office/drawing/2010/main" xmlns:p14="http://schemas.microsoft.com/office/powerpoint/2010/main" xmlns:a16="http://schemas.microsoft.com/office/drawing/2014/main" xmlns="" w="9525">
                   <a:solidFill>
                     <a:srgbClr val="000000"/>
                   </a:solidFill>
@@ -21537,7 +21559,7 @@
             </a:ln>
             <a:extLst>
               <a:ext uri="{91240B29-F687-4f45-9708-019B960494DF}">
-                <a14:hiddenLine xmlns="" xmlns:a16="http://schemas.microsoft.com/office/drawing/2014/main" xmlns:p14="http://schemas.microsoft.com/office/powerpoint/2010/main" xmlns:a14="http://schemas.microsoft.com/office/drawing/2010/main" w="9525">
+                <a14:hiddenLine xmlns:a14="http://schemas.microsoft.com/office/drawing/2010/main" xmlns:p14="http://schemas.microsoft.com/office/powerpoint/2010/main" xmlns:a16="http://schemas.microsoft.com/office/drawing/2014/main" xmlns="" w="9525">
                   <a:solidFill>
                     <a:srgbClr val="000000"/>
                   </a:solidFill>
@@ -21586,7 +21608,7 @@
             </a:ln>
             <a:extLst>
               <a:ext uri="{91240B29-F687-4f45-9708-019B960494DF}">
-                <a14:hiddenLine xmlns="" xmlns:a16="http://schemas.microsoft.com/office/drawing/2014/main" xmlns:p14="http://schemas.microsoft.com/office/powerpoint/2010/main" xmlns:a14="http://schemas.microsoft.com/office/drawing/2010/main" w="9525">
+                <a14:hiddenLine xmlns:a14="http://schemas.microsoft.com/office/drawing/2010/main" xmlns:p14="http://schemas.microsoft.com/office/powerpoint/2010/main" xmlns:a16="http://schemas.microsoft.com/office/drawing/2014/main" xmlns="" w="9525">
                   <a:solidFill>
                     <a:srgbClr val="000000"/>
                   </a:solidFill>
@@ -21666,7 +21688,7 @@
             </a:ln>
             <a:extLst>
               <a:ext uri="{91240B29-F687-4f45-9708-019B960494DF}">
-                <a14:hiddenLine xmlns="" xmlns:a16="http://schemas.microsoft.com/office/drawing/2014/main" xmlns:p14="http://schemas.microsoft.com/office/powerpoint/2010/main" xmlns:a14="http://schemas.microsoft.com/office/drawing/2010/main" w="9525">
+                <a14:hiddenLine xmlns:a14="http://schemas.microsoft.com/office/drawing/2010/main" xmlns:p14="http://schemas.microsoft.com/office/powerpoint/2010/main" xmlns:a16="http://schemas.microsoft.com/office/drawing/2014/main" xmlns="" w="9525">
                   <a:solidFill>
                     <a:srgbClr val="000000"/>
                   </a:solidFill>
@@ -21771,7 +21793,7 @@
             </a:ln>
             <a:extLst>
               <a:ext uri="{91240B29-F687-4f45-9708-019B960494DF}">
-                <a14:hiddenLine xmlns="" xmlns:a16="http://schemas.microsoft.com/office/drawing/2014/main" xmlns:p14="http://schemas.microsoft.com/office/powerpoint/2010/main" xmlns:a14="http://schemas.microsoft.com/office/drawing/2010/main" w="9525">
+                <a14:hiddenLine xmlns:a14="http://schemas.microsoft.com/office/drawing/2010/main" xmlns:p14="http://schemas.microsoft.com/office/powerpoint/2010/main" xmlns:a16="http://schemas.microsoft.com/office/drawing/2014/main" xmlns="" w="9525">
                   <a:solidFill>
                     <a:srgbClr val="000000"/>
                   </a:solidFill>
@@ -21848,7 +21870,7 @@
             </a:ln>
             <a:extLst>
               <a:ext uri="{91240B29-F687-4f45-9708-019B960494DF}">
-                <a14:hiddenLine xmlns="" xmlns:a16="http://schemas.microsoft.com/office/drawing/2014/main" xmlns:p14="http://schemas.microsoft.com/office/powerpoint/2010/main" xmlns:a14="http://schemas.microsoft.com/office/drawing/2010/main" w="9525">
+                <a14:hiddenLine xmlns:a14="http://schemas.microsoft.com/office/drawing/2010/main" xmlns:p14="http://schemas.microsoft.com/office/powerpoint/2010/main" xmlns:a16="http://schemas.microsoft.com/office/drawing/2014/main" xmlns="" w="9525">
                   <a:solidFill>
                     <a:srgbClr val="000000"/>
                   </a:solidFill>
@@ -21953,7 +21975,7 @@
             </a:ln>
             <a:extLst>
               <a:ext uri="{91240B29-F687-4f45-9708-019B960494DF}">
-                <a14:hiddenLine xmlns="" xmlns:a16="http://schemas.microsoft.com/office/drawing/2014/main" xmlns:p14="http://schemas.microsoft.com/office/powerpoint/2010/main" xmlns:a14="http://schemas.microsoft.com/office/drawing/2010/main" w="9525">
+                <a14:hiddenLine xmlns:a14="http://schemas.microsoft.com/office/drawing/2010/main" xmlns:p14="http://schemas.microsoft.com/office/powerpoint/2010/main" xmlns:a16="http://schemas.microsoft.com/office/drawing/2014/main" xmlns="" w="9525">
                   <a:solidFill>
                     <a:srgbClr val="000000"/>
                   </a:solidFill>
@@ -22033,7 +22055,7 @@
             </a:ln>
             <a:extLst>
               <a:ext uri="{91240B29-F687-4f45-9708-019B960494DF}">
-                <a14:hiddenLine xmlns="" xmlns:a16="http://schemas.microsoft.com/office/drawing/2014/main" xmlns:p14="http://schemas.microsoft.com/office/powerpoint/2010/main" xmlns:a14="http://schemas.microsoft.com/office/drawing/2010/main" w="9525">
+                <a14:hiddenLine xmlns:a14="http://schemas.microsoft.com/office/drawing/2010/main" xmlns:p14="http://schemas.microsoft.com/office/powerpoint/2010/main" xmlns:a16="http://schemas.microsoft.com/office/drawing/2014/main" xmlns="" w="9525">
                   <a:solidFill>
                     <a:srgbClr val="000000"/>
                   </a:solidFill>
@@ -22110,7 +22132,7 @@
             </a:ln>
             <a:extLst>
               <a:ext uri="{91240B29-F687-4f45-9708-019B960494DF}">
-                <a14:hiddenLine xmlns="" xmlns:a16="http://schemas.microsoft.com/office/drawing/2014/main" xmlns:p14="http://schemas.microsoft.com/office/powerpoint/2010/main" xmlns:a14="http://schemas.microsoft.com/office/drawing/2010/main" w="9525">
+                <a14:hiddenLine xmlns:a14="http://schemas.microsoft.com/office/drawing/2010/main" xmlns:p14="http://schemas.microsoft.com/office/powerpoint/2010/main" xmlns:a16="http://schemas.microsoft.com/office/drawing/2014/main" xmlns="" w="9525">
                   <a:solidFill>
                     <a:srgbClr val="000000"/>
                   </a:solidFill>
@@ -22215,7 +22237,7 @@
             </a:ln>
             <a:extLst>
               <a:ext uri="{91240B29-F687-4f45-9708-019B960494DF}">
-                <a14:hiddenLine xmlns="" xmlns:a16="http://schemas.microsoft.com/office/drawing/2014/main" xmlns:p14="http://schemas.microsoft.com/office/powerpoint/2010/main" xmlns:a14="http://schemas.microsoft.com/office/drawing/2010/main" w="9525">
+                <a14:hiddenLine xmlns:a14="http://schemas.microsoft.com/office/drawing/2010/main" xmlns:p14="http://schemas.microsoft.com/office/powerpoint/2010/main" xmlns:a16="http://schemas.microsoft.com/office/drawing/2014/main" xmlns="" w="9525">
                   <a:solidFill>
                     <a:srgbClr val="000000"/>
                   </a:solidFill>
@@ -22320,7 +22342,7 @@
             </a:ln>
             <a:extLst>
               <a:ext uri="{91240B29-F687-4f45-9708-019B960494DF}">
-                <a14:hiddenLine xmlns="" xmlns:a16="http://schemas.microsoft.com/office/drawing/2014/main" xmlns:p14="http://schemas.microsoft.com/office/powerpoint/2010/main" xmlns:a14="http://schemas.microsoft.com/office/drawing/2010/main" w="9525">
+                <a14:hiddenLine xmlns:a14="http://schemas.microsoft.com/office/drawing/2010/main" xmlns:p14="http://schemas.microsoft.com/office/powerpoint/2010/main" xmlns:a16="http://schemas.microsoft.com/office/drawing/2014/main" xmlns="" w="9525">
                   <a:solidFill>
                     <a:srgbClr val="000000"/>
                   </a:solidFill>
@@ -22400,7 +22422,7 @@
             </a:ln>
             <a:extLst>
               <a:ext uri="{91240B29-F687-4f45-9708-019B960494DF}">
-                <a14:hiddenLine xmlns="" xmlns:a16="http://schemas.microsoft.com/office/drawing/2014/main" xmlns:p14="http://schemas.microsoft.com/office/powerpoint/2010/main" xmlns:a14="http://schemas.microsoft.com/office/drawing/2010/main" w="9525">
+                <a14:hiddenLine xmlns:a14="http://schemas.microsoft.com/office/drawing/2010/main" xmlns:p14="http://schemas.microsoft.com/office/powerpoint/2010/main" xmlns:a16="http://schemas.microsoft.com/office/drawing/2014/main" xmlns="" w="9525">
                   <a:solidFill>
                     <a:srgbClr val="000000"/>
                   </a:solidFill>
@@ -22535,7 +22557,7 @@
             </a:ln>
             <a:extLst>
               <a:ext uri="{91240B29-F687-4f45-9708-019B960494DF}">
-                <a14:hiddenLine xmlns="" xmlns:a16="http://schemas.microsoft.com/office/drawing/2014/main" xmlns:p14="http://schemas.microsoft.com/office/powerpoint/2010/main" xmlns:a14="http://schemas.microsoft.com/office/drawing/2010/main" w="9525">
+                <a14:hiddenLine xmlns:a14="http://schemas.microsoft.com/office/drawing/2010/main" xmlns:p14="http://schemas.microsoft.com/office/powerpoint/2010/main" xmlns:a16="http://schemas.microsoft.com/office/drawing/2014/main" xmlns="" w="9525">
                   <a:solidFill>
                     <a:srgbClr val="000000"/>
                   </a:solidFill>
@@ -22667,49 +22689,49 @@
           <a:lstStyle/>
           <a:p>
             <a:r>
-              <a:rPr lang="fr-CA" sz="1800"/>
+              <a:rPr lang="fr-CA" sz="1800" dirty="0"/>
               <a:t>Créer les évènements;</a:t>
             </a:r>
           </a:p>
           <a:p>
             <a:r>
-              <a:rPr lang="fr-CA" sz="1800"/>
-              <a:t>Lister/Afficher les évènements ;</a:t>
+              <a:rPr lang="fr-CA" sz="1800" dirty="0"/>
+              <a:t>Lister/Afficher les évènements;</a:t>
             </a:r>
           </a:p>
           <a:p>
             <a:r>
-              <a:rPr lang="fr-CA" sz="1800"/>
+              <a:rPr lang="fr-CA" sz="1800" dirty="0"/>
               <a:t>Création des équipes;</a:t>
             </a:r>
           </a:p>
           <a:p>
             <a:r>
-              <a:rPr lang="fr-CA" sz="1800"/>
+              <a:rPr lang="fr-CA" sz="1800" dirty="0"/>
               <a:t>Formulaire fonctionnel;</a:t>
             </a:r>
           </a:p>
           <a:p>
             <a:r>
-              <a:rPr lang="fr-CA" sz="1800"/>
+              <a:rPr lang="fr-CA" sz="1800" dirty="0"/>
               <a:t>Ajout évènements par un CSV;</a:t>
             </a:r>
             <a:br>
-              <a:rPr lang="fr-CA" sz="1800"/>
+              <a:rPr lang="fr-CA" sz="1800" dirty="0"/>
             </a:br>
             <a:br>
-              <a:rPr lang="fr-CA" sz="1800"/>
+              <a:rPr lang="fr-CA" sz="1800" dirty="0"/>
             </a:br>
             <a:br>
-              <a:rPr lang="fr-CA" sz="1800"/>
+              <a:rPr lang="fr-CA" sz="1800" dirty="0"/>
             </a:br>
             <a:br>
-              <a:rPr lang="fr-CA" sz="1800"/>
+              <a:rPr lang="fr-CA" sz="1800" dirty="0"/>
             </a:br>
             <a:br>
-              <a:rPr lang="fr-CA" sz="1800"/>
+              <a:rPr lang="fr-CA" sz="1800" dirty="0"/>
             </a:br>
-            <a:endParaRPr lang="fr-CA" sz="1800"/>
+            <a:endParaRPr lang="fr-CA" sz="1800" dirty="0"/>
           </a:p>
         </p:txBody>
       </p:sp>
@@ -22817,7 +22839,7 @@
             </a:ln>
             <a:extLst>
               <a:ext uri="{91240B29-F687-4f45-9708-019B960494DF}">
-                <a14:hiddenLine xmlns="" xmlns:a16="http://schemas.microsoft.com/office/drawing/2014/main" xmlns:p14="http://schemas.microsoft.com/office/powerpoint/2010/main" xmlns:a14="http://schemas.microsoft.com/office/drawing/2010/main" w="9525">
+                <a14:hiddenLine xmlns:a14="http://schemas.microsoft.com/office/drawing/2010/main" xmlns:p14="http://schemas.microsoft.com/office/powerpoint/2010/main" xmlns:a16="http://schemas.microsoft.com/office/drawing/2014/main" xmlns="" w="9525">
                   <a:solidFill>
                     <a:srgbClr val="000000"/>
                   </a:solidFill>
@@ -22947,7 +22969,7 @@
             </a:ln>
             <a:extLst>
               <a:ext uri="{91240B29-F687-4f45-9708-019B960494DF}">
-                <a14:hiddenLine xmlns="" xmlns:a16="http://schemas.microsoft.com/office/drawing/2014/main" xmlns:p14="http://schemas.microsoft.com/office/powerpoint/2010/main" xmlns:a14="http://schemas.microsoft.com/office/drawing/2010/main" w="9525">
+                <a14:hiddenLine xmlns:a14="http://schemas.microsoft.com/office/drawing/2010/main" xmlns:p14="http://schemas.microsoft.com/office/powerpoint/2010/main" xmlns:a16="http://schemas.microsoft.com/office/drawing/2014/main" xmlns="" w="9525">
                   <a:solidFill>
                     <a:srgbClr val="000000"/>
                   </a:solidFill>
@@ -23052,7 +23074,7 @@
             </a:ln>
             <a:extLst>
               <a:ext uri="{91240B29-F687-4f45-9708-019B960494DF}">
-                <a14:hiddenLine xmlns="" xmlns:a16="http://schemas.microsoft.com/office/drawing/2014/main" xmlns:p14="http://schemas.microsoft.com/office/powerpoint/2010/main" xmlns:a14="http://schemas.microsoft.com/office/drawing/2010/main" w="9525">
+                <a14:hiddenLine xmlns:a14="http://schemas.microsoft.com/office/drawing/2010/main" xmlns:p14="http://schemas.microsoft.com/office/powerpoint/2010/main" xmlns:a16="http://schemas.microsoft.com/office/drawing/2014/main" xmlns="" w="9525">
                   <a:solidFill>
                     <a:srgbClr val="000000"/>
                   </a:solidFill>
@@ -23132,7 +23154,7 @@
             </a:ln>
             <a:extLst>
               <a:ext uri="{91240B29-F687-4f45-9708-019B960494DF}">
-                <a14:hiddenLine xmlns="" xmlns:a16="http://schemas.microsoft.com/office/drawing/2014/main" xmlns:p14="http://schemas.microsoft.com/office/powerpoint/2010/main" xmlns:a14="http://schemas.microsoft.com/office/drawing/2010/main" w="9525">
+                <a14:hiddenLine xmlns:a14="http://schemas.microsoft.com/office/drawing/2010/main" xmlns:p14="http://schemas.microsoft.com/office/powerpoint/2010/main" xmlns:a16="http://schemas.microsoft.com/office/drawing/2014/main" xmlns="" w="9525">
                   <a:solidFill>
                     <a:srgbClr val="000000"/>
                   </a:solidFill>
@@ -23237,7 +23259,7 @@
             </a:ln>
             <a:extLst>
               <a:ext uri="{91240B29-F687-4f45-9708-019B960494DF}">
-                <a14:hiddenLine xmlns="" xmlns:a16="http://schemas.microsoft.com/office/drawing/2014/main" xmlns:p14="http://schemas.microsoft.com/office/powerpoint/2010/main" xmlns:a14="http://schemas.microsoft.com/office/drawing/2010/main" w="9525">
+                <a14:hiddenLine xmlns:a14="http://schemas.microsoft.com/office/drawing/2010/main" xmlns:p14="http://schemas.microsoft.com/office/powerpoint/2010/main" xmlns:a16="http://schemas.microsoft.com/office/drawing/2014/main" xmlns="" w="9525">
                   <a:solidFill>
                     <a:srgbClr val="000000"/>
                   </a:solidFill>
@@ -23320,7 +23342,7 @@
             </a:ln>
             <a:extLst>
               <a:ext uri="{91240B29-F687-4f45-9708-019B960494DF}">
-                <a14:hiddenLine xmlns="" xmlns:a16="http://schemas.microsoft.com/office/drawing/2014/main" xmlns:p14="http://schemas.microsoft.com/office/powerpoint/2010/main" xmlns:a14="http://schemas.microsoft.com/office/drawing/2010/main" w="9525">
+                <a14:hiddenLine xmlns:a14="http://schemas.microsoft.com/office/drawing/2010/main" xmlns:p14="http://schemas.microsoft.com/office/powerpoint/2010/main" xmlns:a16="http://schemas.microsoft.com/office/drawing/2014/main" xmlns="" w="9525">
                   <a:solidFill>
                     <a:srgbClr val="000000"/>
                   </a:solidFill>
@@ -23425,7 +23447,7 @@
             </a:ln>
             <a:extLst>
               <a:ext uri="{91240B29-F687-4f45-9708-019B960494DF}">
-                <a14:hiddenLine xmlns="" xmlns:a16="http://schemas.microsoft.com/office/drawing/2014/main" xmlns:p14="http://schemas.microsoft.com/office/powerpoint/2010/main" xmlns:a14="http://schemas.microsoft.com/office/drawing/2010/main" w="9525">
+                <a14:hiddenLine xmlns:a14="http://schemas.microsoft.com/office/drawing/2010/main" xmlns:p14="http://schemas.microsoft.com/office/powerpoint/2010/main" xmlns:a16="http://schemas.microsoft.com/office/drawing/2014/main" xmlns="" w="9525">
                   <a:solidFill>
                     <a:srgbClr val="000000"/>
                   </a:solidFill>
@@ -23508,7 +23530,7 @@
             </a:ln>
             <a:extLst>
               <a:ext uri="{91240B29-F687-4f45-9708-019B960494DF}">
-                <a14:hiddenLine xmlns="" xmlns:a16="http://schemas.microsoft.com/office/drawing/2014/main" xmlns:p14="http://schemas.microsoft.com/office/powerpoint/2010/main" xmlns:a14="http://schemas.microsoft.com/office/drawing/2010/main" w="9525">
+                <a14:hiddenLine xmlns:a14="http://schemas.microsoft.com/office/drawing/2010/main" xmlns:p14="http://schemas.microsoft.com/office/powerpoint/2010/main" xmlns:a16="http://schemas.microsoft.com/office/drawing/2014/main" xmlns="" w="9525">
                   <a:solidFill>
                     <a:srgbClr val="000000"/>
                   </a:solidFill>
@@ -23613,7 +23635,7 @@
             </a:ln>
             <a:extLst>
               <a:ext uri="{91240B29-F687-4f45-9708-019B960494DF}">
-                <a14:hiddenLine xmlns="" xmlns:a16="http://schemas.microsoft.com/office/drawing/2014/main" xmlns:p14="http://schemas.microsoft.com/office/powerpoint/2010/main" xmlns:a14="http://schemas.microsoft.com/office/drawing/2010/main" w="9525">
+                <a14:hiddenLine xmlns:a14="http://schemas.microsoft.com/office/drawing/2010/main" xmlns:p14="http://schemas.microsoft.com/office/powerpoint/2010/main" xmlns:a16="http://schemas.microsoft.com/office/drawing/2014/main" xmlns="" w="9525">
                   <a:solidFill>
                     <a:srgbClr val="000000"/>
                   </a:solidFill>
@@ -23662,7 +23684,7 @@
             </a:ln>
             <a:extLst>
               <a:ext uri="{91240B29-F687-4f45-9708-019B960494DF}">
-                <a14:hiddenLine xmlns="" xmlns:a16="http://schemas.microsoft.com/office/drawing/2014/main" xmlns:p14="http://schemas.microsoft.com/office/powerpoint/2010/main" xmlns:a14="http://schemas.microsoft.com/office/drawing/2010/main" w="9525">
+                <a14:hiddenLine xmlns:a14="http://schemas.microsoft.com/office/drawing/2010/main" xmlns:p14="http://schemas.microsoft.com/office/powerpoint/2010/main" xmlns:a16="http://schemas.microsoft.com/office/drawing/2014/main" xmlns="" w="9525">
                   <a:solidFill>
                     <a:srgbClr val="000000"/>
                   </a:solidFill>
@@ -23779,7 +23801,7 @@
           <a:noFill/>
           <a:extLst>
             <a:ext uri="{909E8E84-426E-40dd-AFC4-6F175D3DCCD1}">
-              <a14:hiddenFill xmlns="" xmlns:a16="http://schemas.microsoft.com/office/drawing/2014/main" xmlns:a14="http://schemas.microsoft.com/office/drawing/2010/main">
+              <a14:hiddenFill xmlns:a14="http://schemas.microsoft.com/office/drawing/2010/main" xmlns:a16="http://schemas.microsoft.com/office/drawing/2014/main" xmlns="">
                 <a:solidFill>
                   <a:srgbClr val="FFFFFF"/>
                 </a:solidFill>
@@ -23871,7 +23893,7 @@
             </a:ln>
             <a:extLst>
               <a:ext uri="{91240B29-F687-4f45-9708-019B960494DF}">
-                <a14:hiddenLine xmlns="" xmlns:a16="http://schemas.microsoft.com/office/drawing/2014/main" xmlns:a14="http://schemas.microsoft.com/office/drawing/2010/main" w="9525">
+                <a14:hiddenLine xmlns:a14="http://schemas.microsoft.com/office/drawing/2010/main" xmlns:a16="http://schemas.microsoft.com/office/drawing/2014/main" xmlns="" w="9525">
                   <a:solidFill>
                     <a:srgbClr val="000000"/>
                   </a:solidFill>
@@ -23976,7 +23998,7 @@
             </a:ln>
             <a:extLst>
               <a:ext uri="{91240B29-F687-4f45-9708-019B960494DF}">
-                <a14:hiddenLine xmlns="" xmlns:a16="http://schemas.microsoft.com/office/drawing/2014/main" xmlns:a14="http://schemas.microsoft.com/office/drawing/2010/main" w="9525">
+                <a14:hiddenLine xmlns:a14="http://schemas.microsoft.com/office/drawing/2010/main" xmlns:a16="http://schemas.microsoft.com/office/drawing/2014/main" xmlns="" w="9525">
                   <a:solidFill>
                     <a:srgbClr val="000000"/>
                   </a:solidFill>
@@ -24081,7 +24103,7 @@
             </a:ln>
             <a:extLst>
               <a:ext uri="{91240B29-F687-4f45-9708-019B960494DF}">
-                <a14:hiddenLine xmlns="" xmlns:a16="http://schemas.microsoft.com/office/drawing/2014/main" xmlns:a14="http://schemas.microsoft.com/office/drawing/2010/main" w="9525">
+                <a14:hiddenLine xmlns:a14="http://schemas.microsoft.com/office/drawing/2010/main" xmlns:a16="http://schemas.microsoft.com/office/drawing/2014/main" xmlns="" w="9525">
                   <a:solidFill>
                     <a:srgbClr val="000000"/>
                   </a:solidFill>
@@ -24130,7 +24152,7 @@
             </a:ln>
             <a:extLst>
               <a:ext uri="{91240B29-F687-4f45-9708-019B960494DF}">
-                <a14:hiddenLine xmlns="" xmlns:a16="http://schemas.microsoft.com/office/drawing/2014/main" xmlns:a14="http://schemas.microsoft.com/office/drawing/2010/main" w="9525">
+                <a14:hiddenLine xmlns:a14="http://schemas.microsoft.com/office/drawing/2010/main" xmlns:a16="http://schemas.microsoft.com/office/drawing/2014/main" xmlns="" w="9525">
                   <a:solidFill>
                     <a:srgbClr val="000000"/>
                   </a:solidFill>
@@ -24235,7 +24257,7 @@
             </a:ln>
             <a:extLst>
               <a:ext uri="{91240B29-F687-4f45-9708-019B960494DF}">
-                <a14:hiddenLine xmlns="" xmlns:a16="http://schemas.microsoft.com/office/drawing/2014/main" xmlns:a14="http://schemas.microsoft.com/office/drawing/2010/main" w="9525">
+                <a14:hiddenLine xmlns:a14="http://schemas.microsoft.com/office/drawing/2010/main" xmlns:a16="http://schemas.microsoft.com/office/drawing/2014/main" xmlns="" w="9525">
                   <a:solidFill>
                     <a:srgbClr val="000000"/>
                   </a:solidFill>
@@ -24312,7 +24334,7 @@
             </a:ln>
             <a:extLst>
               <a:ext uri="{91240B29-F687-4f45-9708-019B960494DF}">
-                <a14:hiddenLine xmlns="" xmlns:a16="http://schemas.microsoft.com/office/drawing/2014/main" xmlns:a14="http://schemas.microsoft.com/office/drawing/2010/main" w="9525">
+                <a14:hiddenLine xmlns:a14="http://schemas.microsoft.com/office/drawing/2010/main" xmlns:a16="http://schemas.microsoft.com/office/drawing/2014/main" xmlns="" w="9525">
                   <a:solidFill>
                     <a:srgbClr val="000000"/>
                   </a:solidFill>
@@ -24389,7 +24411,7 @@
             </a:ln>
             <a:extLst>
               <a:ext uri="{91240B29-F687-4f45-9708-019B960494DF}">
-                <a14:hiddenLine xmlns="" xmlns:a16="http://schemas.microsoft.com/office/drawing/2014/main" xmlns:a14="http://schemas.microsoft.com/office/drawing/2010/main" w="9525">
+                <a14:hiddenLine xmlns:a14="http://schemas.microsoft.com/office/drawing/2010/main" xmlns:a16="http://schemas.microsoft.com/office/drawing/2014/main" xmlns="" w="9525">
                   <a:solidFill>
                     <a:srgbClr val="000000"/>
                   </a:solidFill>
@@ -24494,7 +24516,7 @@
             </a:ln>
             <a:extLst>
               <a:ext uri="{91240B29-F687-4f45-9708-019B960494DF}">
-                <a14:hiddenLine xmlns="" xmlns:a16="http://schemas.microsoft.com/office/drawing/2014/main" xmlns:a14="http://schemas.microsoft.com/office/drawing/2010/main" w="9525">
+                <a14:hiddenLine xmlns:a14="http://schemas.microsoft.com/office/drawing/2010/main" xmlns:a16="http://schemas.microsoft.com/office/drawing/2014/main" xmlns="" w="9525">
                   <a:solidFill>
                     <a:srgbClr val="000000"/>
                   </a:solidFill>
@@ -24571,7 +24593,7 @@
             </a:ln>
             <a:extLst>
               <a:ext uri="{91240B29-F687-4f45-9708-019B960494DF}">
-                <a14:hiddenLine xmlns="" xmlns:a16="http://schemas.microsoft.com/office/drawing/2014/main" xmlns:a14="http://schemas.microsoft.com/office/drawing/2010/main" w="9525">
+                <a14:hiddenLine xmlns:a14="http://schemas.microsoft.com/office/drawing/2010/main" xmlns:a16="http://schemas.microsoft.com/office/drawing/2014/main" xmlns="" w="9525">
                   <a:solidFill>
                     <a:srgbClr val="000000"/>
                   </a:solidFill>
@@ -24648,7 +24670,7 @@
             </a:ln>
             <a:extLst>
               <a:ext uri="{91240B29-F687-4f45-9708-019B960494DF}">
-                <a14:hiddenLine xmlns="" xmlns:a16="http://schemas.microsoft.com/office/drawing/2014/main" xmlns:a14="http://schemas.microsoft.com/office/drawing/2010/main" w="9525">
+                <a14:hiddenLine xmlns:a14="http://schemas.microsoft.com/office/drawing/2010/main" xmlns:a16="http://schemas.microsoft.com/office/drawing/2014/main" xmlns="" w="9525">
                   <a:solidFill>
                     <a:srgbClr val="000000"/>
                   </a:solidFill>
@@ -24753,7 +24775,7 @@
             </a:ln>
             <a:extLst>
               <a:ext uri="{91240B29-F687-4f45-9708-019B960494DF}">
-                <a14:hiddenLine xmlns="" xmlns:a16="http://schemas.microsoft.com/office/drawing/2014/main" xmlns:a14="http://schemas.microsoft.com/office/drawing/2010/main" w="9525">
+                <a14:hiddenLine xmlns:a14="http://schemas.microsoft.com/office/drawing/2010/main" xmlns:a16="http://schemas.microsoft.com/office/drawing/2014/main" xmlns="" w="9525">
                   <a:solidFill>
                     <a:srgbClr val="000000"/>
                   </a:solidFill>
@@ -24858,7 +24880,7 @@
             </a:ln>
             <a:extLst>
               <a:ext uri="{91240B29-F687-4f45-9708-019B960494DF}">
-                <a14:hiddenLine xmlns="" xmlns:a16="http://schemas.microsoft.com/office/drawing/2014/main" xmlns:a14="http://schemas.microsoft.com/office/drawing/2010/main" w="9525">
+                <a14:hiddenLine xmlns:a14="http://schemas.microsoft.com/office/drawing/2010/main" xmlns:a16="http://schemas.microsoft.com/office/drawing/2014/main" xmlns="" w="9525">
                   <a:solidFill>
                     <a:srgbClr val="000000"/>
                   </a:solidFill>
@@ -24935,7 +24957,7 @@
             </a:ln>
             <a:extLst>
               <a:ext uri="{91240B29-F687-4f45-9708-019B960494DF}">
-                <a14:hiddenLine xmlns="" xmlns:a16="http://schemas.microsoft.com/office/drawing/2014/main" xmlns:a14="http://schemas.microsoft.com/office/drawing/2010/main" w="9525">
+                <a14:hiddenLine xmlns:a14="http://schemas.microsoft.com/office/drawing/2010/main" xmlns:a16="http://schemas.microsoft.com/office/drawing/2014/main" xmlns="" w="9525">
                   <a:solidFill>
                     <a:srgbClr val="000000"/>
                   </a:solidFill>
@@ -25060,7 +25082,7 @@
             </a:ln>
             <a:extLst>
               <a:ext uri="{91240B29-F687-4f45-9708-019B960494DF}">
-                <a14:hiddenLine xmlns="" xmlns:a16="http://schemas.microsoft.com/office/drawing/2014/main" xmlns:a14="http://schemas.microsoft.com/office/drawing/2010/main" w="9525">
+                <a14:hiddenLine xmlns:a14="http://schemas.microsoft.com/office/drawing/2010/main" xmlns:a16="http://schemas.microsoft.com/office/drawing/2014/main" xmlns="" w="9525">
                   <a:solidFill>
                     <a:srgbClr val="000000"/>
                   </a:solidFill>
@@ -25137,7 +25159,7 @@
             </a:ln>
             <a:extLst>
               <a:ext uri="{91240B29-F687-4f45-9708-019B960494DF}">
-                <a14:hiddenLine xmlns="" xmlns:a16="http://schemas.microsoft.com/office/drawing/2014/main" xmlns:a14="http://schemas.microsoft.com/office/drawing/2010/main" w="9525">
+                <a14:hiddenLine xmlns:a14="http://schemas.microsoft.com/office/drawing/2010/main" xmlns:a16="http://schemas.microsoft.com/office/drawing/2014/main" xmlns="" w="9525">
                   <a:solidFill>
                     <a:srgbClr val="000000"/>
                   </a:solidFill>
@@ -25242,7 +25264,7 @@
             </a:ln>
             <a:extLst>
               <a:ext uri="{91240B29-F687-4f45-9708-019B960494DF}">
-                <a14:hiddenLine xmlns="" xmlns:a16="http://schemas.microsoft.com/office/drawing/2014/main" xmlns:a14="http://schemas.microsoft.com/office/drawing/2010/main" w="9525">
+                <a14:hiddenLine xmlns:a14="http://schemas.microsoft.com/office/drawing/2010/main" xmlns:a16="http://schemas.microsoft.com/office/drawing/2014/main" xmlns="" w="9525">
                   <a:solidFill>
                     <a:srgbClr val="000000"/>
                   </a:solidFill>
@@ -25347,7 +25369,7 @@
             </a:ln>
             <a:extLst>
               <a:ext uri="{91240B29-F687-4f45-9708-019B960494DF}">
-                <a14:hiddenLine xmlns="" xmlns:a16="http://schemas.microsoft.com/office/drawing/2014/main" xmlns:a14="http://schemas.microsoft.com/office/drawing/2010/main" w="9525">
+                <a14:hiddenLine xmlns:a14="http://schemas.microsoft.com/office/drawing/2010/main" xmlns:a16="http://schemas.microsoft.com/office/drawing/2014/main" xmlns="" w="9525">
                   <a:solidFill>
                     <a:srgbClr val="000000"/>
                   </a:solidFill>
@@ -25424,7 +25446,7 @@
             </a:ln>
             <a:extLst>
               <a:ext uri="{91240B29-F687-4f45-9708-019B960494DF}">
-                <a14:hiddenLine xmlns="" xmlns:a16="http://schemas.microsoft.com/office/drawing/2014/main" xmlns:a14="http://schemas.microsoft.com/office/drawing/2010/main" w="9525">
+                <a14:hiddenLine xmlns:a14="http://schemas.microsoft.com/office/drawing/2010/main" xmlns:a16="http://schemas.microsoft.com/office/drawing/2014/main" xmlns="" w="9525">
                   <a:solidFill>
                     <a:srgbClr val="000000"/>
                   </a:solidFill>
@@ -25529,7 +25551,7 @@
             </a:ln>
             <a:extLst>
               <a:ext uri="{91240B29-F687-4f45-9708-019B960494DF}">
-                <a14:hiddenLine xmlns="" xmlns:a16="http://schemas.microsoft.com/office/drawing/2014/main" xmlns:a14="http://schemas.microsoft.com/office/drawing/2010/main" w="9525">
+                <a14:hiddenLine xmlns:a14="http://schemas.microsoft.com/office/drawing/2010/main" xmlns:a16="http://schemas.microsoft.com/office/drawing/2014/main" xmlns="" w="9525">
                   <a:solidFill>
                     <a:srgbClr val="000000"/>
                   </a:solidFill>
@@ -25634,7 +25656,7 @@
             </a:ln>
             <a:extLst>
               <a:ext uri="{91240B29-F687-4f45-9708-019B960494DF}">
-                <a14:hiddenLine xmlns="" xmlns:a16="http://schemas.microsoft.com/office/drawing/2014/main" xmlns:a14="http://schemas.microsoft.com/office/drawing/2010/main" w="9525">
+                <a14:hiddenLine xmlns:a14="http://schemas.microsoft.com/office/drawing/2010/main" xmlns:a16="http://schemas.microsoft.com/office/drawing/2014/main" xmlns="" w="9525">
                   <a:solidFill>
                     <a:srgbClr val="000000"/>
                   </a:solidFill>
@@ -25705,7 +25727,7 @@
             </a:ln>
             <a:extLst>
               <a:ext uri="{91240B29-F687-4f45-9708-019B960494DF}">
-                <a14:hiddenLine xmlns="" xmlns:a16="http://schemas.microsoft.com/office/drawing/2014/main" xmlns:a14="http://schemas.microsoft.com/office/drawing/2010/main" w="9525">
+                <a14:hiddenLine xmlns:a14="http://schemas.microsoft.com/office/drawing/2010/main" xmlns:a16="http://schemas.microsoft.com/office/drawing/2014/main" xmlns="" w="9525">
                   <a:solidFill>
                     <a:srgbClr val="000000"/>
                   </a:solidFill>
@@ -25810,7 +25832,7 @@
             </a:ln>
             <a:extLst>
               <a:ext uri="{91240B29-F687-4f45-9708-019B960494DF}">
-                <a14:hiddenLine xmlns="" xmlns:a16="http://schemas.microsoft.com/office/drawing/2014/main" xmlns:a14="http://schemas.microsoft.com/office/drawing/2010/main" w="9525">
+                <a14:hiddenLine xmlns:a14="http://schemas.microsoft.com/office/drawing/2010/main" xmlns:a16="http://schemas.microsoft.com/office/drawing/2014/main" xmlns="" w="9525">
                   <a:solidFill>
                     <a:srgbClr val="000000"/>
                   </a:solidFill>
@@ -25881,7 +25903,7 @@
             </a:ln>
             <a:extLst>
               <a:ext uri="{91240B29-F687-4f45-9708-019B960494DF}">
-                <a14:hiddenLine xmlns="" xmlns:a16="http://schemas.microsoft.com/office/drawing/2014/main" xmlns:a14="http://schemas.microsoft.com/office/drawing/2010/main" w="9525">
+                <a14:hiddenLine xmlns:a14="http://schemas.microsoft.com/office/drawing/2010/main" xmlns:a16="http://schemas.microsoft.com/office/drawing/2014/main" xmlns="" w="9525">
                   <a:solidFill>
                     <a:srgbClr val="000000"/>
                   </a:solidFill>
@@ -25986,7 +26008,7 @@
             </a:ln>
             <a:extLst>
               <a:ext uri="{91240B29-F687-4f45-9708-019B960494DF}">
-                <a14:hiddenLine xmlns="" xmlns:a16="http://schemas.microsoft.com/office/drawing/2014/main" xmlns:a14="http://schemas.microsoft.com/office/drawing/2010/main" w="9525">
+                <a14:hiddenLine xmlns:a14="http://schemas.microsoft.com/office/drawing/2010/main" xmlns:a16="http://schemas.microsoft.com/office/drawing/2014/main" xmlns="" w="9525">
                   <a:solidFill>
                     <a:srgbClr val="000000"/>
                   </a:solidFill>
@@ -26069,7 +26091,7 @@
             </a:ln>
             <a:extLst>
               <a:ext uri="{91240B29-F687-4f45-9708-019B960494DF}">
-                <a14:hiddenLine xmlns="" xmlns:a16="http://schemas.microsoft.com/office/drawing/2014/main" xmlns:a14="http://schemas.microsoft.com/office/drawing/2010/main" w="9525">
+                <a14:hiddenLine xmlns:a14="http://schemas.microsoft.com/office/drawing/2010/main" xmlns:a16="http://schemas.microsoft.com/office/drawing/2014/main" xmlns="" w="9525">
                   <a:solidFill>
                     <a:srgbClr val="000000"/>
                   </a:solidFill>
@@ -26174,7 +26196,7 @@
             </a:ln>
             <a:extLst>
               <a:ext uri="{91240B29-F687-4f45-9708-019B960494DF}">
-                <a14:hiddenLine xmlns="" xmlns:a16="http://schemas.microsoft.com/office/drawing/2014/main" xmlns:a14="http://schemas.microsoft.com/office/drawing/2010/main" w="9525">
+                <a14:hiddenLine xmlns:a14="http://schemas.microsoft.com/office/drawing/2010/main" xmlns:a16="http://schemas.microsoft.com/office/drawing/2014/main" xmlns="" w="9525">
                   <a:solidFill>
                     <a:srgbClr val="000000"/>
                   </a:solidFill>
@@ -26257,7 +26279,7 @@
             </a:ln>
             <a:extLst>
               <a:ext uri="{91240B29-F687-4f45-9708-019B960494DF}">
-                <a14:hiddenLine xmlns="" xmlns:a16="http://schemas.microsoft.com/office/drawing/2014/main" xmlns:a14="http://schemas.microsoft.com/office/drawing/2010/main" w="9525">
+                <a14:hiddenLine xmlns:a14="http://schemas.microsoft.com/office/drawing/2010/main" xmlns:a16="http://schemas.microsoft.com/office/drawing/2014/main" xmlns="" w="9525">
                   <a:solidFill>
                     <a:srgbClr val="000000"/>
                   </a:solidFill>
@@ -26362,7 +26384,7 @@
             </a:ln>
             <a:extLst>
               <a:ext uri="{91240B29-F687-4f45-9708-019B960494DF}">
-                <a14:hiddenLine xmlns="" xmlns:a16="http://schemas.microsoft.com/office/drawing/2014/main" xmlns:a14="http://schemas.microsoft.com/office/drawing/2010/main" w="9525">
+                <a14:hiddenLine xmlns:a14="http://schemas.microsoft.com/office/drawing/2010/main" xmlns:a16="http://schemas.microsoft.com/office/drawing/2014/main" xmlns="" w="9525">
                   <a:solidFill>
                     <a:srgbClr val="000000"/>
                   </a:solidFill>
@@ -26411,7 +26433,7 @@
             </a:ln>
             <a:extLst>
               <a:ext uri="{91240B29-F687-4f45-9708-019B960494DF}">
-                <a14:hiddenLine xmlns="" xmlns:a16="http://schemas.microsoft.com/office/drawing/2014/main" xmlns:a14="http://schemas.microsoft.com/office/drawing/2010/main" w="9525">
+                <a14:hiddenLine xmlns:a14="http://schemas.microsoft.com/office/drawing/2010/main" xmlns:a16="http://schemas.microsoft.com/office/drawing/2014/main" xmlns="" w="9525">
                   <a:solidFill>
                     <a:srgbClr val="000000"/>
                   </a:solidFill>
@@ -26516,7 +26538,7 @@
             </a:ln>
             <a:extLst>
               <a:ext uri="{91240B29-F687-4f45-9708-019B960494DF}">
-                <a14:hiddenLine xmlns="" xmlns:a16="http://schemas.microsoft.com/office/drawing/2014/main" xmlns:a14="http://schemas.microsoft.com/office/drawing/2010/main" w="9525">
+                <a14:hiddenLine xmlns:a14="http://schemas.microsoft.com/office/drawing/2010/main" xmlns:a16="http://schemas.microsoft.com/office/drawing/2014/main" xmlns="" w="9525">
                   <a:solidFill>
                     <a:srgbClr val="000000"/>
                   </a:solidFill>
@@ -26593,7 +26615,7 @@
             </a:ln>
             <a:extLst>
               <a:ext uri="{91240B29-F687-4f45-9708-019B960494DF}">
-                <a14:hiddenLine xmlns="" xmlns:a16="http://schemas.microsoft.com/office/drawing/2014/main" xmlns:a14="http://schemas.microsoft.com/office/drawing/2010/main" w="9525">
+                <a14:hiddenLine xmlns:a14="http://schemas.microsoft.com/office/drawing/2010/main" xmlns:a16="http://schemas.microsoft.com/office/drawing/2014/main" xmlns="" w="9525">
                   <a:solidFill>
                     <a:srgbClr val="000000"/>
                   </a:solidFill>
@@ -26670,7 +26692,7 @@
             </a:ln>
             <a:extLst>
               <a:ext uri="{91240B29-F687-4f45-9708-019B960494DF}">
-                <a14:hiddenLine xmlns="" xmlns:a16="http://schemas.microsoft.com/office/drawing/2014/main" xmlns:a14="http://schemas.microsoft.com/office/drawing/2010/main" w="9525">
+                <a14:hiddenLine xmlns:a14="http://schemas.microsoft.com/office/drawing/2010/main" xmlns:a16="http://schemas.microsoft.com/office/drawing/2014/main" xmlns="" w="9525">
                   <a:solidFill>
                     <a:srgbClr val="000000"/>
                   </a:solidFill>
@@ -26775,7 +26797,7 @@
             </a:ln>
             <a:extLst>
               <a:ext uri="{91240B29-F687-4f45-9708-019B960494DF}">
-                <a14:hiddenLine xmlns="" xmlns:a16="http://schemas.microsoft.com/office/drawing/2014/main" xmlns:a14="http://schemas.microsoft.com/office/drawing/2010/main" w="9525">
+                <a14:hiddenLine xmlns:a14="http://schemas.microsoft.com/office/drawing/2010/main" xmlns:a16="http://schemas.microsoft.com/office/drawing/2014/main" xmlns="" w="9525">
                   <a:solidFill>
                     <a:srgbClr val="000000"/>
                   </a:solidFill>
@@ -26858,7 +26880,7 @@
             </a:ln>
             <a:extLst>
               <a:ext uri="{91240B29-F687-4f45-9708-019B960494DF}">
-                <a14:hiddenLine xmlns="" xmlns:a16="http://schemas.microsoft.com/office/drawing/2014/main" xmlns:a14="http://schemas.microsoft.com/office/drawing/2010/main" w="9525">
+                <a14:hiddenLine xmlns:a14="http://schemas.microsoft.com/office/drawing/2010/main" xmlns:a16="http://schemas.microsoft.com/office/drawing/2014/main" xmlns="" w="9525">
                   <a:solidFill>
                     <a:srgbClr val="000000"/>
                   </a:solidFill>
@@ -26935,7 +26957,7 @@
             </a:ln>
             <a:extLst>
               <a:ext uri="{91240B29-F687-4f45-9708-019B960494DF}">
-                <a14:hiddenLine xmlns="" xmlns:a16="http://schemas.microsoft.com/office/drawing/2014/main" xmlns:a14="http://schemas.microsoft.com/office/drawing/2010/main" w="9525">
+                <a14:hiddenLine xmlns:a14="http://schemas.microsoft.com/office/drawing/2010/main" xmlns:a16="http://schemas.microsoft.com/office/drawing/2014/main" xmlns="" w="9525">
                   <a:solidFill>
                     <a:srgbClr val="000000"/>
                   </a:solidFill>
@@ -27040,7 +27062,7 @@
             </a:ln>
             <a:extLst>
               <a:ext uri="{91240B29-F687-4f45-9708-019B960494DF}">
-                <a14:hiddenLine xmlns="" xmlns:a16="http://schemas.microsoft.com/office/drawing/2014/main" xmlns:a14="http://schemas.microsoft.com/office/drawing/2010/main" w="9525">
+                <a14:hiddenLine xmlns:a14="http://schemas.microsoft.com/office/drawing/2010/main" xmlns:a16="http://schemas.microsoft.com/office/drawing/2014/main" xmlns="" w="9525">
                   <a:solidFill>
                     <a:srgbClr val="000000"/>
                   </a:solidFill>
@@ -27117,7 +27139,7 @@
             </a:ln>
             <a:extLst>
               <a:ext uri="{91240B29-F687-4f45-9708-019B960494DF}">
-                <a14:hiddenLine xmlns="" xmlns:a16="http://schemas.microsoft.com/office/drawing/2014/main" xmlns:a14="http://schemas.microsoft.com/office/drawing/2010/main" w="9525">
+                <a14:hiddenLine xmlns:a14="http://schemas.microsoft.com/office/drawing/2010/main" xmlns:a16="http://schemas.microsoft.com/office/drawing/2014/main" xmlns="" w="9525">
                   <a:solidFill>
                     <a:srgbClr val="000000"/>
                   </a:solidFill>
@@ -27222,7 +27244,7 @@
             </a:ln>
             <a:extLst>
               <a:ext uri="{91240B29-F687-4f45-9708-019B960494DF}">
-                <a14:hiddenLine xmlns="" xmlns:a16="http://schemas.microsoft.com/office/drawing/2014/main" xmlns:a14="http://schemas.microsoft.com/office/drawing/2010/main" w="9525">
+                <a14:hiddenLine xmlns:a14="http://schemas.microsoft.com/office/drawing/2010/main" xmlns:a16="http://schemas.microsoft.com/office/drawing/2014/main" xmlns="" w="9525">
                   <a:solidFill>
                     <a:srgbClr val="000000"/>
                   </a:solidFill>
@@ -27299,7 +27321,7 @@
             </a:ln>
             <a:extLst>
               <a:ext uri="{91240B29-F687-4f45-9708-019B960494DF}">
-                <a14:hiddenLine xmlns="" xmlns:a16="http://schemas.microsoft.com/office/drawing/2014/main" xmlns:a14="http://schemas.microsoft.com/office/drawing/2010/main" w="9525">
+                <a14:hiddenLine xmlns:a14="http://schemas.microsoft.com/office/drawing/2010/main" xmlns:a16="http://schemas.microsoft.com/office/drawing/2014/main" xmlns="" w="9525">
                   <a:solidFill>
                     <a:srgbClr val="000000"/>
                   </a:solidFill>
@@ -27404,7 +27426,7 @@
             </a:ln>
             <a:extLst>
               <a:ext uri="{91240B29-F687-4f45-9708-019B960494DF}">
-                <a14:hiddenLine xmlns="" xmlns:a16="http://schemas.microsoft.com/office/drawing/2014/main" xmlns:a14="http://schemas.microsoft.com/office/drawing/2010/main" w="9525">
+                <a14:hiddenLine xmlns:a14="http://schemas.microsoft.com/office/drawing/2010/main" xmlns:a16="http://schemas.microsoft.com/office/drawing/2014/main" xmlns="" w="9525">
                   <a:solidFill>
                     <a:srgbClr val="000000"/>
                   </a:solidFill>
@@ -27453,7 +27475,7 @@
             </a:ln>
             <a:extLst>
               <a:ext uri="{91240B29-F687-4f45-9708-019B960494DF}">
-                <a14:hiddenLine xmlns="" xmlns:a16="http://schemas.microsoft.com/office/drawing/2014/main" xmlns:a14="http://schemas.microsoft.com/office/drawing/2010/main" w="9525">
+                <a14:hiddenLine xmlns:a14="http://schemas.microsoft.com/office/drawing/2010/main" xmlns:a16="http://schemas.microsoft.com/office/drawing/2014/main" xmlns="" w="9525">
                   <a:solidFill>
                     <a:srgbClr val="000000"/>
                   </a:solidFill>
@@ -27533,7 +27555,7 @@
             </a:ln>
             <a:extLst>
               <a:ext uri="{91240B29-F687-4f45-9708-019B960494DF}">
-                <a14:hiddenLine xmlns="" xmlns:a16="http://schemas.microsoft.com/office/drawing/2014/main" xmlns:a14="http://schemas.microsoft.com/office/drawing/2010/main" w="9525">
+                <a14:hiddenLine xmlns:a14="http://schemas.microsoft.com/office/drawing/2010/main" xmlns:a16="http://schemas.microsoft.com/office/drawing/2014/main" xmlns="" w="9525">
                   <a:solidFill>
                     <a:srgbClr val="000000"/>
                   </a:solidFill>
@@ -27638,7 +27660,7 @@
             </a:ln>
             <a:extLst>
               <a:ext uri="{91240B29-F687-4f45-9708-019B960494DF}">
-                <a14:hiddenLine xmlns="" xmlns:a16="http://schemas.microsoft.com/office/drawing/2014/main" xmlns:a14="http://schemas.microsoft.com/office/drawing/2010/main" w="9525">
+                <a14:hiddenLine xmlns:a14="http://schemas.microsoft.com/office/drawing/2010/main" xmlns:a16="http://schemas.microsoft.com/office/drawing/2014/main" xmlns="" w="9525">
                   <a:solidFill>
                     <a:srgbClr val="000000"/>
                   </a:solidFill>
@@ -27715,7 +27737,7 @@
             </a:ln>
             <a:extLst>
               <a:ext uri="{91240B29-F687-4f45-9708-019B960494DF}">
-                <a14:hiddenLine xmlns="" xmlns:a16="http://schemas.microsoft.com/office/drawing/2014/main" xmlns:a14="http://schemas.microsoft.com/office/drawing/2010/main" w="9525">
+                <a14:hiddenLine xmlns:a14="http://schemas.microsoft.com/office/drawing/2010/main" xmlns:a16="http://schemas.microsoft.com/office/drawing/2014/main" xmlns="" w="9525">
                   <a:solidFill>
                     <a:srgbClr val="000000"/>
                   </a:solidFill>
@@ -27820,7 +27842,7 @@
             </a:ln>
             <a:extLst>
               <a:ext uri="{91240B29-F687-4f45-9708-019B960494DF}">
-                <a14:hiddenLine xmlns="" xmlns:a16="http://schemas.microsoft.com/office/drawing/2014/main" xmlns:a14="http://schemas.microsoft.com/office/drawing/2010/main" w="9525">
+                <a14:hiddenLine xmlns:a14="http://schemas.microsoft.com/office/drawing/2010/main" xmlns:a16="http://schemas.microsoft.com/office/drawing/2014/main" xmlns="" w="9525">
                   <a:solidFill>
                     <a:srgbClr val="000000"/>
                   </a:solidFill>
@@ -27925,7 +27947,7 @@
             </a:ln>
             <a:extLst>
               <a:ext uri="{91240B29-F687-4f45-9708-019B960494DF}">
-                <a14:hiddenLine xmlns="" xmlns:a16="http://schemas.microsoft.com/office/drawing/2014/main" xmlns:a14="http://schemas.microsoft.com/office/drawing/2010/main" w="9525">
+                <a14:hiddenLine xmlns:a14="http://schemas.microsoft.com/office/drawing/2010/main" xmlns:a16="http://schemas.microsoft.com/office/drawing/2014/main" xmlns="" w="9525">
                   <a:solidFill>
                     <a:srgbClr val="000000"/>
                   </a:solidFill>
@@ -28005,7 +28027,7 @@
             </a:ln>
             <a:extLst>
               <a:ext uri="{91240B29-F687-4f45-9708-019B960494DF}">
-                <a14:hiddenLine xmlns="" xmlns:a16="http://schemas.microsoft.com/office/drawing/2014/main" xmlns:a14="http://schemas.microsoft.com/office/drawing/2010/main" w="9525">
+                <a14:hiddenLine xmlns:a14="http://schemas.microsoft.com/office/drawing/2010/main" xmlns:a16="http://schemas.microsoft.com/office/drawing/2014/main" xmlns="" w="9525">
                   <a:solidFill>
                     <a:srgbClr val="000000"/>
                   </a:solidFill>
@@ -28082,7 +28104,7 @@
             </a:ln>
             <a:extLst>
               <a:ext uri="{91240B29-F687-4f45-9708-019B960494DF}">
-                <a14:hiddenLine xmlns="" xmlns:a16="http://schemas.microsoft.com/office/drawing/2014/main" xmlns:a14="http://schemas.microsoft.com/office/drawing/2010/main" w="9525">
+                <a14:hiddenLine xmlns:a14="http://schemas.microsoft.com/office/drawing/2010/main" xmlns:a16="http://schemas.microsoft.com/office/drawing/2014/main" xmlns="" w="9525">
                   <a:solidFill>
                     <a:srgbClr val="000000"/>
                   </a:solidFill>
@@ -28187,7 +28209,7 @@
             </a:ln>
             <a:extLst>
               <a:ext uri="{91240B29-F687-4f45-9708-019B960494DF}">
-                <a14:hiddenLine xmlns="" xmlns:a16="http://schemas.microsoft.com/office/drawing/2014/main" xmlns:a14="http://schemas.microsoft.com/office/drawing/2010/main" w="9525">
+                <a14:hiddenLine xmlns:a14="http://schemas.microsoft.com/office/drawing/2010/main" xmlns:a16="http://schemas.microsoft.com/office/drawing/2014/main" xmlns="" w="9525">
                   <a:solidFill>
                     <a:srgbClr val="000000"/>
                   </a:solidFill>
@@ -28292,7 +28314,7 @@
             </a:ln>
             <a:extLst>
               <a:ext uri="{91240B29-F687-4f45-9708-019B960494DF}">
-                <a14:hiddenLine xmlns="" xmlns:a16="http://schemas.microsoft.com/office/drawing/2014/main" xmlns:a14="http://schemas.microsoft.com/office/drawing/2010/main" w="9525">
+                <a14:hiddenLine xmlns:a14="http://schemas.microsoft.com/office/drawing/2010/main" xmlns:a16="http://schemas.microsoft.com/office/drawing/2014/main" xmlns="" w="9525">
                   <a:solidFill>
                     <a:srgbClr val="000000"/>
                   </a:solidFill>
@@ -28369,7 +28391,7 @@
             </a:ln>
             <a:extLst>
               <a:ext uri="{91240B29-F687-4f45-9708-019B960494DF}">
-                <a14:hiddenLine xmlns="" xmlns:a16="http://schemas.microsoft.com/office/drawing/2014/main" xmlns:a14="http://schemas.microsoft.com/office/drawing/2010/main" w="9525">
+                <a14:hiddenLine xmlns:a14="http://schemas.microsoft.com/office/drawing/2010/main" xmlns:a16="http://schemas.microsoft.com/office/drawing/2014/main" xmlns="" w="9525">
                   <a:solidFill>
                     <a:srgbClr val="000000"/>
                   </a:solidFill>
@@ -28504,7 +28526,7 @@
             </a:ln>
             <a:extLst>
               <a:ext uri="{91240B29-F687-4f45-9708-019B960494DF}">
-                <a14:hiddenLine xmlns="" xmlns:a16="http://schemas.microsoft.com/office/drawing/2014/main" xmlns:a14="http://schemas.microsoft.com/office/drawing/2010/main" w="9525">
+                <a14:hiddenLine xmlns:a14="http://schemas.microsoft.com/office/drawing/2010/main" xmlns:a16="http://schemas.microsoft.com/office/drawing/2014/main" xmlns="" w="9525">
                   <a:solidFill>
                     <a:srgbClr val="000000"/>
                   </a:solidFill>
@@ -28587,7 +28609,7 @@
             </a:ln>
             <a:extLst>
               <a:ext uri="{91240B29-F687-4f45-9708-019B960494DF}">
-                <a14:hiddenLine xmlns="" xmlns:a16="http://schemas.microsoft.com/office/drawing/2014/main" xmlns:a14="http://schemas.microsoft.com/office/drawing/2010/main" w="9525">
+                <a14:hiddenLine xmlns:a14="http://schemas.microsoft.com/office/drawing/2010/main" xmlns:a16="http://schemas.microsoft.com/office/drawing/2014/main" xmlns="" w="9525">
                   <a:solidFill>
                     <a:srgbClr val="000000"/>
                   </a:solidFill>
@@ -28692,7 +28714,7 @@
             </a:ln>
             <a:extLst>
               <a:ext uri="{91240B29-F687-4f45-9708-019B960494DF}">
-                <a14:hiddenLine xmlns="" xmlns:a16="http://schemas.microsoft.com/office/drawing/2014/main" xmlns:a14="http://schemas.microsoft.com/office/drawing/2010/main" w="9525">
+                <a14:hiddenLine xmlns:a14="http://schemas.microsoft.com/office/drawing/2010/main" xmlns:a16="http://schemas.microsoft.com/office/drawing/2014/main" xmlns="" w="9525">
                   <a:solidFill>
                     <a:srgbClr val="000000"/>
                   </a:solidFill>
@@ -28849,7 +28871,7 @@
             <a:noFill/>
             <a:extLst>
               <a:ext uri="{909E8E84-426E-40dd-AFC4-6F175D3DCCD1}">
-                <a14:hiddenFill xmlns="" xmlns:a16="http://schemas.microsoft.com/office/drawing/2014/main" xmlns:p14="http://schemas.microsoft.com/office/powerpoint/2010/main" xmlns:a14="http://schemas.microsoft.com/office/drawing/2010/main">
+                <a14:hiddenFill xmlns:a14="http://schemas.microsoft.com/office/drawing/2010/main" xmlns:p14="http://schemas.microsoft.com/office/powerpoint/2010/main" xmlns:a16="http://schemas.microsoft.com/office/drawing/2014/main" xmlns="">
                   <a:solidFill>
                     <a:srgbClr val="FFFFFF"/>
                   </a:solidFill>
@@ -30830,12 +30852,28 @@
           <a:p>
             <a:pPr algn="ctr"/>
             <a:r>
-              <a:rPr lang="en-US" sz="4800">
+              <a:rPr lang="en-US" sz="4800" dirty="0">
                 <a:solidFill>
                   <a:srgbClr val="FFFFFF"/>
                 </a:solidFill>
               </a:rPr>
-              <a:t>Se qui À été Fait?</a:t>
+              <a:t>Ce qui A </a:t>
+            </a:r>
+            <a:r>
+              <a:rPr lang="en-US" sz="4800" dirty="0" err="1">
+                <a:solidFill>
+                  <a:srgbClr val="FFFFFF"/>
+                </a:solidFill>
+              </a:rPr>
+              <a:t>été</a:t>
+            </a:r>
+            <a:r>
+              <a:rPr lang="en-US" sz="4800" dirty="0">
+                <a:solidFill>
+                  <a:srgbClr val="FFFFFF"/>
+                </a:solidFill>
+              </a:rPr>
+              <a:t> Fait?</a:t>
             </a:r>
           </a:p>
         </p:txBody>
@@ -30900,7 +30938,7 @@
           <a:p>
             <a:r>
               <a:rPr lang="fr-CA" sz="2400" dirty="0"/>
-              <a:t>En tant qu’administrateur je veux pouvoir voir le site web</a:t>
+              <a:t>En tant qu’administrateur, je veux voir le site web</a:t>
             </a:r>
             <a:br>
               <a:rPr lang="fr-CA" sz="2400" dirty="0"/>
@@ -30932,7 +30970,7 @@
           <a:p>
             <a:r>
               <a:rPr lang="fr-CA" dirty="0"/>
-              <a:t>Création des projet en C</a:t>
+              <a:t>Création des projet C</a:t>
             </a:r>
             <a:r>
               <a:rPr lang="en-US" dirty="0"/>
@@ -30940,7 +30978,7 @@
             </a:r>
             <a:r>
               <a:rPr lang="fr-CA" dirty="0"/>
-              <a:t>nécessaire pour afficher le site web(.net 6.0);</a:t>
+              <a:t>nécessaire pour afficher le site web;</a:t>
             </a:r>
           </a:p>
           <a:p>
@@ -30952,13 +30990,13 @@
           <a:p>
             <a:r>
               <a:rPr lang="fr-CA" dirty="0"/>
-              <a:t>Analyse UML du projet et création du diagramme;</a:t>
+              <a:t>Analyse UML du projet et création du diagramme de classe;</a:t>
             </a:r>
           </a:p>
           <a:p>
             <a:r>
               <a:rPr lang="fr-CA" dirty="0"/>
-              <a:t>Correction/Validation des API;</a:t>
+              <a:t>Correction/Validation de  l’API;</a:t>
             </a:r>
           </a:p>
         </p:txBody>
@@ -31023,7 +31061,7 @@
           <a:p>
             <a:r>
               <a:rPr lang="fr-CA" sz="2400" dirty="0"/>
-              <a:t>En tant qu'administrateur, je veux pouvoir ajouter un évènement</a:t>
+              <a:t>En tant qu'administrateur, je veux ajouter un évènement</a:t>
             </a:r>
             <a:br>
               <a:rPr lang="fr-CA" sz="2400" dirty="0"/>
@@ -31061,7 +31099,7 @@
           <a:p>
             <a:r>
               <a:rPr lang="fr-CA" dirty="0"/>
-              <a:t>Création formulaire sur le site web pour ajout d’évènements;</a:t>
+              <a:t>Création formulaire sur le site web pour ajout d’évènement;</a:t>
             </a:r>
           </a:p>
           <a:p>
@@ -31144,7 +31182,7 @@
           <a:p>
             <a:r>
               <a:rPr lang="fr-CA" sz="2400" dirty="0"/>
-              <a:t>En tant qu’administrateur, je veux pouvoir créer mon équipe</a:t>
+              <a:t>En tant qu’administrateur, je veux créer mon équipe</a:t>
             </a:r>
             <a:br>
               <a:rPr lang="fr-CA" sz="2400" dirty="0"/>
@@ -31256,7 +31294,7 @@
           <a:p>
             <a:r>
               <a:rPr lang="fr-CA" sz="2400" dirty="0"/>
-              <a:t>En tant qu’administrateur je veux pouvoir ajouter un entraineur</a:t>
+              <a:t>En tant qu’administrateur, je veux ajouter un entraineur</a:t>
             </a:r>
             <a:br>
               <a:rPr lang="fr-CA" sz="2400" dirty="0"/>
@@ -31403,7 +31441,7 @@
           <a:noFill/>
           <a:extLst>
             <a:ext uri="{909E8E84-426E-40dd-AFC4-6F175D3DCCD1}">
-              <a14:hiddenFill xmlns="" xmlns:a16="http://schemas.microsoft.com/office/drawing/2014/main" xmlns:a14="http://schemas.microsoft.com/office/drawing/2010/main">
+              <a14:hiddenFill xmlns:a14="http://schemas.microsoft.com/office/drawing/2010/main" xmlns:a16="http://schemas.microsoft.com/office/drawing/2014/main" xmlns="">
                 <a:solidFill>
                   <a:srgbClr val="FFFFFF"/>
                 </a:solidFill>
@@ -31495,7 +31533,7 @@
             </a:ln>
             <a:extLst>
               <a:ext uri="{91240B29-F687-4f45-9708-019B960494DF}">
-                <a14:hiddenLine xmlns="" xmlns:a16="http://schemas.microsoft.com/office/drawing/2014/main" xmlns:a14="http://schemas.microsoft.com/office/drawing/2010/main" w="9525">
+                <a14:hiddenLine xmlns:a14="http://schemas.microsoft.com/office/drawing/2010/main" xmlns:a16="http://schemas.microsoft.com/office/drawing/2014/main" xmlns="" w="9525">
                   <a:solidFill>
                     <a:srgbClr val="000000"/>
                   </a:solidFill>
@@ -31600,7 +31638,7 @@
             </a:ln>
             <a:extLst>
               <a:ext uri="{91240B29-F687-4f45-9708-019B960494DF}">
-                <a14:hiddenLine xmlns="" xmlns:a16="http://schemas.microsoft.com/office/drawing/2014/main" xmlns:a14="http://schemas.microsoft.com/office/drawing/2010/main" w="9525">
+                <a14:hiddenLine xmlns:a14="http://schemas.microsoft.com/office/drawing/2010/main" xmlns:a16="http://schemas.microsoft.com/office/drawing/2014/main" xmlns="" w="9525">
                   <a:solidFill>
                     <a:srgbClr val="000000"/>
                   </a:solidFill>
@@ -31705,7 +31743,7 @@
             </a:ln>
             <a:extLst>
               <a:ext uri="{91240B29-F687-4f45-9708-019B960494DF}">
-                <a14:hiddenLine xmlns="" xmlns:a16="http://schemas.microsoft.com/office/drawing/2014/main" xmlns:a14="http://schemas.microsoft.com/office/drawing/2010/main" w="9525">
+                <a14:hiddenLine xmlns:a14="http://schemas.microsoft.com/office/drawing/2010/main" xmlns:a16="http://schemas.microsoft.com/office/drawing/2014/main" xmlns="" w="9525">
                   <a:solidFill>
                     <a:srgbClr val="000000"/>
                   </a:solidFill>
@@ -31754,7 +31792,7 @@
             </a:ln>
             <a:extLst>
               <a:ext uri="{91240B29-F687-4f45-9708-019B960494DF}">
-                <a14:hiddenLine xmlns="" xmlns:a16="http://schemas.microsoft.com/office/drawing/2014/main" xmlns:a14="http://schemas.microsoft.com/office/drawing/2010/main" w="9525">
+                <a14:hiddenLine xmlns:a14="http://schemas.microsoft.com/office/drawing/2010/main" xmlns:a16="http://schemas.microsoft.com/office/drawing/2014/main" xmlns="" w="9525">
                   <a:solidFill>
                     <a:srgbClr val="000000"/>
                   </a:solidFill>
@@ -31859,7 +31897,7 @@
             </a:ln>
             <a:extLst>
               <a:ext uri="{91240B29-F687-4f45-9708-019B960494DF}">
-                <a14:hiddenLine xmlns="" xmlns:a16="http://schemas.microsoft.com/office/drawing/2014/main" xmlns:a14="http://schemas.microsoft.com/office/drawing/2010/main" w="9525">
+                <a14:hiddenLine xmlns:a14="http://schemas.microsoft.com/office/drawing/2010/main" xmlns:a16="http://schemas.microsoft.com/office/drawing/2014/main" xmlns="" w="9525">
                   <a:solidFill>
                     <a:srgbClr val="000000"/>
                   </a:solidFill>
@@ -31936,7 +31974,7 @@
             </a:ln>
             <a:extLst>
               <a:ext uri="{91240B29-F687-4f45-9708-019B960494DF}">
-                <a14:hiddenLine xmlns="" xmlns:a16="http://schemas.microsoft.com/office/drawing/2014/main" xmlns:a14="http://schemas.microsoft.com/office/drawing/2010/main" w="9525">
+                <a14:hiddenLine xmlns:a14="http://schemas.microsoft.com/office/drawing/2010/main" xmlns:a16="http://schemas.microsoft.com/office/drawing/2014/main" xmlns="" w="9525">
                   <a:solidFill>
                     <a:srgbClr val="000000"/>
                   </a:solidFill>
@@ -32013,7 +32051,7 @@
             </a:ln>
             <a:extLst>
               <a:ext uri="{91240B29-F687-4f45-9708-019B960494DF}">
-                <a14:hiddenLine xmlns="" xmlns:a16="http://schemas.microsoft.com/office/drawing/2014/main" xmlns:a14="http://schemas.microsoft.com/office/drawing/2010/main" w="9525">
+                <a14:hiddenLine xmlns:a14="http://schemas.microsoft.com/office/drawing/2010/main" xmlns:a16="http://schemas.microsoft.com/office/drawing/2014/main" xmlns="" w="9525">
                   <a:solidFill>
                     <a:srgbClr val="000000"/>
                   </a:solidFill>
@@ -32118,7 +32156,7 @@
             </a:ln>
             <a:extLst>
               <a:ext uri="{91240B29-F687-4f45-9708-019B960494DF}">
-                <a14:hiddenLine xmlns="" xmlns:a16="http://schemas.microsoft.com/office/drawing/2014/main" xmlns:a14="http://schemas.microsoft.com/office/drawing/2010/main" w="9525">
+                <a14:hiddenLine xmlns:a14="http://schemas.microsoft.com/office/drawing/2010/main" xmlns:a16="http://schemas.microsoft.com/office/drawing/2014/main" xmlns="" w="9525">
                   <a:solidFill>
                     <a:srgbClr val="000000"/>
                   </a:solidFill>
@@ -32195,7 +32233,7 @@
             </a:ln>
             <a:extLst>
               <a:ext uri="{91240B29-F687-4f45-9708-019B960494DF}">
-                <a14:hiddenLine xmlns="" xmlns:a16="http://schemas.microsoft.com/office/drawing/2014/main" xmlns:a14="http://schemas.microsoft.com/office/drawing/2010/main" w="9525">
+                <a14:hiddenLine xmlns:a14="http://schemas.microsoft.com/office/drawing/2010/main" xmlns:a16="http://schemas.microsoft.com/office/drawing/2014/main" xmlns="" w="9525">
                   <a:solidFill>
                     <a:srgbClr val="000000"/>
                   </a:solidFill>
@@ -32272,7 +32310,7 @@
             </a:ln>
             <a:extLst>
               <a:ext uri="{91240B29-F687-4f45-9708-019B960494DF}">
-                <a14:hiddenLine xmlns="" xmlns:a16="http://schemas.microsoft.com/office/drawing/2014/main" xmlns:a14="http://schemas.microsoft.com/office/drawing/2010/main" w="9525">
+                <a14:hiddenLine xmlns:a14="http://schemas.microsoft.com/office/drawing/2010/main" xmlns:a16="http://schemas.microsoft.com/office/drawing/2014/main" xmlns="" w="9525">
                   <a:solidFill>
                     <a:srgbClr val="000000"/>
                   </a:solidFill>
@@ -32377,7 +32415,7 @@
             </a:ln>
             <a:extLst>
               <a:ext uri="{91240B29-F687-4f45-9708-019B960494DF}">
-                <a14:hiddenLine xmlns="" xmlns:a16="http://schemas.microsoft.com/office/drawing/2014/main" xmlns:a14="http://schemas.microsoft.com/office/drawing/2010/main" w="9525">
+                <a14:hiddenLine xmlns:a14="http://schemas.microsoft.com/office/drawing/2010/main" xmlns:a16="http://schemas.microsoft.com/office/drawing/2014/main" xmlns="" w="9525">
                   <a:solidFill>
                     <a:srgbClr val="000000"/>
                   </a:solidFill>
@@ -32482,7 +32520,7 @@
             </a:ln>
             <a:extLst>
               <a:ext uri="{91240B29-F687-4f45-9708-019B960494DF}">
-                <a14:hiddenLine xmlns="" xmlns:a16="http://schemas.microsoft.com/office/drawing/2014/main" xmlns:a14="http://schemas.microsoft.com/office/drawing/2010/main" w="9525">
+                <a14:hiddenLine xmlns:a14="http://schemas.microsoft.com/office/drawing/2010/main" xmlns:a16="http://schemas.microsoft.com/office/drawing/2014/main" xmlns="" w="9525">
                   <a:solidFill>
                     <a:srgbClr val="000000"/>
                   </a:solidFill>
@@ -32559,7 +32597,7 @@
             </a:ln>
             <a:extLst>
               <a:ext uri="{91240B29-F687-4f45-9708-019B960494DF}">
-                <a14:hiddenLine xmlns="" xmlns:a16="http://schemas.microsoft.com/office/drawing/2014/main" xmlns:a14="http://schemas.microsoft.com/office/drawing/2010/main" w="9525">
+                <a14:hiddenLine xmlns:a14="http://schemas.microsoft.com/office/drawing/2010/main" xmlns:a16="http://schemas.microsoft.com/office/drawing/2014/main" xmlns="" w="9525">
                   <a:solidFill>
                     <a:srgbClr val="000000"/>
                   </a:solidFill>
@@ -32684,7 +32722,7 @@
             </a:ln>
             <a:extLst>
               <a:ext uri="{91240B29-F687-4f45-9708-019B960494DF}">
-                <a14:hiddenLine xmlns="" xmlns:a16="http://schemas.microsoft.com/office/drawing/2014/main" xmlns:a14="http://schemas.microsoft.com/office/drawing/2010/main" w="9525">
+                <a14:hiddenLine xmlns:a14="http://schemas.microsoft.com/office/drawing/2010/main" xmlns:a16="http://schemas.microsoft.com/office/drawing/2014/main" xmlns="" w="9525">
                   <a:solidFill>
                     <a:srgbClr val="000000"/>
                   </a:solidFill>
@@ -32761,7 +32799,7 @@
             </a:ln>
             <a:extLst>
               <a:ext uri="{91240B29-F687-4f45-9708-019B960494DF}">
-                <a14:hiddenLine xmlns="" xmlns:a16="http://schemas.microsoft.com/office/drawing/2014/main" xmlns:a14="http://schemas.microsoft.com/office/drawing/2010/main" w="9525">
+                <a14:hiddenLine xmlns:a14="http://schemas.microsoft.com/office/drawing/2010/main" xmlns:a16="http://schemas.microsoft.com/office/drawing/2014/main" xmlns="" w="9525">
                   <a:solidFill>
                     <a:srgbClr val="000000"/>
                   </a:solidFill>
@@ -32866,7 +32904,7 @@
             </a:ln>
             <a:extLst>
               <a:ext uri="{91240B29-F687-4f45-9708-019B960494DF}">
-                <a14:hiddenLine xmlns="" xmlns:a16="http://schemas.microsoft.com/office/drawing/2014/main" xmlns:a14="http://schemas.microsoft.com/office/drawing/2010/main" w="9525">
+                <a14:hiddenLine xmlns:a14="http://schemas.microsoft.com/office/drawing/2010/main" xmlns:a16="http://schemas.microsoft.com/office/drawing/2014/main" xmlns="" w="9525">
                   <a:solidFill>
                     <a:srgbClr val="000000"/>
                   </a:solidFill>
@@ -32971,7 +33009,7 @@
             </a:ln>
             <a:extLst>
               <a:ext uri="{91240B29-F687-4f45-9708-019B960494DF}">
-                <a14:hiddenLine xmlns="" xmlns:a16="http://schemas.microsoft.com/office/drawing/2014/main" xmlns:a14="http://schemas.microsoft.com/office/drawing/2010/main" w="9525">
+                <a14:hiddenLine xmlns:a14="http://schemas.microsoft.com/office/drawing/2010/main" xmlns:a16="http://schemas.microsoft.com/office/drawing/2014/main" xmlns="" w="9525">
                   <a:solidFill>
                     <a:srgbClr val="000000"/>
                   </a:solidFill>
@@ -33048,7 +33086,7 @@
             </a:ln>
             <a:extLst>
               <a:ext uri="{91240B29-F687-4f45-9708-019B960494DF}">
-                <a14:hiddenLine xmlns="" xmlns:a16="http://schemas.microsoft.com/office/drawing/2014/main" xmlns:a14="http://schemas.microsoft.com/office/drawing/2010/main" w="9525">
+                <a14:hiddenLine xmlns:a14="http://schemas.microsoft.com/office/drawing/2010/main" xmlns:a16="http://schemas.microsoft.com/office/drawing/2014/main" xmlns="" w="9525">
                   <a:solidFill>
                     <a:srgbClr val="000000"/>
                   </a:solidFill>
@@ -33153,7 +33191,7 @@
             </a:ln>
             <a:extLst>
               <a:ext uri="{91240B29-F687-4f45-9708-019B960494DF}">
-                <a14:hiddenLine xmlns="" xmlns:a16="http://schemas.microsoft.com/office/drawing/2014/main" xmlns:a14="http://schemas.microsoft.com/office/drawing/2010/main" w="9525">
+                <a14:hiddenLine xmlns:a14="http://schemas.microsoft.com/office/drawing/2010/main" xmlns:a16="http://schemas.microsoft.com/office/drawing/2014/main" xmlns="" w="9525">
                   <a:solidFill>
                     <a:srgbClr val="000000"/>
                   </a:solidFill>
@@ -33258,7 +33296,7 @@
             </a:ln>
             <a:extLst>
               <a:ext uri="{91240B29-F687-4f45-9708-019B960494DF}">
-                <a14:hiddenLine xmlns="" xmlns:a16="http://schemas.microsoft.com/office/drawing/2014/main" xmlns:a14="http://schemas.microsoft.com/office/drawing/2010/main" w="9525">
+                <a14:hiddenLine xmlns:a14="http://schemas.microsoft.com/office/drawing/2010/main" xmlns:a16="http://schemas.microsoft.com/office/drawing/2014/main" xmlns="" w="9525">
                   <a:solidFill>
                     <a:srgbClr val="000000"/>
                   </a:solidFill>
@@ -33329,7 +33367,7 @@
             </a:ln>
             <a:extLst>
               <a:ext uri="{91240B29-F687-4f45-9708-019B960494DF}">
-                <a14:hiddenLine xmlns="" xmlns:a16="http://schemas.microsoft.com/office/drawing/2014/main" xmlns:a14="http://schemas.microsoft.com/office/drawing/2010/main" w="9525">
+                <a14:hiddenLine xmlns:a14="http://schemas.microsoft.com/office/drawing/2010/main" xmlns:a16="http://schemas.microsoft.com/office/drawing/2014/main" xmlns="" w="9525">
                   <a:solidFill>
                     <a:srgbClr val="000000"/>
                   </a:solidFill>
@@ -33434,7 +33472,7 @@
             </a:ln>
             <a:extLst>
               <a:ext uri="{91240B29-F687-4f45-9708-019B960494DF}">
-                <a14:hiddenLine xmlns="" xmlns:a16="http://schemas.microsoft.com/office/drawing/2014/main" xmlns:a14="http://schemas.microsoft.com/office/drawing/2010/main" w="9525">
+                <a14:hiddenLine xmlns:a14="http://schemas.microsoft.com/office/drawing/2010/main" xmlns:a16="http://schemas.microsoft.com/office/drawing/2014/main" xmlns="" w="9525">
                   <a:solidFill>
                     <a:srgbClr val="000000"/>
                   </a:solidFill>
@@ -33505,7 +33543,7 @@
             </a:ln>
             <a:extLst>
               <a:ext uri="{91240B29-F687-4f45-9708-019B960494DF}">
-                <a14:hiddenLine xmlns="" xmlns:a16="http://schemas.microsoft.com/office/drawing/2014/main" xmlns:a14="http://schemas.microsoft.com/office/drawing/2010/main" w="9525">
+                <a14:hiddenLine xmlns:a14="http://schemas.microsoft.com/office/drawing/2010/main" xmlns:a16="http://schemas.microsoft.com/office/drawing/2014/main" xmlns="" w="9525">
                   <a:solidFill>
                     <a:srgbClr val="000000"/>
                   </a:solidFill>
@@ -33610,7 +33648,7 @@
             </a:ln>
             <a:extLst>
               <a:ext uri="{91240B29-F687-4f45-9708-019B960494DF}">
-                <a14:hiddenLine xmlns="" xmlns:a16="http://schemas.microsoft.com/office/drawing/2014/main" xmlns:a14="http://schemas.microsoft.com/office/drawing/2010/main" w="9525">
+                <a14:hiddenLine xmlns:a14="http://schemas.microsoft.com/office/drawing/2010/main" xmlns:a16="http://schemas.microsoft.com/office/drawing/2014/main" xmlns="" w="9525">
                   <a:solidFill>
                     <a:srgbClr val="000000"/>
                   </a:solidFill>
@@ -33693,7 +33731,7 @@
             </a:ln>
             <a:extLst>
               <a:ext uri="{91240B29-F687-4f45-9708-019B960494DF}">
-                <a14:hiddenLine xmlns="" xmlns:a16="http://schemas.microsoft.com/office/drawing/2014/main" xmlns:a14="http://schemas.microsoft.com/office/drawing/2010/main" w="9525">
+                <a14:hiddenLine xmlns:a14="http://schemas.microsoft.com/office/drawing/2010/main" xmlns:a16="http://schemas.microsoft.com/office/drawing/2014/main" xmlns="" w="9525">
                   <a:solidFill>
                     <a:srgbClr val="000000"/>
                   </a:solidFill>
@@ -33798,7 +33836,7 @@
             </a:ln>
             <a:extLst>
               <a:ext uri="{91240B29-F687-4f45-9708-019B960494DF}">
-                <a14:hiddenLine xmlns="" xmlns:a16="http://schemas.microsoft.com/office/drawing/2014/main" xmlns:a14="http://schemas.microsoft.com/office/drawing/2010/main" w="9525">
+                <a14:hiddenLine xmlns:a14="http://schemas.microsoft.com/office/drawing/2010/main" xmlns:a16="http://schemas.microsoft.com/office/drawing/2014/main" xmlns="" w="9525">
                   <a:solidFill>
                     <a:srgbClr val="000000"/>
                   </a:solidFill>
@@ -33881,7 +33919,7 @@
             </a:ln>
             <a:extLst>
               <a:ext uri="{91240B29-F687-4f45-9708-019B960494DF}">
-                <a14:hiddenLine xmlns="" xmlns:a16="http://schemas.microsoft.com/office/drawing/2014/main" xmlns:a14="http://schemas.microsoft.com/office/drawing/2010/main" w="9525">
+                <a14:hiddenLine xmlns:a14="http://schemas.microsoft.com/office/drawing/2010/main" xmlns:a16="http://schemas.microsoft.com/office/drawing/2014/main" xmlns="" w="9525">
                   <a:solidFill>
                     <a:srgbClr val="000000"/>
                   </a:solidFill>
@@ -33986,7 +34024,7 @@
             </a:ln>
             <a:extLst>
               <a:ext uri="{91240B29-F687-4f45-9708-019B960494DF}">
-                <a14:hiddenLine xmlns="" xmlns:a16="http://schemas.microsoft.com/office/drawing/2014/main" xmlns:a14="http://schemas.microsoft.com/office/drawing/2010/main" w="9525">
+                <a14:hiddenLine xmlns:a14="http://schemas.microsoft.com/office/drawing/2010/main" xmlns:a16="http://schemas.microsoft.com/office/drawing/2014/main" xmlns="" w="9525">
                   <a:solidFill>
                     <a:srgbClr val="000000"/>
                   </a:solidFill>
@@ -34035,7 +34073,7 @@
             </a:ln>
             <a:extLst>
               <a:ext uri="{91240B29-F687-4f45-9708-019B960494DF}">
-                <a14:hiddenLine xmlns="" xmlns:a16="http://schemas.microsoft.com/office/drawing/2014/main" xmlns:a14="http://schemas.microsoft.com/office/drawing/2010/main" w="9525">
+                <a14:hiddenLine xmlns:a14="http://schemas.microsoft.com/office/drawing/2010/main" xmlns:a16="http://schemas.microsoft.com/office/drawing/2014/main" xmlns="" w="9525">
                   <a:solidFill>
                     <a:srgbClr val="000000"/>
                   </a:solidFill>
@@ -34140,7 +34178,7 @@
             </a:ln>
             <a:extLst>
               <a:ext uri="{91240B29-F687-4f45-9708-019B960494DF}">
-                <a14:hiddenLine xmlns="" xmlns:a16="http://schemas.microsoft.com/office/drawing/2014/main" xmlns:a14="http://schemas.microsoft.com/office/drawing/2010/main" w="9525">
+                <a14:hiddenLine xmlns:a14="http://schemas.microsoft.com/office/drawing/2010/main" xmlns:a16="http://schemas.microsoft.com/office/drawing/2014/main" xmlns="" w="9525">
                   <a:solidFill>
                     <a:srgbClr val="000000"/>
                   </a:solidFill>
@@ -34217,7 +34255,7 @@
             </a:ln>
             <a:extLst>
               <a:ext uri="{91240B29-F687-4f45-9708-019B960494DF}">
-                <a14:hiddenLine xmlns="" xmlns:a16="http://schemas.microsoft.com/office/drawing/2014/main" xmlns:a14="http://schemas.microsoft.com/office/drawing/2010/main" w="9525">
+                <a14:hiddenLine xmlns:a14="http://schemas.microsoft.com/office/drawing/2010/main" xmlns:a16="http://schemas.microsoft.com/office/drawing/2014/main" xmlns="" w="9525">
                   <a:solidFill>
                     <a:srgbClr val="000000"/>
                   </a:solidFill>
@@ -34294,7 +34332,7 @@
             </a:ln>
             <a:extLst>
               <a:ext uri="{91240B29-F687-4f45-9708-019B960494DF}">
-                <a14:hiddenLine xmlns="" xmlns:a16="http://schemas.microsoft.com/office/drawing/2014/main" xmlns:a14="http://schemas.microsoft.com/office/drawing/2010/main" w="9525">
+                <a14:hiddenLine xmlns:a14="http://schemas.microsoft.com/office/drawing/2010/main" xmlns:a16="http://schemas.microsoft.com/office/drawing/2014/main" xmlns="" w="9525">
                   <a:solidFill>
                     <a:srgbClr val="000000"/>
                   </a:solidFill>
@@ -34399,7 +34437,7 @@
             </a:ln>
             <a:extLst>
               <a:ext uri="{91240B29-F687-4f45-9708-019B960494DF}">
-                <a14:hiddenLine xmlns="" xmlns:a16="http://schemas.microsoft.com/office/drawing/2014/main" xmlns:a14="http://schemas.microsoft.com/office/drawing/2010/main" w="9525">
+                <a14:hiddenLine xmlns:a14="http://schemas.microsoft.com/office/drawing/2010/main" xmlns:a16="http://schemas.microsoft.com/office/drawing/2014/main" xmlns="" w="9525">
                   <a:solidFill>
                     <a:srgbClr val="000000"/>
                   </a:solidFill>
@@ -34482,7 +34520,7 @@
             </a:ln>
             <a:extLst>
               <a:ext uri="{91240B29-F687-4f45-9708-019B960494DF}">
-                <a14:hiddenLine xmlns="" xmlns:a16="http://schemas.microsoft.com/office/drawing/2014/main" xmlns:a14="http://schemas.microsoft.com/office/drawing/2010/main" w="9525">
+                <a14:hiddenLine xmlns:a14="http://schemas.microsoft.com/office/drawing/2010/main" xmlns:a16="http://schemas.microsoft.com/office/drawing/2014/main" xmlns="" w="9525">
                   <a:solidFill>
                     <a:srgbClr val="000000"/>
                   </a:solidFill>
@@ -34559,7 +34597,7 @@
             </a:ln>
             <a:extLst>
               <a:ext uri="{91240B29-F687-4f45-9708-019B960494DF}">
-                <a14:hiddenLine xmlns="" xmlns:a16="http://schemas.microsoft.com/office/drawing/2014/main" xmlns:a14="http://schemas.microsoft.com/office/drawing/2010/main" w="9525">
+                <a14:hiddenLine xmlns:a14="http://schemas.microsoft.com/office/drawing/2010/main" xmlns:a16="http://schemas.microsoft.com/office/drawing/2014/main" xmlns="" w="9525">
                   <a:solidFill>
                     <a:srgbClr val="000000"/>
                   </a:solidFill>
@@ -34664,7 +34702,7 @@
             </a:ln>
             <a:extLst>
               <a:ext uri="{91240B29-F687-4f45-9708-019B960494DF}">
-                <a14:hiddenLine xmlns="" xmlns:a16="http://schemas.microsoft.com/office/drawing/2014/main" xmlns:a14="http://schemas.microsoft.com/office/drawing/2010/main" w="9525">
+                <a14:hiddenLine xmlns:a14="http://schemas.microsoft.com/office/drawing/2010/main" xmlns:a16="http://schemas.microsoft.com/office/drawing/2014/main" xmlns="" w="9525">
                   <a:solidFill>
                     <a:srgbClr val="000000"/>
                   </a:solidFill>
@@ -34741,7 +34779,7 @@
             </a:ln>
             <a:extLst>
               <a:ext uri="{91240B29-F687-4f45-9708-019B960494DF}">
-                <a14:hiddenLine xmlns="" xmlns:a16="http://schemas.microsoft.com/office/drawing/2014/main" xmlns:a14="http://schemas.microsoft.com/office/drawing/2010/main" w="9525">
+                <a14:hiddenLine xmlns:a14="http://schemas.microsoft.com/office/drawing/2010/main" xmlns:a16="http://schemas.microsoft.com/office/drawing/2014/main" xmlns="" w="9525">
                   <a:solidFill>
                     <a:srgbClr val="000000"/>
                   </a:solidFill>
@@ -34846,7 +34884,7 @@
             </a:ln>
             <a:extLst>
               <a:ext uri="{91240B29-F687-4f45-9708-019B960494DF}">
-                <a14:hiddenLine xmlns="" xmlns:a16="http://schemas.microsoft.com/office/drawing/2014/main" xmlns:a14="http://schemas.microsoft.com/office/drawing/2010/main" w="9525">
+                <a14:hiddenLine xmlns:a14="http://schemas.microsoft.com/office/drawing/2010/main" xmlns:a16="http://schemas.microsoft.com/office/drawing/2014/main" xmlns="" w="9525">
                   <a:solidFill>
                     <a:srgbClr val="000000"/>
                   </a:solidFill>
@@ -34923,7 +34961,7 @@
             </a:ln>
             <a:extLst>
               <a:ext uri="{91240B29-F687-4f45-9708-019B960494DF}">
-                <a14:hiddenLine xmlns="" xmlns:a16="http://schemas.microsoft.com/office/drawing/2014/main" xmlns:a14="http://schemas.microsoft.com/office/drawing/2010/main" w="9525">
+                <a14:hiddenLine xmlns:a14="http://schemas.microsoft.com/office/drawing/2010/main" xmlns:a16="http://schemas.microsoft.com/office/drawing/2014/main" xmlns="" w="9525">
                   <a:solidFill>
                     <a:srgbClr val="000000"/>
                   </a:solidFill>
@@ -35028,7 +35066,7 @@
             </a:ln>
             <a:extLst>
               <a:ext uri="{91240B29-F687-4f45-9708-019B960494DF}">
-                <a14:hiddenLine xmlns="" xmlns:a16="http://schemas.microsoft.com/office/drawing/2014/main" xmlns:a14="http://schemas.microsoft.com/office/drawing/2010/main" w="9525">
+                <a14:hiddenLine xmlns:a14="http://schemas.microsoft.com/office/drawing/2010/main" xmlns:a16="http://schemas.microsoft.com/office/drawing/2014/main" xmlns="" w="9525">
                   <a:solidFill>
                     <a:srgbClr val="000000"/>
                   </a:solidFill>
@@ -35077,7 +35115,7 @@
             </a:ln>
             <a:extLst>
               <a:ext uri="{91240B29-F687-4f45-9708-019B960494DF}">
-                <a14:hiddenLine xmlns="" xmlns:a16="http://schemas.microsoft.com/office/drawing/2014/main" xmlns:a14="http://schemas.microsoft.com/office/drawing/2010/main" w="9525">
+                <a14:hiddenLine xmlns:a14="http://schemas.microsoft.com/office/drawing/2010/main" xmlns:a16="http://schemas.microsoft.com/office/drawing/2014/main" xmlns="" w="9525">
                   <a:solidFill>
                     <a:srgbClr val="000000"/>
                   </a:solidFill>
@@ -35157,7 +35195,7 @@
             </a:ln>
             <a:extLst>
               <a:ext uri="{91240B29-F687-4f45-9708-019B960494DF}">
-                <a14:hiddenLine xmlns="" xmlns:a16="http://schemas.microsoft.com/office/drawing/2014/main" xmlns:a14="http://schemas.microsoft.com/office/drawing/2010/main" w="9525">
+                <a14:hiddenLine xmlns:a14="http://schemas.microsoft.com/office/drawing/2010/main" xmlns:a16="http://schemas.microsoft.com/office/drawing/2014/main" xmlns="" w="9525">
                   <a:solidFill>
                     <a:srgbClr val="000000"/>
                   </a:solidFill>
@@ -35262,7 +35300,7 @@
             </a:ln>
             <a:extLst>
               <a:ext uri="{91240B29-F687-4f45-9708-019B960494DF}">
-                <a14:hiddenLine xmlns="" xmlns:a16="http://schemas.microsoft.com/office/drawing/2014/main" xmlns:a14="http://schemas.microsoft.com/office/drawing/2010/main" w="9525">
+                <a14:hiddenLine xmlns:a14="http://schemas.microsoft.com/office/drawing/2010/main" xmlns:a16="http://schemas.microsoft.com/office/drawing/2014/main" xmlns="" w="9525">
                   <a:solidFill>
                     <a:srgbClr val="000000"/>
                   </a:solidFill>
@@ -35339,7 +35377,7 @@
             </a:ln>
             <a:extLst>
               <a:ext uri="{91240B29-F687-4f45-9708-019B960494DF}">
-                <a14:hiddenLine xmlns="" xmlns:a16="http://schemas.microsoft.com/office/drawing/2014/main" xmlns:a14="http://schemas.microsoft.com/office/drawing/2010/main" w="9525">
+                <a14:hiddenLine xmlns:a14="http://schemas.microsoft.com/office/drawing/2010/main" xmlns:a16="http://schemas.microsoft.com/office/drawing/2014/main" xmlns="" w="9525">
                   <a:solidFill>
                     <a:srgbClr val="000000"/>
                   </a:solidFill>
@@ -35444,7 +35482,7 @@
             </a:ln>
             <a:extLst>
               <a:ext uri="{91240B29-F687-4f45-9708-019B960494DF}">
-                <a14:hiddenLine xmlns="" xmlns:a16="http://schemas.microsoft.com/office/drawing/2014/main" xmlns:a14="http://schemas.microsoft.com/office/drawing/2010/main" w="9525">
+                <a14:hiddenLine xmlns:a14="http://schemas.microsoft.com/office/drawing/2010/main" xmlns:a16="http://schemas.microsoft.com/office/drawing/2014/main" xmlns="" w="9525">
                   <a:solidFill>
                     <a:srgbClr val="000000"/>
                   </a:solidFill>
@@ -35549,7 +35587,7 @@
             </a:ln>
             <a:extLst>
               <a:ext uri="{91240B29-F687-4f45-9708-019B960494DF}">
-                <a14:hiddenLine xmlns="" xmlns:a16="http://schemas.microsoft.com/office/drawing/2014/main" xmlns:a14="http://schemas.microsoft.com/office/drawing/2010/main" w="9525">
+                <a14:hiddenLine xmlns:a14="http://schemas.microsoft.com/office/drawing/2010/main" xmlns:a16="http://schemas.microsoft.com/office/drawing/2014/main" xmlns="" w="9525">
                   <a:solidFill>
                     <a:srgbClr val="000000"/>
                   </a:solidFill>
@@ -35629,7 +35667,7 @@
             </a:ln>
             <a:extLst>
               <a:ext uri="{91240B29-F687-4f45-9708-019B960494DF}">
-                <a14:hiddenLine xmlns="" xmlns:a16="http://schemas.microsoft.com/office/drawing/2014/main" xmlns:a14="http://schemas.microsoft.com/office/drawing/2010/main" w="9525">
+                <a14:hiddenLine xmlns:a14="http://schemas.microsoft.com/office/drawing/2010/main" xmlns:a16="http://schemas.microsoft.com/office/drawing/2014/main" xmlns="" w="9525">
                   <a:solidFill>
                     <a:srgbClr val="000000"/>
                   </a:solidFill>
@@ -35706,7 +35744,7 @@
             </a:ln>
             <a:extLst>
               <a:ext uri="{91240B29-F687-4f45-9708-019B960494DF}">
-                <a14:hiddenLine xmlns="" xmlns:a16="http://schemas.microsoft.com/office/drawing/2014/main" xmlns:a14="http://schemas.microsoft.com/office/drawing/2010/main" w="9525">
+                <a14:hiddenLine xmlns:a14="http://schemas.microsoft.com/office/drawing/2010/main" xmlns:a16="http://schemas.microsoft.com/office/drawing/2014/main" xmlns="" w="9525">
                   <a:solidFill>
                     <a:srgbClr val="000000"/>
                   </a:solidFill>
@@ -35811,7 +35849,7 @@
             </a:ln>
             <a:extLst>
               <a:ext uri="{91240B29-F687-4f45-9708-019B960494DF}">
-                <a14:hiddenLine xmlns="" xmlns:a16="http://schemas.microsoft.com/office/drawing/2014/main" xmlns:a14="http://schemas.microsoft.com/office/drawing/2010/main" w="9525">
+                <a14:hiddenLine xmlns:a14="http://schemas.microsoft.com/office/drawing/2010/main" xmlns:a16="http://schemas.microsoft.com/office/drawing/2014/main" xmlns="" w="9525">
                   <a:solidFill>
                     <a:srgbClr val="000000"/>
                   </a:solidFill>
@@ -35916,7 +35954,7 @@
             </a:ln>
             <a:extLst>
               <a:ext uri="{91240B29-F687-4f45-9708-019B960494DF}">
-                <a14:hiddenLine xmlns="" xmlns:a16="http://schemas.microsoft.com/office/drawing/2014/main" xmlns:a14="http://schemas.microsoft.com/office/drawing/2010/main" w="9525">
+                <a14:hiddenLine xmlns:a14="http://schemas.microsoft.com/office/drawing/2010/main" xmlns:a16="http://schemas.microsoft.com/office/drawing/2014/main" xmlns="" w="9525">
                   <a:solidFill>
                     <a:srgbClr val="000000"/>
                   </a:solidFill>
@@ -35993,7 +36031,7 @@
             </a:ln>
             <a:extLst>
               <a:ext uri="{91240B29-F687-4f45-9708-019B960494DF}">
-                <a14:hiddenLine xmlns="" xmlns:a16="http://schemas.microsoft.com/office/drawing/2014/main" xmlns:a14="http://schemas.microsoft.com/office/drawing/2010/main" w="9525">
+                <a14:hiddenLine xmlns:a14="http://schemas.microsoft.com/office/drawing/2010/main" xmlns:a16="http://schemas.microsoft.com/office/drawing/2014/main" xmlns="" w="9525">
                   <a:solidFill>
                     <a:srgbClr val="000000"/>
                   </a:solidFill>
@@ -36128,7 +36166,7 @@
             </a:ln>
             <a:extLst>
               <a:ext uri="{91240B29-F687-4f45-9708-019B960494DF}">
-                <a14:hiddenLine xmlns="" xmlns:a16="http://schemas.microsoft.com/office/drawing/2014/main" xmlns:a14="http://schemas.microsoft.com/office/drawing/2010/main" w="9525">
+                <a14:hiddenLine xmlns:a14="http://schemas.microsoft.com/office/drawing/2010/main" xmlns:a16="http://schemas.microsoft.com/office/drawing/2014/main" xmlns="" w="9525">
                   <a:solidFill>
                     <a:srgbClr val="000000"/>
                   </a:solidFill>
@@ -36211,7 +36249,7 @@
             </a:ln>
             <a:extLst>
               <a:ext uri="{91240B29-F687-4f45-9708-019B960494DF}">
-                <a14:hiddenLine xmlns="" xmlns:a16="http://schemas.microsoft.com/office/drawing/2014/main" xmlns:a14="http://schemas.microsoft.com/office/drawing/2010/main" w="9525">
+                <a14:hiddenLine xmlns:a14="http://schemas.microsoft.com/office/drawing/2010/main" xmlns:a16="http://schemas.microsoft.com/office/drawing/2014/main" xmlns="" w="9525">
                   <a:solidFill>
                     <a:srgbClr val="000000"/>
                   </a:solidFill>
@@ -36316,7 +36354,7 @@
             </a:ln>
             <a:extLst>
               <a:ext uri="{91240B29-F687-4f45-9708-019B960494DF}">
-                <a14:hiddenLine xmlns="" xmlns:a16="http://schemas.microsoft.com/office/drawing/2014/main" xmlns:a14="http://schemas.microsoft.com/office/drawing/2010/main" w="9525">
+                <a14:hiddenLine xmlns:a14="http://schemas.microsoft.com/office/drawing/2010/main" xmlns:a16="http://schemas.microsoft.com/office/drawing/2014/main" xmlns="" w="9525">
                   <a:solidFill>
                     <a:srgbClr val="000000"/>
                   </a:solidFill>
@@ -36473,7 +36511,7 @@
             <a:noFill/>
             <a:extLst>
               <a:ext uri="{909E8E84-426E-40dd-AFC4-6F175D3DCCD1}">
-                <a14:hiddenFill xmlns="" xmlns:a16="http://schemas.microsoft.com/office/drawing/2014/main" xmlns:p14="http://schemas.microsoft.com/office/powerpoint/2010/main" xmlns:a14="http://schemas.microsoft.com/office/drawing/2010/main">
+                <a14:hiddenFill xmlns:a14="http://schemas.microsoft.com/office/drawing/2010/main" xmlns:p14="http://schemas.microsoft.com/office/powerpoint/2010/main" xmlns:a16="http://schemas.microsoft.com/office/drawing/2014/main" xmlns="">
                   <a:solidFill>
                     <a:srgbClr val="FFFFFF"/>
                   </a:solidFill>

</xml_diff>